<commit_message>
Updates to intro deck
</commit_message>
<xml_diff>
--- a/00Intro/ng2.pptx
+++ b/00Intro/ng2.pptx
@@ -6,18 +6,22 @@
   </p:sldMasterIdLst>
   <p:sldIdLst>
     <p:sldId id="256" r:id="rId2"/>
-    <p:sldId id="257" r:id="rId3"/>
-    <p:sldId id="258" r:id="rId4"/>
-    <p:sldId id="259" r:id="rId5"/>
-    <p:sldId id="260" r:id="rId6"/>
-    <p:sldId id="261" r:id="rId7"/>
-    <p:sldId id="262" r:id="rId8"/>
-    <p:sldId id="263" r:id="rId9"/>
-    <p:sldId id="264" r:id="rId10"/>
-    <p:sldId id="265" r:id="rId11"/>
-    <p:sldId id="266" r:id="rId12"/>
-    <p:sldId id="268" r:id="rId13"/>
-    <p:sldId id="269" r:id="rId14"/>
+    <p:sldId id="270" r:id="rId3"/>
+    <p:sldId id="257" r:id="rId4"/>
+    <p:sldId id="258" r:id="rId5"/>
+    <p:sldId id="259" r:id="rId6"/>
+    <p:sldId id="260" r:id="rId7"/>
+    <p:sldId id="261" r:id="rId8"/>
+    <p:sldId id="262" r:id="rId9"/>
+    <p:sldId id="263" r:id="rId10"/>
+    <p:sldId id="264" r:id="rId11"/>
+    <p:sldId id="265" r:id="rId12"/>
+    <p:sldId id="266" r:id="rId13"/>
+    <p:sldId id="268" r:id="rId14"/>
+    <p:sldId id="269" r:id="rId15"/>
+    <p:sldId id="271" r:id="rId16"/>
+    <p:sldId id="272" r:id="rId17"/>
+    <p:sldId id="273" r:id="rId18"/>
   </p:sldIdLst>
   <p:sldSz cx="12192000" cy="6858000"/>
   <p:notesSz cx="6858000" cy="9144000"/>
@@ -116,6 +120,11 @@
       </a:defRPr>
     </a:lvl9pPr>
   </p:defaultTextStyle>
+  <p:extLst>
+    <p:ext uri="{EFAFB233-063F-42B5-8137-9DF3F51BA10A}">
+      <p15:sldGuideLst xmlns:p15="http://schemas.microsoft.com/office/powerpoint/2012/main"/>
+    </p:ext>
+  </p:extLst>
 </p:presentation>
 </file>
 
@@ -1288,33 +1297,33 @@
     </dgm:pt>
   </dgm:ptLst>
   <dgm:cxnLst>
+    <dgm:cxn modelId="{384CEF5C-E0B1-41A1-A79C-3D0DEE7830A2}" type="presOf" srcId="{D7B76717-5884-4C9B-A71A-8AF2FDC725B1}" destId="{97BE5C92-6E10-4380-880C-D9F241D9AD26}" srcOrd="0" destOrd="0" presId="urn:microsoft.com/office/officeart/2005/8/layout/radial5"/>
+    <dgm:cxn modelId="{CBACB984-5006-4F94-9503-A988AAE16A67}" type="presOf" srcId="{BD8C1BD0-1126-4201-BB75-1D97772E62F3}" destId="{3EAE74CD-5C71-4409-A435-F4CEC7D26288}" srcOrd="1" destOrd="0" presId="urn:microsoft.com/office/officeart/2005/8/layout/radial5"/>
+    <dgm:cxn modelId="{9639A97F-1A35-4471-9828-25448D146A61}" srcId="{4F729347-3E61-44C4-9520-3C6BF4BE9C2C}" destId="{9142B9A4-9FD4-4F77-99F3-FC1A54B92F7D}" srcOrd="5" destOrd="0" parTransId="{BD8C1BD0-1126-4201-BB75-1D97772E62F3}" sibTransId="{CD8AB965-4D75-4BBB-B1E1-8D6722DF66C1}"/>
+    <dgm:cxn modelId="{5662CAA9-3E3E-4EEB-81FE-D39622314056}" type="presOf" srcId="{3BCF3B74-12BD-4A53-8F98-8B9857534304}" destId="{2BC57594-CAF0-4842-8BAA-BC2745A52A29}" srcOrd="1" destOrd="0" presId="urn:microsoft.com/office/officeart/2005/8/layout/radial5"/>
+    <dgm:cxn modelId="{1EF173CD-457D-44E0-B3FA-352D728924B1}" type="presOf" srcId="{678B7DBD-6032-4E90-8CC3-176218B36312}" destId="{01F43465-5C1F-4FB8-A609-5F7814266A2D}" srcOrd="1" destOrd="0" presId="urn:microsoft.com/office/officeart/2005/8/layout/radial5"/>
+    <dgm:cxn modelId="{37721AC2-2C69-4D80-B1D0-ACF5142CCAEE}" type="presOf" srcId="{3B65B466-D042-4CE1-9454-D51B715AF449}" destId="{915A5AED-7DA4-4E8C-BDD9-3D4A8F46B71C}" srcOrd="0" destOrd="0" presId="urn:microsoft.com/office/officeart/2005/8/layout/radial5"/>
+    <dgm:cxn modelId="{2DA6A908-5B08-447B-A644-2CD7ADF68955}" type="presOf" srcId="{BD8C1BD0-1126-4201-BB75-1D97772E62F3}" destId="{2DE93610-C927-4AB1-8E0D-617C55AE3242}" srcOrd="0" destOrd="0" presId="urn:microsoft.com/office/officeart/2005/8/layout/radial5"/>
+    <dgm:cxn modelId="{50039A24-47D8-4568-B1EC-608FF5CA2107}" type="presOf" srcId="{DDB1B3CA-1AA8-4AAB-8293-562DFF1A6074}" destId="{FDFF6E16-23BA-4DF8-831A-2D9E3296F967}" srcOrd="1" destOrd="0" presId="urn:microsoft.com/office/officeart/2005/8/layout/radial5"/>
+    <dgm:cxn modelId="{6A36B76E-0408-447B-A0B7-D2E9447361DC}" srcId="{4F729347-3E61-44C4-9520-3C6BF4BE9C2C}" destId="{3B65B466-D042-4CE1-9454-D51B715AF449}" srcOrd="0" destOrd="0" parTransId="{678B7DBD-6032-4E90-8CC3-176218B36312}" sibTransId="{07309B71-0A42-4DE9-95B7-105733142AFF}"/>
+    <dgm:cxn modelId="{C0FA59D8-8175-4FCA-AF4D-B91B6DE56961}" type="presOf" srcId="{9961082C-9CAE-4663-ABB0-C0CE63F38BDF}" destId="{0F61A41C-45E6-452A-A350-29003EC1BA1B}" srcOrd="0" destOrd="0" presId="urn:microsoft.com/office/officeart/2005/8/layout/radial5"/>
+    <dgm:cxn modelId="{6ED0C901-631D-4FE1-BE41-86AFD8839FCB}" srcId="{27279B68-E66C-4885-89D1-F710D6E101E9}" destId="{4F729347-3E61-44C4-9520-3C6BF4BE9C2C}" srcOrd="0" destOrd="0" parTransId="{38877FAC-C56D-4588-BC44-6C43B5925BDF}" sibTransId="{B4D0281E-66CF-4084-8B14-35B3CD5DD4F8}"/>
+    <dgm:cxn modelId="{676E9ED5-6607-439D-8E18-209006BEF16C}" srcId="{4F729347-3E61-44C4-9520-3C6BF4BE9C2C}" destId="{6C4E88AD-ACF1-4CE3-88E8-27F3E5FE84B0}" srcOrd="3" destOrd="0" parTransId="{0FC57253-8361-424B-999E-FC0D726B71EE}" sibTransId="{0071E2EE-DDB9-4F08-ABE6-8F79E43411B9}"/>
+    <dgm:cxn modelId="{F41913BA-6493-4C8E-B949-AFE094575C4B}" srcId="{4F729347-3E61-44C4-9520-3C6BF4BE9C2C}" destId="{9961082C-9CAE-4663-ABB0-C0CE63F38BDF}" srcOrd="2" destOrd="0" parTransId="{4449613C-E3CC-4CF8-9079-3A6D81E8BEA1}" sibTransId="{A636968A-2188-4F2D-B186-9274D5207546}"/>
+    <dgm:cxn modelId="{7C1854EC-ED45-4C09-A18A-C887688519C2}" type="presOf" srcId="{6C4E88AD-ACF1-4CE3-88E8-27F3E5FE84B0}" destId="{5896CF21-17E5-4873-A48A-DAD8B3C197D2}" srcOrd="0" destOrd="0" presId="urn:microsoft.com/office/officeart/2005/8/layout/radial5"/>
+    <dgm:cxn modelId="{5BFC3565-7FC4-4D94-982E-B029BAFC1E09}" type="presOf" srcId="{DDB1B3CA-1AA8-4AAB-8293-562DFF1A6074}" destId="{C94C0169-65B4-4B72-AD41-E13B94D39F1E}" srcOrd="0" destOrd="0" presId="urn:microsoft.com/office/officeart/2005/8/layout/radial5"/>
+    <dgm:cxn modelId="{FDF2BE2D-A9DF-4314-8E1A-9F0FA47815E0}" type="presOf" srcId="{9142B9A4-9FD4-4F77-99F3-FC1A54B92F7D}" destId="{D968A437-F757-48D4-AE98-59199758C25E}" srcOrd="0" destOrd="0" presId="urn:microsoft.com/office/officeart/2005/8/layout/radial5"/>
+    <dgm:cxn modelId="{DE864D90-0A95-4047-B48C-EA0707577FBB}" srcId="{4F729347-3E61-44C4-9520-3C6BF4BE9C2C}" destId="{D441BF6B-2863-4303-A058-3304F56C0392}" srcOrd="1" destOrd="0" parTransId="{DDB1B3CA-1AA8-4AAB-8293-562DFF1A6074}" sibTransId="{04B58FA1-0191-47E7-87C4-899BA42D711D}"/>
+    <dgm:cxn modelId="{15CAF8C6-528A-426E-B37F-594F59D0250B}" type="presOf" srcId="{D441BF6B-2863-4303-A058-3304F56C0392}" destId="{C8232464-668F-4769-87CB-76E7A761DC8D}" srcOrd="0" destOrd="0" presId="urn:microsoft.com/office/officeart/2005/8/layout/radial5"/>
     <dgm:cxn modelId="{C2538A97-720E-4A65-96CD-6BF31050CBA8}" type="presOf" srcId="{4449613C-E3CC-4CF8-9079-3A6D81E8BEA1}" destId="{468792D7-FACB-43EE-BED6-8E1B50FCC3FB}" srcOrd="0" destOrd="0" presId="urn:microsoft.com/office/officeart/2005/8/layout/radial5"/>
-    <dgm:cxn modelId="{384CEF5C-E0B1-41A1-A79C-3D0DEE7830A2}" type="presOf" srcId="{D7B76717-5884-4C9B-A71A-8AF2FDC725B1}" destId="{97BE5C92-6E10-4380-880C-D9F241D9AD26}" srcOrd="0" destOrd="0" presId="urn:microsoft.com/office/officeart/2005/8/layout/radial5"/>
-    <dgm:cxn modelId="{50039A24-47D8-4568-B1EC-608FF5CA2107}" type="presOf" srcId="{DDB1B3CA-1AA8-4AAB-8293-562DFF1A6074}" destId="{FDFF6E16-23BA-4DF8-831A-2D9E3296F967}" srcOrd="1" destOrd="0" presId="urn:microsoft.com/office/officeart/2005/8/layout/radial5"/>
+    <dgm:cxn modelId="{C7965ECE-F894-4D4C-8C3A-B4705FDBAA92}" type="presOf" srcId="{678B7DBD-6032-4E90-8CC3-176218B36312}" destId="{31EDCDAA-3044-4B84-9649-3E4D2FDCA910}" srcOrd="0" destOrd="0" presId="urn:microsoft.com/office/officeart/2005/8/layout/radial5"/>
     <dgm:cxn modelId="{C7A2E99F-2358-4D7A-A9C6-160F12EA6D19}" type="presOf" srcId="{0FC57253-8361-424B-999E-FC0D726B71EE}" destId="{4BB10C84-3E42-4B41-BBA1-50DE445223EF}" srcOrd="0" destOrd="0" presId="urn:microsoft.com/office/officeart/2005/8/layout/radial5"/>
+    <dgm:cxn modelId="{45C61796-9DC2-4A0F-8131-C8004325F5AF}" type="presOf" srcId="{4F729347-3E61-44C4-9520-3C6BF4BE9C2C}" destId="{752C017B-D904-4301-A125-B5A053410FD0}" srcOrd="0" destOrd="0" presId="urn:microsoft.com/office/officeart/2005/8/layout/radial5"/>
+    <dgm:cxn modelId="{B7EB3B2D-0DB1-46B1-A22A-DFE546A56990}" type="presOf" srcId="{3BCF3B74-12BD-4A53-8F98-8B9857534304}" destId="{6BF6A25E-FA24-41BE-A149-7B00EC5744A4}" srcOrd="0" destOrd="0" presId="urn:microsoft.com/office/officeart/2005/8/layout/radial5"/>
     <dgm:cxn modelId="{363ADA0E-E00E-4623-A9FA-9348E55F9E55}" srcId="{4F729347-3E61-44C4-9520-3C6BF4BE9C2C}" destId="{D7B76717-5884-4C9B-A71A-8AF2FDC725B1}" srcOrd="4" destOrd="0" parTransId="{3BCF3B74-12BD-4A53-8F98-8B9857534304}" sibTransId="{6E2C921A-19D1-49F0-B89E-7CA1729DC1E2}"/>
-    <dgm:cxn modelId="{676E9ED5-6607-439D-8E18-209006BEF16C}" srcId="{4F729347-3E61-44C4-9520-3C6BF4BE9C2C}" destId="{6C4E88AD-ACF1-4CE3-88E8-27F3E5FE84B0}" srcOrd="3" destOrd="0" parTransId="{0FC57253-8361-424B-999E-FC0D726B71EE}" sibTransId="{0071E2EE-DDB9-4F08-ABE6-8F79E43411B9}"/>
-    <dgm:cxn modelId="{9639A97F-1A35-4471-9828-25448D146A61}" srcId="{4F729347-3E61-44C4-9520-3C6BF4BE9C2C}" destId="{9142B9A4-9FD4-4F77-99F3-FC1A54B92F7D}" srcOrd="5" destOrd="0" parTransId="{BD8C1BD0-1126-4201-BB75-1D97772E62F3}" sibTransId="{CD8AB965-4D75-4BBB-B1E1-8D6722DF66C1}"/>
-    <dgm:cxn modelId="{CBACB984-5006-4F94-9503-A988AAE16A67}" type="presOf" srcId="{BD8C1BD0-1126-4201-BB75-1D97772E62F3}" destId="{3EAE74CD-5C71-4409-A435-F4CEC7D26288}" srcOrd="1" destOrd="0" presId="urn:microsoft.com/office/officeart/2005/8/layout/radial5"/>
-    <dgm:cxn modelId="{B7EB3B2D-0DB1-46B1-A22A-DFE546A56990}" type="presOf" srcId="{3BCF3B74-12BD-4A53-8F98-8B9857534304}" destId="{6BF6A25E-FA24-41BE-A149-7B00EC5744A4}" srcOrd="0" destOrd="0" presId="urn:microsoft.com/office/officeart/2005/8/layout/radial5"/>
-    <dgm:cxn modelId="{1EF173CD-457D-44E0-B3FA-352D728924B1}" type="presOf" srcId="{678B7DBD-6032-4E90-8CC3-176218B36312}" destId="{01F43465-5C1F-4FB8-A609-5F7814266A2D}" srcOrd="1" destOrd="0" presId="urn:microsoft.com/office/officeart/2005/8/layout/radial5"/>
-    <dgm:cxn modelId="{FDF2BE2D-A9DF-4314-8E1A-9F0FA47815E0}" type="presOf" srcId="{9142B9A4-9FD4-4F77-99F3-FC1A54B92F7D}" destId="{D968A437-F757-48D4-AE98-59199758C25E}" srcOrd="0" destOrd="0" presId="urn:microsoft.com/office/officeart/2005/8/layout/radial5"/>
-    <dgm:cxn modelId="{5662CAA9-3E3E-4EEB-81FE-D39622314056}" type="presOf" srcId="{3BCF3B74-12BD-4A53-8F98-8B9857534304}" destId="{2BC57594-CAF0-4842-8BAA-BC2745A52A29}" srcOrd="1" destOrd="0" presId="urn:microsoft.com/office/officeart/2005/8/layout/radial5"/>
-    <dgm:cxn modelId="{DE864D90-0A95-4047-B48C-EA0707577FBB}" srcId="{4F729347-3E61-44C4-9520-3C6BF4BE9C2C}" destId="{D441BF6B-2863-4303-A058-3304F56C0392}" srcOrd="1" destOrd="0" parTransId="{DDB1B3CA-1AA8-4AAB-8293-562DFF1A6074}" sibTransId="{04B58FA1-0191-47E7-87C4-899BA42D711D}"/>
-    <dgm:cxn modelId="{2DA6A908-5B08-447B-A644-2CD7ADF68955}" type="presOf" srcId="{BD8C1BD0-1126-4201-BB75-1D97772E62F3}" destId="{2DE93610-C927-4AB1-8E0D-617C55AE3242}" srcOrd="0" destOrd="0" presId="urn:microsoft.com/office/officeart/2005/8/layout/radial5"/>
-    <dgm:cxn modelId="{6ED0C901-631D-4FE1-BE41-86AFD8839FCB}" srcId="{27279B68-E66C-4885-89D1-F710D6E101E9}" destId="{4F729347-3E61-44C4-9520-3C6BF4BE9C2C}" srcOrd="0" destOrd="0" parTransId="{38877FAC-C56D-4588-BC44-6C43B5925BDF}" sibTransId="{B4D0281E-66CF-4084-8B14-35B3CD5DD4F8}"/>
+    <dgm:cxn modelId="{12BAD8F8-7539-4D3A-B388-282318412ABA}" type="presOf" srcId="{4449613C-E3CC-4CF8-9079-3A6D81E8BEA1}" destId="{2581D5A8-B1AF-4BE2-AF6D-3DA6BF643193}" srcOrd="1" destOrd="0" presId="urn:microsoft.com/office/officeart/2005/8/layout/radial5"/>
     <dgm:cxn modelId="{572F3BDE-A903-4166-9D47-BA5CCE29F779}" type="presOf" srcId="{0FC57253-8361-424B-999E-FC0D726B71EE}" destId="{8E56E053-6058-4AC8-9189-47FFED4204CF}" srcOrd="1" destOrd="0" presId="urn:microsoft.com/office/officeart/2005/8/layout/radial5"/>
-    <dgm:cxn modelId="{6A36B76E-0408-447B-A0B7-D2E9447361DC}" srcId="{4F729347-3E61-44C4-9520-3C6BF4BE9C2C}" destId="{3B65B466-D042-4CE1-9454-D51B715AF449}" srcOrd="0" destOrd="0" parTransId="{678B7DBD-6032-4E90-8CC3-176218B36312}" sibTransId="{07309B71-0A42-4DE9-95B7-105733142AFF}"/>
-    <dgm:cxn modelId="{C7965ECE-F894-4D4C-8C3A-B4705FDBAA92}" type="presOf" srcId="{678B7DBD-6032-4E90-8CC3-176218B36312}" destId="{31EDCDAA-3044-4B84-9649-3E4D2FDCA910}" srcOrd="0" destOrd="0" presId="urn:microsoft.com/office/officeart/2005/8/layout/radial5"/>
-    <dgm:cxn modelId="{5BFC3565-7FC4-4D94-982E-B029BAFC1E09}" type="presOf" srcId="{DDB1B3CA-1AA8-4AAB-8293-562DFF1A6074}" destId="{C94C0169-65B4-4B72-AD41-E13B94D39F1E}" srcOrd="0" destOrd="0" presId="urn:microsoft.com/office/officeart/2005/8/layout/radial5"/>
-    <dgm:cxn modelId="{15CAF8C6-528A-426E-B37F-594F59D0250B}" type="presOf" srcId="{D441BF6B-2863-4303-A058-3304F56C0392}" destId="{C8232464-668F-4769-87CB-76E7A761DC8D}" srcOrd="0" destOrd="0" presId="urn:microsoft.com/office/officeart/2005/8/layout/radial5"/>
-    <dgm:cxn modelId="{C0FA59D8-8175-4FCA-AF4D-B91B6DE56961}" type="presOf" srcId="{9961082C-9CAE-4663-ABB0-C0CE63F38BDF}" destId="{0F61A41C-45E6-452A-A350-29003EC1BA1B}" srcOrd="0" destOrd="0" presId="urn:microsoft.com/office/officeart/2005/8/layout/radial5"/>
-    <dgm:cxn modelId="{12BAD8F8-7539-4D3A-B388-282318412ABA}" type="presOf" srcId="{4449613C-E3CC-4CF8-9079-3A6D81E8BEA1}" destId="{2581D5A8-B1AF-4BE2-AF6D-3DA6BF643193}" srcOrd="1" destOrd="0" presId="urn:microsoft.com/office/officeart/2005/8/layout/radial5"/>
-    <dgm:cxn modelId="{7C1854EC-ED45-4C09-A18A-C887688519C2}" type="presOf" srcId="{6C4E88AD-ACF1-4CE3-88E8-27F3E5FE84B0}" destId="{5896CF21-17E5-4873-A48A-DAD8B3C197D2}" srcOrd="0" destOrd="0" presId="urn:microsoft.com/office/officeart/2005/8/layout/radial5"/>
-    <dgm:cxn modelId="{37721AC2-2C69-4D80-B1D0-ACF5142CCAEE}" type="presOf" srcId="{3B65B466-D042-4CE1-9454-D51B715AF449}" destId="{915A5AED-7DA4-4E8C-BDD9-3D4A8F46B71C}" srcOrd="0" destOrd="0" presId="urn:microsoft.com/office/officeart/2005/8/layout/radial5"/>
-    <dgm:cxn modelId="{F41913BA-6493-4C8E-B949-AFE094575C4B}" srcId="{4F729347-3E61-44C4-9520-3C6BF4BE9C2C}" destId="{9961082C-9CAE-4663-ABB0-C0CE63F38BDF}" srcOrd="2" destOrd="0" parTransId="{4449613C-E3CC-4CF8-9079-3A6D81E8BEA1}" sibTransId="{A636968A-2188-4F2D-B186-9274D5207546}"/>
     <dgm:cxn modelId="{16355D65-C0C3-4EB8-9B43-23AA0E8E550F}" type="presOf" srcId="{27279B68-E66C-4885-89D1-F710D6E101E9}" destId="{3E84708A-AABE-4864-B388-AC2BDFC1DC39}" srcOrd="0" destOrd="0" presId="urn:microsoft.com/office/officeart/2005/8/layout/radial5"/>
-    <dgm:cxn modelId="{45C61796-9DC2-4A0F-8131-C8004325F5AF}" type="presOf" srcId="{4F729347-3E61-44C4-9520-3C6BF4BE9C2C}" destId="{752C017B-D904-4301-A125-B5A053410FD0}" srcOrd="0" destOrd="0" presId="urn:microsoft.com/office/officeart/2005/8/layout/radial5"/>
     <dgm:cxn modelId="{CD72CB26-79A6-47DF-8DB6-4E52ACB02DD1}" type="presParOf" srcId="{3E84708A-AABE-4864-B388-AC2BDFC1DC39}" destId="{752C017B-D904-4301-A125-B5A053410FD0}" srcOrd="0" destOrd="0" presId="urn:microsoft.com/office/officeart/2005/8/layout/radial5"/>
     <dgm:cxn modelId="{03623558-828A-4675-8E61-6EF12CBE4121}" type="presParOf" srcId="{3E84708A-AABE-4864-B388-AC2BDFC1DC39}" destId="{31EDCDAA-3044-4B84-9649-3E4D2FDCA910}" srcOrd="1" destOrd="0" presId="urn:microsoft.com/office/officeart/2005/8/layout/radial5"/>
     <dgm:cxn modelId="{2841BBBF-1E1F-484C-B916-A25CD6A1515B}" type="presParOf" srcId="{31EDCDAA-3044-4B84-9649-3E4D2FDCA910}" destId="{01F43465-5C1F-4FB8-A609-5F7814266A2D}" srcOrd="0" destOrd="0" presId="urn:microsoft.com/office/officeart/2005/8/layout/radial5"/>
@@ -3643,7 +3652,6 @@
               <a:rPr lang="en-US"/>
               <a:t>Click to edit Master title style</a:t>
             </a:r>
-            <a:endParaRPr lang="en-US"/>
           </a:p>
         </p:txBody>
       </p:sp>
@@ -3708,7 +3716,6 @@
               <a:rPr lang="en-US"/>
               <a:t>Click to edit Master subtitle style</a:t>
             </a:r>
-            <a:endParaRPr lang="en-US"/>
           </a:p>
         </p:txBody>
       </p:sp>
@@ -3729,7 +3736,7 @@
           <a:p>
             <a:fld id="{D5279824-C717-4B52-9E7D-7B6B13CAFE89}" type="datetimeFigureOut">
               <a:rPr lang="en-US" smtClean="0"/>
-              <a:t>10/1/2016</a:t>
+              <a:t>10/18/2016</a:t>
             </a:fld>
             <a:endParaRPr lang="en-US"/>
           </a:p>
@@ -3826,7 +3833,6 @@
               <a:rPr lang="en-US"/>
               <a:t>Click to edit Master title style</a:t>
             </a:r>
-            <a:endParaRPr lang="en-US"/>
           </a:p>
         </p:txBody>
       </p:sp>
@@ -3878,7 +3884,6 @@
               <a:rPr lang="en-US"/>
               <a:t>Fifth level</a:t>
             </a:r>
-            <a:endParaRPr lang="en-US"/>
           </a:p>
         </p:txBody>
       </p:sp>
@@ -3899,7 +3904,7 @@
           <a:p>
             <a:fld id="{D5279824-C717-4B52-9E7D-7B6B13CAFE89}" type="datetimeFigureOut">
               <a:rPr lang="en-US" smtClean="0"/>
-              <a:t>10/1/2016</a:t>
+              <a:t>10/18/2016</a:t>
             </a:fld>
             <a:endParaRPr lang="en-US"/>
           </a:p>
@@ -4001,7 +4006,6 @@
               <a:rPr lang="en-US"/>
               <a:t>Click to edit Master title style</a:t>
             </a:r>
-            <a:endParaRPr lang="en-US"/>
           </a:p>
         </p:txBody>
       </p:sp>
@@ -4058,7 +4062,6 @@
               <a:rPr lang="en-US"/>
               <a:t>Fifth level</a:t>
             </a:r>
-            <a:endParaRPr lang="en-US"/>
           </a:p>
         </p:txBody>
       </p:sp>
@@ -4079,7 +4082,7 @@
           <a:p>
             <a:fld id="{D5279824-C717-4B52-9E7D-7B6B13CAFE89}" type="datetimeFigureOut">
               <a:rPr lang="en-US" smtClean="0"/>
-              <a:t>10/1/2016</a:t>
+              <a:t>10/18/2016</a:t>
             </a:fld>
             <a:endParaRPr lang="en-US"/>
           </a:p>
@@ -4176,7 +4179,6 @@
               <a:rPr lang="en-US"/>
               <a:t>Click to edit Master title style</a:t>
             </a:r>
-            <a:endParaRPr lang="en-US"/>
           </a:p>
         </p:txBody>
       </p:sp>
@@ -4228,7 +4230,6 @@
               <a:rPr lang="en-US"/>
               <a:t>Fifth level</a:t>
             </a:r>
-            <a:endParaRPr lang="en-US"/>
           </a:p>
         </p:txBody>
       </p:sp>
@@ -4249,7 +4250,7 @@
           <a:p>
             <a:fld id="{D5279824-C717-4B52-9E7D-7B6B13CAFE89}" type="datetimeFigureOut">
               <a:rPr lang="en-US" smtClean="0"/>
-              <a:t>10/1/2016</a:t>
+              <a:t>10/18/2016</a:t>
             </a:fld>
             <a:endParaRPr lang="en-US"/>
           </a:p>
@@ -4355,7 +4356,6 @@
               <a:rPr lang="en-US"/>
               <a:t>Click to edit Master title style</a:t>
             </a:r>
-            <a:endParaRPr lang="en-US"/>
           </a:p>
         </p:txBody>
       </p:sp>
@@ -4495,7 +4495,7 @@
           <a:p>
             <a:fld id="{D5279824-C717-4B52-9E7D-7B6B13CAFE89}" type="datetimeFigureOut">
               <a:rPr lang="en-US" smtClean="0"/>
-              <a:t>10/1/2016</a:t>
+              <a:t>10/18/2016</a:t>
             </a:fld>
             <a:endParaRPr lang="en-US"/>
           </a:p>
@@ -4592,7 +4592,6 @@
               <a:rPr lang="en-US"/>
               <a:t>Click to edit Master title style</a:t>
             </a:r>
-            <a:endParaRPr lang="en-US"/>
           </a:p>
         </p:txBody>
       </p:sp>
@@ -4649,7 +4648,6 @@
               <a:rPr lang="en-US"/>
               <a:t>Fifth level</a:t>
             </a:r>
-            <a:endParaRPr lang="en-US"/>
           </a:p>
         </p:txBody>
       </p:sp>
@@ -4706,7 +4704,6 @@
               <a:rPr lang="en-US"/>
               <a:t>Fifth level</a:t>
             </a:r>
-            <a:endParaRPr lang="en-US"/>
           </a:p>
         </p:txBody>
       </p:sp>
@@ -4727,7 +4724,7 @@
           <a:p>
             <a:fld id="{D5279824-C717-4B52-9E7D-7B6B13CAFE89}" type="datetimeFigureOut">
               <a:rPr lang="en-US" smtClean="0"/>
-              <a:t>10/1/2016</a:t>
+              <a:t>10/18/2016</a:t>
             </a:fld>
             <a:endParaRPr lang="en-US"/>
           </a:p>
@@ -4829,7 +4826,6 @@
               <a:rPr lang="en-US"/>
               <a:t>Click to edit Master title style</a:t>
             </a:r>
-            <a:endParaRPr lang="en-US"/>
           </a:p>
         </p:txBody>
       </p:sp>
@@ -4951,7 +4947,6 @@
               <a:rPr lang="en-US"/>
               <a:t>Fifth level</a:t>
             </a:r>
-            <a:endParaRPr lang="en-US"/>
           </a:p>
         </p:txBody>
       </p:sp>
@@ -5073,7 +5068,6 @@
               <a:rPr lang="en-US"/>
               <a:t>Fifth level</a:t>
             </a:r>
-            <a:endParaRPr lang="en-US"/>
           </a:p>
         </p:txBody>
       </p:sp>
@@ -5094,7 +5088,7 @@
           <a:p>
             <a:fld id="{D5279824-C717-4B52-9E7D-7B6B13CAFE89}" type="datetimeFigureOut">
               <a:rPr lang="en-US" smtClean="0"/>
-              <a:t>10/1/2016</a:t>
+              <a:t>10/18/2016</a:t>
             </a:fld>
             <a:endParaRPr lang="en-US"/>
           </a:p>
@@ -5191,7 +5185,6 @@
               <a:rPr lang="en-US"/>
               <a:t>Click to edit Master title style</a:t>
             </a:r>
-            <a:endParaRPr lang="en-US"/>
           </a:p>
         </p:txBody>
       </p:sp>
@@ -5212,7 +5205,7 @@
           <a:p>
             <a:fld id="{D5279824-C717-4B52-9E7D-7B6B13CAFE89}" type="datetimeFigureOut">
               <a:rPr lang="en-US" smtClean="0"/>
-              <a:t>10/1/2016</a:t>
+              <a:t>10/18/2016</a:t>
             </a:fld>
             <a:endParaRPr lang="en-US"/>
           </a:p>
@@ -5307,7 +5300,7 @@
           <a:p>
             <a:fld id="{D5279824-C717-4B52-9E7D-7B6B13CAFE89}" type="datetimeFigureOut">
               <a:rPr lang="en-US" smtClean="0"/>
-              <a:t>10/1/2016</a:t>
+              <a:t>10/18/2016</a:t>
             </a:fld>
             <a:endParaRPr lang="en-US"/>
           </a:p>
@@ -5413,7 +5406,6 @@
               <a:rPr lang="en-US"/>
               <a:t>Click to edit Master title style</a:t>
             </a:r>
-            <a:endParaRPr lang="en-US"/>
           </a:p>
         </p:txBody>
       </p:sp>
@@ -5498,7 +5490,6 @@
               <a:rPr lang="en-US"/>
               <a:t>Fifth level</a:t>
             </a:r>
-            <a:endParaRPr lang="en-US"/>
           </a:p>
         </p:txBody>
       </p:sp>
@@ -5584,7 +5575,7 @@
           <a:p>
             <a:fld id="{D5279824-C717-4B52-9E7D-7B6B13CAFE89}" type="datetimeFigureOut">
               <a:rPr lang="en-US" smtClean="0"/>
-              <a:t>10/1/2016</a:t>
+              <a:t>10/18/2016</a:t>
             </a:fld>
             <a:endParaRPr lang="en-US"/>
           </a:p>
@@ -5690,7 +5681,6 @@
               <a:rPr lang="en-US"/>
               <a:t>Click to edit Master title style</a:t>
             </a:r>
-            <a:endParaRPr lang="en-US"/>
           </a:p>
         </p:txBody>
       </p:sp>
@@ -5837,7 +5827,7 @@
           <a:p>
             <a:fld id="{D5279824-C717-4B52-9E7D-7B6B13CAFE89}" type="datetimeFigureOut">
               <a:rPr lang="en-US" smtClean="0"/>
-              <a:t>10/1/2016</a:t>
+              <a:t>10/18/2016</a:t>
             </a:fld>
             <a:endParaRPr lang="en-US"/>
           </a:p>
@@ -5949,7 +5939,6 @@
               <a:rPr lang="en-US"/>
               <a:t>Click to edit Master title style</a:t>
             </a:r>
-            <a:endParaRPr lang="en-US"/>
           </a:p>
         </p:txBody>
       </p:sp>
@@ -6011,7 +6000,6 @@
               <a:rPr lang="en-US"/>
               <a:t>Fifth level</a:t>
             </a:r>
-            <a:endParaRPr lang="en-US"/>
           </a:p>
         </p:txBody>
       </p:sp>
@@ -6050,7 +6038,7 @@
           <a:p>
             <a:fld id="{D5279824-C717-4B52-9E7D-7B6B13CAFE89}" type="datetimeFigureOut">
               <a:rPr lang="en-US" smtClean="0"/>
-              <a:t>10/1/2016</a:t>
+              <a:t>10/18/2016</a:t>
             </a:fld>
             <a:endParaRPr lang="en-US"/>
           </a:p>
@@ -6546,6 +6534,242 @@
           <a:p>
             <a:r>
               <a:rPr lang="en-US" dirty="0"/>
+              <a:t>Dependency Injection</a:t>
+            </a:r>
+          </a:p>
+        </p:txBody>
+      </p:sp>
+      <p:sp>
+        <p:nvSpPr>
+          <p:cNvPr id="3" name="Content Placeholder 2"/>
+          <p:cNvSpPr>
+            <a:spLocks noGrp="1"/>
+          </p:cNvSpPr>
+          <p:nvPr>
+            <p:ph idx="1"/>
+          </p:nvPr>
+        </p:nvSpPr>
+        <p:spPr/>
+        <p:txBody>
+          <a:bodyPr/>
+          <a:lstStyle/>
+          <a:p>
+            <a:r>
+              <a:rPr lang="en-US" dirty="0"/>
+              <a:t>Provider model</a:t>
+            </a:r>
+          </a:p>
+          <a:p>
+            <a:r>
+              <a:rPr lang="en-US" dirty="0"/>
+              <a:t>Hierarchical </a:t>
+            </a:r>
+          </a:p>
+          <a:p>
+            <a:r>
+              <a:rPr lang="en-US" dirty="0"/>
+              <a:t>Mock services</a:t>
+            </a:r>
+          </a:p>
+          <a:p>
+            <a:r>
+              <a:rPr lang="en-US" dirty="0"/>
+              <a:t>Scope services</a:t>
+            </a:r>
+          </a:p>
+          <a:p>
+            <a:r>
+              <a:rPr lang="en-US" dirty="0"/>
+              <a:t>Control lifetime</a:t>
+            </a:r>
+          </a:p>
+        </p:txBody>
+      </p:sp>
+      <p:grpSp>
+        <p:nvGrpSpPr>
+          <p:cNvPr id="4" name="Group 3"/>
+          <p:cNvGrpSpPr/>
+          <p:nvPr/>
+        </p:nvGrpSpPr>
+        <p:grpSpPr>
+          <a:xfrm>
+            <a:off x="10023678" y="360566"/>
+            <a:ext cx="1330122" cy="1330122"/>
+            <a:chOff x="6407349" y="2797441"/>
+            <a:chExt cx="1330122" cy="1330122"/>
+          </a:xfrm>
+        </p:grpSpPr>
+        <p:sp>
+          <p:nvSpPr>
+            <p:cNvPr id="5" name="Oval 4"/>
+            <p:cNvSpPr/>
+            <p:nvPr/>
+          </p:nvSpPr>
+          <p:spPr>
+            <a:xfrm>
+              <a:off x="6407349" y="2797441"/>
+              <a:ext cx="1330122" cy="1330122"/>
+            </a:xfrm>
+            <a:prstGeom prst="ellipse">
+              <a:avLst/>
+            </a:prstGeom>
+          </p:spPr>
+          <p:style>
+            <a:lnRef idx="2">
+              <a:schemeClr val="lt1">
+                <a:hueOff val="0"/>
+                <a:satOff val="0"/>
+                <a:lumOff val="0"/>
+                <a:alphaOff val="0"/>
+              </a:schemeClr>
+            </a:lnRef>
+            <a:fillRef idx="1">
+              <a:schemeClr val="accent4">
+                <a:hueOff val="4158277"/>
+                <a:satOff val="-19187"/>
+                <a:lumOff val="706"/>
+                <a:alphaOff val="0"/>
+              </a:schemeClr>
+            </a:fillRef>
+            <a:effectRef idx="0">
+              <a:schemeClr val="accent4">
+                <a:hueOff val="4158277"/>
+                <a:satOff val="-19187"/>
+                <a:lumOff val="706"/>
+                <a:alphaOff val="0"/>
+              </a:schemeClr>
+            </a:effectRef>
+            <a:fontRef idx="minor">
+              <a:schemeClr val="lt1"/>
+            </a:fontRef>
+          </p:style>
+        </p:sp>
+        <p:sp>
+          <p:nvSpPr>
+            <p:cNvPr id="6" name="Oval 4"/>
+            <p:cNvSpPr txBox="1"/>
+            <p:nvPr/>
+          </p:nvSpPr>
+          <p:spPr>
+            <a:xfrm>
+              <a:off x="6602141" y="2992233"/>
+              <a:ext cx="940538" cy="940538"/>
+            </a:xfrm>
+            <a:prstGeom prst="rect">
+              <a:avLst/>
+            </a:prstGeom>
+          </p:spPr>
+          <p:style>
+            <a:lnRef idx="0">
+              <a:scrgbClr r="0" g="0" b="0"/>
+            </a:lnRef>
+            <a:fillRef idx="0">
+              <a:scrgbClr r="0" g="0" b="0"/>
+            </a:fillRef>
+            <a:effectRef idx="0">
+              <a:scrgbClr r="0" g="0" b="0"/>
+            </a:effectRef>
+            <a:fontRef idx="minor">
+              <a:schemeClr val="lt1"/>
+            </a:fontRef>
+          </p:style>
+          <p:txBody>
+            <a:bodyPr spcFirstLastPara="0" vert="horz" wrap="square" lIns="16510" tIns="16510" rIns="16510" bIns="16510" numCol="1" spcCol="1270" anchor="ctr" anchorCtr="0">
+              <a:noAutofit/>
+            </a:bodyPr>
+            <a:lstStyle/>
+            <a:p>
+              <a:pPr marL="0" lvl="0" indent="0" algn="ctr" defTabSz="577850">
+                <a:lnSpc>
+                  <a:spcPct val="90000"/>
+                </a:lnSpc>
+                <a:spcBef>
+                  <a:spcPct val="0"/>
+                </a:spcBef>
+                <a:spcAft>
+                  <a:spcPct val="35000"/>
+                </a:spcAft>
+                <a:buNone/>
+              </a:pPr>
+              <a:r>
+                <a:rPr lang="en-US" sz="1300" kern="1200" dirty="0"/>
+                <a:t>Dependency Injection</a:t>
+              </a:r>
+            </a:p>
+          </p:txBody>
+        </p:sp>
+      </p:grpSp>
+      <p:pic>
+        <p:nvPicPr>
+          <p:cNvPr id="7" name="Picture 6"/>
+          <p:cNvPicPr>
+            <a:picLocks noChangeAspect="1"/>
+          </p:cNvPicPr>
+          <p:nvPr/>
+        </p:nvPicPr>
+        <p:blipFill>
+          <a:blip r:embed="rId2"/>
+          <a:stretch>
+            <a:fillRect/>
+          </a:stretch>
+        </p:blipFill>
+        <p:spPr>
+          <a:xfrm>
+            <a:off x="4284757" y="1979296"/>
+            <a:ext cx="6874251" cy="4197667"/>
+          </a:xfrm>
+          <a:prstGeom prst="rect">
+            <a:avLst/>
+          </a:prstGeom>
+        </p:spPr>
+      </p:pic>
+    </p:spTree>
+    <p:extLst>
+      <p:ext uri="{BB962C8B-B14F-4D97-AF65-F5344CB8AC3E}">
+        <p14:creationId xmlns:p14="http://schemas.microsoft.com/office/powerpoint/2010/main" val="3879670532"/>
+      </p:ext>
+    </p:extLst>
+  </p:cSld>
+  <p:clrMapOvr>
+    <a:masterClrMapping/>
+  </p:clrMapOvr>
+</p:sld>
+</file>
+
+<file path=ppt/slides/slide11.xml><?xml version="1.0" encoding="utf-8"?>
+<p:sld xmlns:a="http://schemas.openxmlformats.org/drawingml/2006/main" xmlns:r="http://schemas.openxmlformats.org/officeDocument/2006/relationships" xmlns:p="http://schemas.openxmlformats.org/presentationml/2006/main">
+  <p:cSld>
+    <p:spTree>
+      <p:nvGrpSpPr>
+        <p:cNvPr id="1" name=""/>
+        <p:cNvGrpSpPr/>
+        <p:nvPr/>
+      </p:nvGrpSpPr>
+      <p:grpSpPr>
+        <a:xfrm>
+          <a:off x="0" y="0"/>
+          <a:ext cx="0" cy="0"/>
+          <a:chOff x="0" y="0"/>
+          <a:chExt cx="0" cy="0"/>
+        </a:xfrm>
+      </p:grpSpPr>
+      <p:sp>
+        <p:nvSpPr>
+          <p:cNvPr id="2" name="Title 1"/>
+          <p:cNvSpPr>
+            <a:spLocks noGrp="1"/>
+          </p:cNvSpPr>
+          <p:nvPr>
+            <p:ph type="title"/>
+          </p:nvPr>
+        </p:nvSpPr>
+        <p:spPr/>
+        <p:txBody>
+          <a:bodyPr/>
+          <a:lstStyle/>
+          <a:p>
+            <a:r>
+              <a:rPr lang="en-US" dirty="0"/>
               <a:t>Templates</a:t>
             </a:r>
           </a:p>
@@ -6754,7 +6978,7 @@
 </p:sld>
 </file>
 
-<file path=ppt/slides/slide11.xml><?xml version="1.0" encoding="utf-8"?>
+<file path=ppt/slides/slide12.xml><?xml version="1.0" encoding="utf-8"?>
 <p:sld xmlns:a="http://schemas.openxmlformats.org/drawingml/2006/main" xmlns:r="http://schemas.openxmlformats.org/officeDocument/2006/relationships" xmlns:p="http://schemas.openxmlformats.org/presentationml/2006/main">
   <p:cSld>
     <p:spTree>
@@ -6981,7 +7205,7 @@
 </p:sld>
 </file>
 
-<file path=ppt/slides/slide12.xml><?xml version="1.0" encoding="utf-8"?>
+<file path=ppt/slides/slide13.xml><?xml version="1.0" encoding="utf-8"?>
 <p:sld xmlns:a="http://schemas.openxmlformats.org/drawingml/2006/main" xmlns:r="http://schemas.openxmlformats.org/officeDocument/2006/relationships" xmlns:p="http://schemas.openxmlformats.org/presentationml/2006/main">
   <p:cSld>
     <p:spTree>
@@ -7231,7 +7455,7 @@
 </p:sld>
 </file>
 
-<file path=ppt/slides/slide13.xml><?xml version="1.0" encoding="utf-8"?>
+<file path=ppt/slides/slide14.xml><?xml version="1.0" encoding="utf-8"?>
 <p:sld xmlns:a="http://schemas.openxmlformats.org/drawingml/2006/main" xmlns:r="http://schemas.openxmlformats.org/officeDocument/2006/relationships" xmlns:p="http://schemas.openxmlformats.org/presentationml/2006/main">
   <p:cSld>
     <p:spTree>
@@ -7390,6 +7614,582 @@
 </p:sld>
 </file>
 
+<file path=ppt/slides/slide15.xml><?xml version="1.0" encoding="utf-8"?>
+<p:sld xmlns:a="http://schemas.openxmlformats.org/drawingml/2006/main" xmlns:r="http://schemas.openxmlformats.org/officeDocument/2006/relationships" xmlns:p="http://schemas.openxmlformats.org/presentationml/2006/main">
+  <p:cSld>
+    <p:spTree>
+      <p:nvGrpSpPr>
+        <p:cNvPr id="1" name=""/>
+        <p:cNvGrpSpPr/>
+        <p:nvPr/>
+      </p:nvGrpSpPr>
+      <p:grpSpPr>
+        <a:xfrm>
+          <a:off x="0" y="0"/>
+          <a:ext cx="0" cy="0"/>
+          <a:chOff x="0" y="0"/>
+          <a:chExt cx="0" cy="0"/>
+        </a:xfrm>
+      </p:grpSpPr>
+      <p:sp>
+        <p:nvSpPr>
+          <p:cNvPr id="2" name="Title 1"/>
+          <p:cNvSpPr>
+            <a:spLocks noGrp="1"/>
+          </p:cNvSpPr>
+          <p:nvPr>
+            <p:ph type="title"/>
+          </p:nvPr>
+        </p:nvSpPr>
+        <p:spPr/>
+        <p:txBody>
+          <a:bodyPr/>
+          <a:lstStyle/>
+          <a:p>
+            <a:r>
+              <a:rPr lang="en-US" dirty="0"/>
+              <a:t>Summary: Why Angular?</a:t>
+            </a:r>
+          </a:p>
+        </p:txBody>
+      </p:sp>
+      <p:sp>
+        <p:nvSpPr>
+          <p:cNvPr id="3" name="Content Placeholder 2"/>
+          <p:cNvSpPr>
+            <a:spLocks noGrp="1"/>
+          </p:cNvSpPr>
+          <p:nvPr>
+            <p:ph idx="1"/>
+          </p:nvPr>
+        </p:nvSpPr>
+        <p:spPr>
+          <a:xfrm>
+            <a:off x="2152651" y="1825625"/>
+            <a:ext cx="3674174" cy="4351338"/>
+          </a:xfrm>
+        </p:spPr>
+        <p:txBody>
+          <a:bodyPr>
+            <a:normAutofit fontScale="85000" lnSpcReduction="20000"/>
+          </a:bodyPr>
+          <a:lstStyle/>
+          <a:p>
+            <a:r>
+              <a:rPr lang="en-US" dirty="0"/>
+              <a:t>Three D’s of Web Development: </a:t>
+            </a:r>
+            <a:r>
+              <a:rPr lang="en-US" dirty="0">
+                <a:hlinkClick r:id="rId2"/>
+              </a:rPr>
+              <a:t>http://bit.ly/3dofweb</a:t>
+            </a:r>
+            <a:r>
+              <a:rPr lang="en-US" dirty="0"/>
+              <a:t>  </a:t>
+            </a:r>
+          </a:p>
+          <a:p>
+            <a:r>
+              <a:rPr lang="en-US" dirty="0"/>
+              <a:t>Declarative vs. Imperative </a:t>
+            </a:r>
+          </a:p>
+          <a:p>
+            <a:r>
+              <a:rPr lang="en-US" dirty="0"/>
+              <a:t>Data-binding </a:t>
+            </a:r>
+          </a:p>
+          <a:p>
+            <a:r>
+              <a:rPr lang="en-US" dirty="0"/>
+              <a:t>Dependency Injection</a:t>
+            </a:r>
+          </a:p>
+          <a:p>
+            <a:r>
+              <a:rPr lang="en-US" dirty="0"/>
+              <a:t>Components and Templates</a:t>
+            </a:r>
+          </a:p>
+          <a:p>
+            <a:r>
+              <a:rPr lang="en-US" dirty="0"/>
+              <a:t>Code Reuse </a:t>
+            </a:r>
+          </a:p>
+          <a:p>
+            <a:r>
+              <a:rPr lang="en-US" dirty="0"/>
+              <a:t>Parallel Development </a:t>
+            </a:r>
+          </a:p>
+          <a:p>
+            <a:r>
+              <a:rPr lang="en-US" dirty="0"/>
+              <a:t>Testability </a:t>
+            </a:r>
+          </a:p>
+          <a:p>
+            <a:r>
+              <a:rPr lang="en-US" dirty="0"/>
+              <a:t>Performance</a:t>
+            </a:r>
+          </a:p>
+          <a:p>
+            <a:pPr marL="0" indent="0">
+              <a:buNone/>
+            </a:pPr>
+            <a:endParaRPr lang="en-US" dirty="0"/>
+          </a:p>
+        </p:txBody>
+      </p:sp>
+      <p:pic>
+        <p:nvPicPr>
+          <p:cNvPr id="5" name="Picture 4"/>
+          <p:cNvPicPr>
+            <a:picLocks noChangeAspect="1"/>
+          </p:cNvPicPr>
+          <p:nvPr/>
+        </p:nvPicPr>
+        <p:blipFill>
+          <a:blip r:embed="rId3"/>
+          <a:stretch>
+            <a:fillRect/>
+          </a:stretch>
+        </p:blipFill>
+        <p:spPr>
+          <a:xfrm>
+            <a:off x="5826825" y="1825626"/>
+            <a:ext cx="4577751" cy="3259863"/>
+          </a:xfrm>
+          <a:prstGeom prst="rect">
+            <a:avLst/>
+          </a:prstGeom>
+        </p:spPr>
+      </p:pic>
+      <p:sp>
+        <p:nvSpPr>
+          <p:cNvPr id="6" name="TextBox 5"/>
+          <p:cNvSpPr txBox="1"/>
+          <p:nvPr/>
+        </p:nvSpPr>
+        <p:spPr>
+          <a:xfrm>
+            <a:off x="5609087" y="5477338"/>
+            <a:ext cx="5106911" cy="307777"/>
+          </a:xfrm>
+          <a:prstGeom prst="rect">
+            <a:avLst/>
+          </a:prstGeom>
+          <a:noFill/>
+        </p:spPr>
+        <p:txBody>
+          <a:bodyPr wrap="none" rtlCol="0">
+            <a:spAutoFit/>
+          </a:bodyPr>
+          <a:lstStyle/>
+          <a:p>
+            <a:r>
+              <a:rPr lang="en-US" sz="1400" dirty="0"/>
+              <a:t>Source: </a:t>
+            </a:r>
+            <a:r>
+              <a:rPr lang="en-US" sz="1400" dirty="0">
+                <a:hlinkClick r:id="rId4"/>
+              </a:rPr>
+              <a:t>http://stackoverflow.com/research/developer-survey-2016</a:t>
+            </a:r>
+            <a:r>
+              <a:rPr lang="en-US" sz="1400" dirty="0"/>
+              <a:t> </a:t>
+            </a:r>
+          </a:p>
+        </p:txBody>
+      </p:sp>
+    </p:spTree>
+    <p:extLst>
+      <p:ext uri="{BB962C8B-B14F-4D97-AF65-F5344CB8AC3E}">
+        <p14:creationId xmlns:p14="http://schemas.microsoft.com/office/powerpoint/2010/main" val="1335611333"/>
+      </p:ext>
+    </p:extLst>
+  </p:cSld>
+  <p:clrMapOvr>
+    <a:masterClrMapping/>
+  </p:clrMapOvr>
+</p:sld>
+</file>
+
+<file path=ppt/slides/slide16.xml><?xml version="1.0" encoding="utf-8"?>
+<p:sld xmlns:a="http://schemas.openxmlformats.org/drawingml/2006/main" xmlns:r="http://schemas.openxmlformats.org/officeDocument/2006/relationships" xmlns:p="http://schemas.openxmlformats.org/presentationml/2006/main">
+  <p:cSld>
+    <p:spTree>
+      <p:nvGrpSpPr>
+        <p:cNvPr id="1" name=""/>
+        <p:cNvGrpSpPr/>
+        <p:nvPr/>
+      </p:nvGrpSpPr>
+      <p:grpSpPr>
+        <a:xfrm>
+          <a:off x="0" y="0"/>
+          <a:ext cx="0" cy="0"/>
+          <a:chOff x="0" y="0"/>
+          <a:chExt cx="0" cy="0"/>
+        </a:xfrm>
+      </p:grpSpPr>
+      <p:pic>
+        <p:nvPicPr>
+          <p:cNvPr id="4" name="Picture 3"/>
+          <p:cNvPicPr>
+            <a:picLocks noChangeAspect="1"/>
+          </p:cNvPicPr>
+          <p:nvPr/>
+        </p:nvPicPr>
+        <p:blipFill>
+          <a:blip r:embed="rId2">
+            <a:extLst>
+              <a:ext uri="{28A0092B-C50C-407E-A947-70E740481C1C}">
+                <a14:useLocalDpi xmlns:a14="http://schemas.microsoft.com/office/drawing/2010/main" val="0"/>
+              </a:ext>
+            </a:extLst>
+          </a:blip>
+          <a:stretch>
+            <a:fillRect/>
+          </a:stretch>
+        </p:blipFill>
+        <p:spPr>
+          <a:xfrm>
+            <a:off x="6797926" y="0"/>
+            <a:ext cx="3870075" cy="6858000"/>
+          </a:xfrm>
+          <a:prstGeom prst="rect">
+            <a:avLst/>
+          </a:prstGeom>
+        </p:spPr>
+      </p:pic>
+      <p:sp>
+        <p:nvSpPr>
+          <p:cNvPr id="2" name="Title 1"/>
+          <p:cNvSpPr>
+            <a:spLocks noGrp="1"/>
+          </p:cNvSpPr>
+          <p:nvPr>
+            <p:ph type="title"/>
+          </p:nvPr>
+        </p:nvSpPr>
+        <p:spPr/>
+        <p:txBody>
+          <a:bodyPr/>
+          <a:lstStyle/>
+          <a:p>
+            <a:r>
+              <a:rPr lang="en-US" dirty="0"/>
+              <a:t>Why Angular 2?</a:t>
+            </a:r>
+          </a:p>
+        </p:txBody>
+      </p:sp>
+      <p:sp>
+        <p:nvSpPr>
+          <p:cNvPr id="3" name="Content Placeholder 2"/>
+          <p:cNvSpPr>
+            <a:spLocks noGrp="1"/>
+          </p:cNvSpPr>
+          <p:nvPr>
+            <p:ph idx="1"/>
+          </p:nvPr>
+        </p:nvSpPr>
+        <p:spPr>
+          <a:xfrm>
+            <a:off x="2152650" y="1825625"/>
+            <a:ext cx="7886700" cy="4351338"/>
+          </a:xfrm>
+          <a:solidFill>
+            <a:schemeClr val="bg1">
+              <a:alpha val="56000"/>
+            </a:schemeClr>
+          </a:solidFill>
+        </p:spPr>
+        <p:txBody>
+          <a:bodyPr>
+            <a:normAutofit fontScale="85000" lnSpcReduction="10000"/>
+          </a:bodyPr>
+          <a:lstStyle/>
+          <a:p>
+            <a:r>
+              <a:rPr lang="en-US" dirty="0"/>
+              <a:t>Small footprint (á la carte) </a:t>
+            </a:r>
+          </a:p>
+          <a:p>
+            <a:r>
+              <a:rPr lang="en-US" dirty="0"/>
+              <a:t>Easy to read, understand, and learn declarative interface </a:t>
+            </a:r>
+          </a:p>
+          <a:p>
+            <a:r>
+              <a:rPr lang="en-US" dirty="0"/>
+              <a:t>Improved performance (5x rendering in all scenarios over Angular 1.x) </a:t>
+            </a:r>
+          </a:p>
+          <a:p>
+            <a:r>
+              <a:rPr lang="en-US" dirty="0"/>
+              <a:t>Great CSS management (CSS per component) </a:t>
+            </a:r>
+          </a:p>
+          <a:p>
+            <a:r>
+              <a:rPr lang="en-US" dirty="0"/>
+              <a:t>Module prefixing (easier to move related files in large projects) </a:t>
+            </a:r>
+          </a:p>
+          <a:p>
+            <a:r>
+              <a:rPr lang="en-US" dirty="0"/>
+              <a:t>Server-side rendering with Angular universal </a:t>
+            </a:r>
+          </a:p>
+          <a:p>
+            <a:r>
+              <a:rPr lang="en-US" dirty="0"/>
+              <a:t>Testing support </a:t>
+            </a:r>
+          </a:p>
+          <a:p>
+            <a:r>
+              <a:rPr lang="en-US" dirty="0"/>
+              <a:t>Advanced scaffolding with Angular-CLI (</a:t>
+            </a:r>
+            <a:r>
+              <a:rPr lang="en-US" dirty="0" err="1"/>
+              <a:t>Webpack</a:t>
+            </a:r>
+            <a:r>
+              <a:rPr lang="en-US" dirty="0"/>
+              <a:t>!) </a:t>
+            </a:r>
+          </a:p>
+          <a:p>
+            <a:r>
+              <a:rPr lang="en-US" dirty="0" err="1"/>
+              <a:t>TypeScript</a:t>
+            </a:r>
+            <a:r>
+              <a:rPr lang="en-US" dirty="0"/>
+              <a:t> (stay tuned…)</a:t>
+            </a:r>
+          </a:p>
+          <a:p>
+            <a:pPr marL="0" indent="0">
+              <a:buNone/>
+            </a:pPr>
+            <a:endParaRPr lang="en-US" dirty="0"/>
+          </a:p>
+        </p:txBody>
+      </p:sp>
+    </p:spTree>
+    <p:extLst>
+      <p:ext uri="{BB962C8B-B14F-4D97-AF65-F5344CB8AC3E}">
+        <p14:creationId xmlns:p14="http://schemas.microsoft.com/office/powerpoint/2010/main" val="2963154494"/>
+      </p:ext>
+    </p:extLst>
+  </p:cSld>
+  <p:clrMapOvr>
+    <a:masterClrMapping/>
+  </p:clrMapOvr>
+</p:sld>
+</file>
+
+<file path=ppt/slides/slide17.xml><?xml version="1.0" encoding="utf-8"?>
+<p:sld xmlns:a="http://schemas.openxmlformats.org/drawingml/2006/main" xmlns:r="http://schemas.openxmlformats.org/officeDocument/2006/relationships" xmlns:p="http://schemas.openxmlformats.org/presentationml/2006/main">
+  <p:cSld>
+    <p:spTree>
+      <p:nvGrpSpPr>
+        <p:cNvPr id="1" name=""/>
+        <p:cNvGrpSpPr/>
+        <p:nvPr/>
+      </p:nvGrpSpPr>
+      <p:grpSpPr>
+        <a:xfrm>
+          <a:off x="0" y="0"/>
+          <a:ext cx="0" cy="0"/>
+          <a:chOff x="0" y="0"/>
+          <a:chExt cx="0" cy="0"/>
+        </a:xfrm>
+      </p:grpSpPr>
+      <p:sp>
+        <p:nvSpPr>
+          <p:cNvPr id="3" name="Content Placeholder 2"/>
+          <p:cNvSpPr>
+            <a:spLocks noGrp="1"/>
+          </p:cNvSpPr>
+          <p:nvPr>
+            <p:ph idx="1"/>
+          </p:nvPr>
+        </p:nvSpPr>
+        <p:spPr>
+          <a:xfrm>
+            <a:off x="838200" y="1825625"/>
+            <a:ext cx="10868310" cy="4744914"/>
+          </a:xfrm>
+          <a:solidFill>
+            <a:schemeClr val="bg1">
+              <a:alpha val="62000"/>
+            </a:schemeClr>
+          </a:solidFill>
+        </p:spPr>
+        <p:txBody>
+          <a:bodyPr>
+            <a:normAutofit lnSpcReduction="10000"/>
+          </a:bodyPr>
+          <a:lstStyle/>
+          <a:p>
+            <a:r>
+              <a:rPr lang="en-US" dirty="0"/>
+              <a:t>“I cannot say I have ever been a Microsoft fan but </a:t>
+            </a:r>
+            <a:r>
+              <a:rPr lang="en-US" dirty="0" err="1"/>
+              <a:t>TypeScript</a:t>
+            </a:r>
+            <a:r>
+              <a:rPr lang="en-US" dirty="0"/>
+              <a:t> has ‘softened’ me, it is easily </a:t>
+            </a:r>
+            <a:r>
+              <a:rPr lang="en-US" b="1" dirty="0"/>
+              <a:t>one of the best web technologies to arrive in the past 3 years</a:t>
+            </a:r>
+            <a:r>
+              <a:rPr lang="en-US" dirty="0"/>
+              <a:t>.” - </a:t>
+            </a:r>
+            <a:r>
+              <a:rPr lang="en-US" sz="1600" dirty="0">
+                <a:hlinkClick r:id="rId2"/>
+              </a:rPr>
+              <a:t>https://tedpatrick.com/2013/06/25/7-months-with-typescript/</a:t>
+            </a:r>
+            <a:r>
+              <a:rPr lang="en-US" sz="1600" dirty="0"/>
+              <a:t> </a:t>
+            </a:r>
+          </a:p>
+          <a:p>
+            <a:r>
+              <a:rPr lang="en-US" dirty="0"/>
+              <a:t>“Overall, </a:t>
+            </a:r>
+            <a:r>
+              <a:rPr lang="en-US" b="1" dirty="0" err="1"/>
+              <a:t>TypeScript</a:t>
+            </a:r>
+            <a:r>
+              <a:rPr lang="en-US" b="1" dirty="0"/>
+              <a:t> is wonderful to work with</a:t>
+            </a:r>
+            <a:r>
+              <a:rPr lang="en-US" dirty="0"/>
+              <a:t>. It helps developers catch errors quickly, adds types and type-checking, and documents your progress so that if someone else wants to contribute, or you need to return to your work months later, you can easily pick up where you left off.” - </a:t>
+            </a:r>
+            <a:r>
+              <a:rPr lang="en-US" sz="1600" dirty="0">
+                <a:hlinkClick r:id="rId3"/>
+              </a:rPr>
+              <a:t>http://www.livetiles.nyc/blog/typescript-a-digital-workplace-success-story/</a:t>
+            </a:r>
+            <a:r>
+              <a:rPr lang="en-US" dirty="0"/>
+              <a:t> </a:t>
+            </a:r>
+          </a:p>
+          <a:p>
+            <a:r>
+              <a:rPr lang="en-US" dirty="0"/>
+              <a:t>“… we use </a:t>
+            </a:r>
+            <a:r>
+              <a:rPr lang="en-US" dirty="0" err="1"/>
+              <a:t>TypeScript</a:t>
+            </a:r>
+            <a:r>
+              <a:rPr lang="en-US" dirty="0"/>
+              <a:t> not because we’re part of Microsoft, but because we find tremendous value by </a:t>
+            </a:r>
+            <a:r>
+              <a:rPr lang="en-US" b="1" dirty="0"/>
+              <a:t>improving our productivity and keeping our quality high which together allow us to move much faster</a:t>
+            </a:r>
+            <a:r>
+              <a:rPr lang="en-US" dirty="0"/>
+              <a:t>.” - </a:t>
+            </a:r>
+            <a:r>
+              <a:rPr lang="en-US" sz="1600" dirty="0">
+                <a:hlinkClick r:id="rId4"/>
+              </a:rPr>
+              <a:t>https://medium.com/@delveeng/why-we-love-typescript-bec2df88d6c2#.pzp9xp7an</a:t>
+            </a:r>
+            <a:r>
+              <a:rPr lang="en-US" sz="1600" dirty="0"/>
+              <a:t> </a:t>
+            </a:r>
+          </a:p>
+          <a:p>
+            <a:pPr marL="0" indent="0">
+              <a:buNone/>
+            </a:pPr>
+            <a:endParaRPr lang="en-US" dirty="0"/>
+          </a:p>
+        </p:txBody>
+      </p:sp>
+      <p:sp>
+        <p:nvSpPr>
+          <p:cNvPr id="5" name="Title 1"/>
+          <p:cNvSpPr>
+            <a:spLocks noGrp="1"/>
+          </p:cNvSpPr>
+          <p:nvPr>
+            <p:ph type="title"/>
+          </p:nvPr>
+        </p:nvSpPr>
+        <p:spPr/>
+        <p:txBody>
+          <a:bodyPr/>
+          <a:lstStyle/>
+          <a:p>
+            <a:r>
+              <a:rPr lang="en-US" dirty="0"/>
+              <a:t>Why </a:t>
+            </a:r>
+            <a:r>
+              <a:rPr lang="en-US" dirty="0" err="1"/>
+              <a:t>TypeScript</a:t>
+            </a:r>
+            <a:r>
+              <a:rPr lang="en-US" dirty="0"/>
+              <a:t>?</a:t>
+            </a:r>
+          </a:p>
+        </p:txBody>
+      </p:sp>
+    </p:spTree>
+    <p:extLst>
+      <p:ext uri="{BB962C8B-B14F-4D97-AF65-F5344CB8AC3E}">
+        <p14:creationId xmlns:p14="http://schemas.microsoft.com/office/powerpoint/2010/main" val="2898318222"/>
+      </p:ext>
+    </p:extLst>
+  </p:cSld>
+  <p:clrMapOvr>
+    <a:masterClrMapping/>
+  </p:clrMapOvr>
+</p:sld>
+</file>
+
 <file path=ppt/slides/slide2.xml><?xml version="1.0" encoding="utf-8"?>
 <p:sld xmlns:a="http://schemas.openxmlformats.org/drawingml/2006/main" xmlns:r="http://schemas.openxmlformats.org/officeDocument/2006/relationships" xmlns:p="http://schemas.openxmlformats.org/presentationml/2006/main">
   <p:cSld>
@@ -7424,6 +8224,442 @@
           <a:p>
             <a:r>
               <a:rPr lang="en-US" dirty="0"/>
+              <a:t>Getting Started</a:t>
+            </a:r>
+          </a:p>
+        </p:txBody>
+      </p:sp>
+      <p:pic>
+        <p:nvPicPr>
+          <p:cNvPr id="5" name="Picture 2" descr="node.js"/>
+          <p:cNvPicPr>
+            <a:picLocks noGrp="1" noChangeAspect="1" noChangeArrowheads="1"/>
+          </p:cNvPicPr>
+          <p:nvPr>
+            <p:ph idx="1"/>
+          </p:nvPr>
+        </p:nvPicPr>
+        <p:blipFill>
+          <a:blip r:embed="rId2">
+            <a:extLst>
+              <a:ext uri="{28A0092B-C50C-407E-A947-70E740481C1C}">
+                <a14:useLocalDpi xmlns:a14="http://schemas.microsoft.com/office/drawing/2010/main" val="0"/>
+              </a:ext>
+            </a:extLst>
+          </a:blip>
+          <a:srcRect/>
+          <a:stretch>
+            <a:fillRect/>
+          </a:stretch>
+        </p:blipFill>
+        <p:spPr bwMode="auto">
+          <a:xfrm>
+            <a:off x="838199" y="1872453"/>
+            <a:ext cx="723315" cy="443094"/>
+          </a:xfrm>
+          <a:prstGeom prst="rect">
+            <a:avLst/>
+          </a:prstGeom>
+          <a:noFill/>
+          <a:effectLst>
+            <a:outerShdw blurRad="63500" sx="102000" sy="102000" algn="ctr" rotWithShape="0">
+              <a:prstClr val="black">
+                <a:alpha val="40000"/>
+              </a:prstClr>
+            </a:outerShdw>
+          </a:effectLst>
+          <a:extLst>
+            <a:ext uri="{909E8E84-426E-40DD-AFC4-6F175D3DCCD1}">
+              <a14:hiddenFill xmlns:a14="http://schemas.microsoft.com/office/drawing/2010/main">
+                <a:solidFill>
+                  <a:srgbClr val="FFFFFF"/>
+                </a:solidFill>
+              </a14:hiddenFill>
+            </a:ext>
+          </a:extLst>
+        </p:spPr>
+      </p:pic>
+      <p:pic>
+        <p:nvPicPr>
+          <p:cNvPr id="6" name="Picture 5"/>
+          <p:cNvPicPr>
+            <a:picLocks noChangeAspect="1"/>
+          </p:cNvPicPr>
+          <p:nvPr/>
+        </p:nvPicPr>
+        <p:blipFill>
+          <a:blip r:embed="rId3"/>
+          <a:stretch>
+            <a:fillRect/>
+          </a:stretch>
+        </p:blipFill>
+        <p:spPr>
+          <a:xfrm>
+            <a:off x="838199" y="2788808"/>
+            <a:ext cx="1712577" cy="389855"/>
+          </a:xfrm>
+          <a:prstGeom prst="rect">
+            <a:avLst/>
+          </a:prstGeom>
+        </p:spPr>
+      </p:pic>
+      <p:pic>
+        <p:nvPicPr>
+          <p:cNvPr id="7" name="Picture 4" descr="https://angularjs.org/img/AngularJS-large.png"/>
+          <p:cNvPicPr>
+            <a:picLocks noChangeAspect="1" noChangeArrowheads="1"/>
+          </p:cNvPicPr>
+          <p:nvPr/>
+        </p:nvPicPr>
+        <p:blipFill>
+          <a:blip r:embed="rId4">
+            <a:extLst>
+              <a:ext uri="{28A0092B-C50C-407E-A947-70E740481C1C}">
+                <a14:useLocalDpi xmlns:a14="http://schemas.microsoft.com/office/drawing/2010/main" val="0"/>
+              </a:ext>
+            </a:extLst>
+          </a:blip>
+          <a:srcRect/>
+          <a:stretch>
+            <a:fillRect/>
+          </a:stretch>
+        </p:blipFill>
+        <p:spPr bwMode="auto">
+          <a:xfrm>
+            <a:off x="838199" y="3651924"/>
+            <a:ext cx="1271686" cy="358596"/>
+          </a:xfrm>
+          <a:prstGeom prst="rect">
+            <a:avLst/>
+          </a:prstGeom>
+          <a:noFill/>
+          <a:extLst>
+            <a:ext uri="{909E8E84-426E-40DD-AFC4-6F175D3DCCD1}">
+              <a14:hiddenFill xmlns:a14="http://schemas.microsoft.com/office/drawing/2010/main">
+                <a:solidFill>
+                  <a:srgbClr val="FFFFFF"/>
+                </a:solidFill>
+              </a14:hiddenFill>
+            </a:ext>
+          </a:extLst>
+        </p:spPr>
+      </p:pic>
+      <p:sp>
+        <p:nvSpPr>
+          <p:cNvPr id="8" name="TextBox 7"/>
+          <p:cNvSpPr txBox="1"/>
+          <p:nvPr/>
+        </p:nvSpPr>
+        <p:spPr>
+          <a:xfrm>
+            <a:off x="2821049" y="2019096"/>
+            <a:ext cx="2040880" cy="369332"/>
+          </a:xfrm>
+          <a:prstGeom prst="rect">
+            <a:avLst/>
+          </a:prstGeom>
+          <a:noFill/>
+        </p:spPr>
+        <p:txBody>
+          <a:bodyPr wrap="none" rtlCol="0">
+            <a:spAutoFit/>
+          </a:bodyPr>
+          <a:lstStyle/>
+          <a:p>
+            <a:r>
+              <a:rPr lang="en-US" dirty="0">
+                <a:hlinkClick r:id="rId5"/>
+              </a:rPr>
+              <a:t>https://nodejs.org/</a:t>
+            </a:r>
+            <a:r>
+              <a:rPr lang="en-US" dirty="0"/>
+              <a:t> </a:t>
+            </a:r>
+          </a:p>
+        </p:txBody>
+      </p:sp>
+      <p:sp>
+        <p:nvSpPr>
+          <p:cNvPr id="9" name="TextBox 8"/>
+          <p:cNvSpPr txBox="1"/>
+          <p:nvPr/>
+        </p:nvSpPr>
+        <p:spPr>
+          <a:xfrm>
+            <a:off x="2821049" y="2809331"/>
+            <a:ext cx="3124445" cy="369332"/>
+          </a:xfrm>
+          <a:prstGeom prst="rect">
+            <a:avLst/>
+          </a:prstGeom>
+          <a:noFill/>
+        </p:spPr>
+        <p:txBody>
+          <a:bodyPr wrap="none" rtlCol="0">
+            <a:spAutoFit/>
+          </a:bodyPr>
+          <a:lstStyle/>
+          <a:p>
+            <a:r>
+              <a:rPr lang="en-US" dirty="0">
+                <a:hlinkClick r:id="rId5"/>
+              </a:rPr>
+              <a:t>https://code.visualstudio.com/</a:t>
+            </a:r>
+            <a:r>
+              <a:rPr lang="en-US" dirty="0"/>
+              <a:t> </a:t>
+            </a:r>
+          </a:p>
+        </p:txBody>
+      </p:sp>
+      <p:sp>
+        <p:nvSpPr>
+          <p:cNvPr id="10" name="TextBox 9"/>
+          <p:cNvSpPr txBox="1"/>
+          <p:nvPr/>
+        </p:nvSpPr>
+        <p:spPr>
+          <a:xfrm>
+            <a:off x="2821049" y="3641188"/>
+            <a:ext cx="1962140" cy="369332"/>
+          </a:xfrm>
+          <a:prstGeom prst="rect">
+            <a:avLst/>
+          </a:prstGeom>
+          <a:noFill/>
+        </p:spPr>
+        <p:txBody>
+          <a:bodyPr wrap="none" rtlCol="0">
+            <a:spAutoFit/>
+          </a:bodyPr>
+          <a:lstStyle/>
+          <a:p>
+            <a:r>
+              <a:rPr lang="en-US" dirty="0">
+                <a:hlinkClick r:id="rId6"/>
+              </a:rPr>
+              <a:t>https://angular.io/</a:t>
+            </a:r>
+            <a:r>
+              <a:rPr lang="en-US" dirty="0"/>
+              <a:t> </a:t>
+            </a:r>
+          </a:p>
+        </p:txBody>
+      </p:sp>
+      <p:pic>
+        <p:nvPicPr>
+          <p:cNvPr id="4" name="Picture 3"/>
+          <p:cNvPicPr>
+            <a:picLocks noChangeAspect="1"/>
+          </p:cNvPicPr>
+          <p:nvPr/>
+        </p:nvPicPr>
+        <p:blipFill>
+          <a:blip r:embed="rId7"/>
+          <a:stretch>
+            <a:fillRect/>
+          </a:stretch>
+        </p:blipFill>
+        <p:spPr>
+          <a:xfrm>
+            <a:off x="838199" y="5320922"/>
+            <a:ext cx="1489719" cy="490039"/>
+          </a:xfrm>
+          <a:prstGeom prst="rect">
+            <a:avLst/>
+          </a:prstGeom>
+        </p:spPr>
+      </p:pic>
+      <p:sp>
+        <p:nvSpPr>
+          <p:cNvPr id="11" name="TextBox 10"/>
+          <p:cNvSpPr txBox="1"/>
+          <p:nvPr/>
+        </p:nvSpPr>
+        <p:spPr>
+          <a:xfrm>
+            <a:off x="2821049" y="4473045"/>
+            <a:ext cx="4431470" cy="369332"/>
+          </a:xfrm>
+          <a:prstGeom prst="rect">
+            <a:avLst/>
+          </a:prstGeom>
+          <a:noFill/>
+        </p:spPr>
+        <p:txBody>
+          <a:bodyPr wrap="none" rtlCol="0">
+            <a:spAutoFit/>
+          </a:bodyPr>
+          <a:lstStyle/>
+          <a:p>
+            <a:r>
+              <a:rPr lang="en-US" dirty="0">
+                <a:hlinkClick r:id="rId8"/>
+              </a:rPr>
+              <a:t>https://www.docker.com/products/overview</a:t>
+            </a:r>
+            <a:r>
+              <a:rPr lang="en-US" dirty="0"/>
+              <a:t> </a:t>
+            </a:r>
+          </a:p>
+        </p:txBody>
+      </p:sp>
+      <p:pic>
+        <p:nvPicPr>
+          <p:cNvPr id="12" name="Picture 11"/>
+          <p:cNvPicPr>
+            <a:picLocks noChangeAspect="1"/>
+          </p:cNvPicPr>
+          <p:nvPr/>
+        </p:nvPicPr>
+        <p:blipFill>
+          <a:blip r:embed="rId9"/>
+          <a:stretch>
+            <a:fillRect/>
+          </a:stretch>
+        </p:blipFill>
+        <p:spPr>
+          <a:xfrm>
+            <a:off x="838199" y="4483781"/>
+            <a:ext cx="1307501" cy="363880"/>
+          </a:xfrm>
+          <a:prstGeom prst="rect">
+            <a:avLst/>
+          </a:prstGeom>
+        </p:spPr>
+      </p:pic>
+      <p:sp>
+        <p:nvSpPr>
+          <p:cNvPr id="13" name="TextBox 12"/>
+          <p:cNvSpPr txBox="1"/>
+          <p:nvPr/>
+        </p:nvSpPr>
+        <p:spPr>
+          <a:xfrm>
+            <a:off x="2821049" y="5441629"/>
+            <a:ext cx="3751155" cy="369332"/>
+          </a:xfrm>
+          <a:prstGeom prst="rect">
+            <a:avLst/>
+          </a:prstGeom>
+          <a:noFill/>
+        </p:spPr>
+        <p:txBody>
+          <a:bodyPr wrap="none" rtlCol="0">
+            <a:spAutoFit/>
+          </a:bodyPr>
+          <a:lstStyle/>
+          <a:p>
+            <a:r>
+              <a:rPr lang="en-US" dirty="0">
+                <a:hlinkClick r:id="rId10"/>
+              </a:rPr>
+              <a:t>https://www.microsoft.com/net/core</a:t>
+            </a:r>
+            <a:r>
+              <a:rPr lang="en-US" dirty="0"/>
+              <a:t> </a:t>
+            </a:r>
+          </a:p>
+        </p:txBody>
+      </p:sp>
+      <p:sp>
+        <p:nvSpPr>
+          <p:cNvPr id="14" name="TextBox 13"/>
+          <p:cNvSpPr txBox="1"/>
+          <p:nvPr/>
+        </p:nvSpPr>
+        <p:spPr>
+          <a:xfrm>
+            <a:off x="5387265" y="1949055"/>
+            <a:ext cx="3730508" cy="369332"/>
+          </a:xfrm>
+          <a:prstGeom prst="rect">
+            <a:avLst/>
+          </a:prstGeom>
+          <a:noFill/>
+        </p:spPr>
+        <p:txBody>
+          <a:bodyPr wrap="none" rtlCol="0">
+            <a:spAutoFit/>
+          </a:bodyPr>
+          <a:lstStyle/>
+          <a:p>
+            <a:r>
+              <a:rPr lang="en-US" dirty="0" err="1">
+                <a:latin typeface="Consolas" panose="020B0609020204030204" pitchFamily="49" charset="0"/>
+              </a:rPr>
+              <a:t>npm</a:t>
+            </a:r>
+            <a:r>
+              <a:rPr lang="en-US" dirty="0">
+                <a:latin typeface="Consolas" panose="020B0609020204030204" pitchFamily="49" charset="0"/>
+              </a:rPr>
+              <a:t> –i –g </a:t>
+            </a:r>
+            <a:r>
+              <a:rPr lang="en-US" dirty="0" err="1">
+                <a:latin typeface="Consolas" panose="020B0609020204030204" pitchFamily="49" charset="0"/>
+              </a:rPr>
+              <a:t>angular-cli@latest</a:t>
+            </a:r>
+            <a:endParaRPr lang="en-US" dirty="0">
+              <a:latin typeface="Consolas" panose="020B0609020204030204" pitchFamily="49" charset="0"/>
+            </a:endParaRPr>
+          </a:p>
+        </p:txBody>
+      </p:sp>
+    </p:spTree>
+    <p:extLst>
+      <p:ext uri="{BB962C8B-B14F-4D97-AF65-F5344CB8AC3E}">
+        <p14:creationId xmlns:p14="http://schemas.microsoft.com/office/powerpoint/2010/main" val="2342540739"/>
+      </p:ext>
+    </p:extLst>
+  </p:cSld>
+  <p:clrMapOvr>
+    <a:masterClrMapping/>
+  </p:clrMapOvr>
+</p:sld>
+</file>
+
+<file path=ppt/slides/slide3.xml><?xml version="1.0" encoding="utf-8"?>
+<p:sld xmlns:a="http://schemas.openxmlformats.org/drawingml/2006/main" xmlns:r="http://schemas.openxmlformats.org/officeDocument/2006/relationships" xmlns:p="http://schemas.openxmlformats.org/presentationml/2006/main">
+  <p:cSld>
+    <p:spTree>
+      <p:nvGrpSpPr>
+        <p:cNvPr id="1" name=""/>
+        <p:cNvGrpSpPr/>
+        <p:nvPr/>
+      </p:nvGrpSpPr>
+      <p:grpSpPr>
+        <a:xfrm>
+          <a:off x="0" y="0"/>
+          <a:ext cx="0" cy="0"/>
+          <a:chOff x="0" y="0"/>
+          <a:chExt cx="0" cy="0"/>
+        </a:xfrm>
+      </p:grpSpPr>
+      <p:sp>
+        <p:nvSpPr>
+          <p:cNvPr id="2" name="Title 1"/>
+          <p:cNvSpPr>
+            <a:spLocks noGrp="1"/>
+          </p:cNvSpPr>
+          <p:nvPr>
+            <p:ph type="title"/>
+          </p:nvPr>
+        </p:nvSpPr>
+        <p:spPr/>
+        <p:txBody>
+          <a:bodyPr/>
+          <a:lstStyle/>
+          <a:p>
+            <a:r>
+              <a:rPr lang="en-US" dirty="0"/>
               <a:t>Trainer Info</a:t>
             </a:r>
           </a:p>
@@ -7495,7 +8731,7 @@
               <a:rPr lang="en-US" dirty="0">
                 <a:hlinkClick r:id="rId4"/>
               </a:rPr>
-              <a:t>http://www.ivision.com</a:t>
+              <a:t>http://bit.ly/ivisionappdev</a:t>
             </a:r>
             <a:r>
               <a:rPr lang="en-US" dirty="0"/>
@@ -7637,7 +8873,7 @@
 </p:sld>
 </file>
 
-<file path=ppt/slides/slide3.xml><?xml version="1.0" encoding="utf-8"?>
+<file path=ppt/slides/slide4.xml><?xml version="1.0" encoding="utf-8"?>
 <p:sld xmlns:a="http://schemas.openxmlformats.org/drawingml/2006/main" xmlns:r="http://schemas.openxmlformats.org/officeDocument/2006/relationships" xmlns:p="http://schemas.openxmlformats.org/presentationml/2006/main">
   <p:cSld>
     <p:spTree>
@@ -7741,140 +8977,6 @@
 </p:sld>
 </file>
 
-<file path=ppt/slides/slide4.xml><?xml version="1.0" encoding="utf-8"?>
-<p:sld xmlns:a="http://schemas.openxmlformats.org/drawingml/2006/main" xmlns:r="http://schemas.openxmlformats.org/officeDocument/2006/relationships" xmlns:p="http://schemas.openxmlformats.org/presentationml/2006/main">
-  <p:cSld>
-    <p:spTree>
-      <p:nvGrpSpPr>
-        <p:cNvPr id="1" name=""/>
-        <p:cNvGrpSpPr/>
-        <p:nvPr/>
-      </p:nvGrpSpPr>
-      <p:grpSpPr>
-        <a:xfrm>
-          <a:off x="0" y="0"/>
-          <a:ext cx="0" cy="0"/>
-          <a:chOff x="0" y="0"/>
-          <a:chExt cx="0" cy="0"/>
-        </a:xfrm>
-      </p:grpSpPr>
-      <p:sp>
-        <p:nvSpPr>
-          <p:cNvPr id="2" name="Title 1"/>
-          <p:cNvSpPr>
-            <a:spLocks noGrp="1"/>
-          </p:cNvSpPr>
-          <p:nvPr>
-            <p:ph type="title"/>
-          </p:nvPr>
-        </p:nvSpPr>
-        <p:spPr/>
-        <p:txBody>
-          <a:bodyPr/>
-          <a:lstStyle/>
-          <a:p>
-            <a:r>
-              <a:rPr lang="en-US" dirty="0"/>
-              <a:t>My (Experience-Based) Bias</a:t>
-            </a:r>
-          </a:p>
-        </p:txBody>
-      </p:sp>
-      <p:sp>
-        <p:nvSpPr>
-          <p:cNvPr id="3" name="Content Placeholder 2"/>
-          <p:cNvSpPr>
-            <a:spLocks noGrp="1"/>
-          </p:cNvSpPr>
-          <p:nvPr>
-            <p:ph idx="1"/>
-          </p:nvPr>
-        </p:nvSpPr>
-        <p:spPr/>
-        <p:txBody>
-          <a:bodyPr/>
-          <a:lstStyle/>
-          <a:p>
-            <a:r>
-              <a:rPr lang="en-US" dirty="0"/>
-              <a:t>Working on Angular since 2011 </a:t>
-            </a:r>
-          </a:p>
-          <a:p>
-            <a:r>
-              <a:rPr lang="en-US" dirty="0"/>
-              <a:t>Example project:</a:t>
-            </a:r>
-          </a:p>
-          <a:p>
-            <a:pPr lvl="1"/>
-            <a:r>
-              <a:rPr lang="en-US" dirty="0"/>
-              <a:t>25 developers</a:t>
-            </a:r>
-          </a:p>
-          <a:p>
-            <a:pPr lvl="1"/>
-            <a:r>
-              <a:rPr lang="en-US" dirty="0"/>
-              <a:t>Global parallel development team</a:t>
-            </a:r>
-          </a:p>
-          <a:p>
-            <a:pPr lvl="1"/>
-            <a:r>
-              <a:rPr lang="en-US" dirty="0"/>
-              <a:t>Almost 100,000 lines of </a:t>
-            </a:r>
-            <a:r>
-              <a:rPr lang="en-US" dirty="0" err="1"/>
-              <a:t>TypeScript</a:t>
-            </a:r>
-            <a:r>
-              <a:rPr lang="en-US" dirty="0"/>
-              <a:t> code </a:t>
-            </a:r>
-          </a:p>
-          <a:p>
-            <a:pPr lvl="1"/>
-            <a:r>
-              <a:rPr lang="en-US" dirty="0"/>
-              <a:t>Over 200 components </a:t>
-            </a:r>
-          </a:p>
-          <a:p>
-            <a:pPr lvl="1"/>
-            <a:r>
-              <a:rPr lang="en-US" dirty="0"/>
-              <a:t>3 years of development</a:t>
-            </a:r>
-          </a:p>
-          <a:p>
-            <a:pPr lvl="1"/>
-            <a:r>
-              <a:rPr lang="en-US" dirty="0">
-                <a:solidFill>
-                  <a:srgbClr val="FF0000"/>
-                </a:solidFill>
-              </a:rPr>
-              <a:t>4x improvement</a:t>
-            </a:r>
-          </a:p>
-        </p:txBody>
-      </p:sp>
-    </p:spTree>
-    <p:extLst>
-      <p:ext uri="{BB962C8B-B14F-4D97-AF65-F5344CB8AC3E}">
-        <p14:creationId xmlns:p14="http://schemas.microsoft.com/office/powerpoint/2010/main" val="602931345"/>
-      </p:ext>
-    </p:extLst>
-  </p:cSld>
-  <p:clrMapOvr>
-    <a:masterClrMapping/>
-  </p:clrMapOvr>
-</p:sld>
-</file>
-
 <file path=ppt/slides/slide5.xml><?xml version="1.0" encoding="utf-8"?>
 <p:sld xmlns:a="http://schemas.openxmlformats.org/drawingml/2006/main" xmlns:r="http://schemas.openxmlformats.org/officeDocument/2006/relationships" xmlns:p="http://schemas.openxmlformats.org/presentationml/2006/main">
   <p:cSld>
@@ -7909,7 +9011,7 @@
           <a:p>
             <a:r>
               <a:rPr lang="en-US" dirty="0"/>
-              <a:t>4x Improvement</a:t>
+              <a:t>My (Experience-Based) Bias</a:t>
             </a:r>
           </a:p>
         </p:txBody>
@@ -7931,13 +9033,34 @@
           <a:p>
             <a:r>
               <a:rPr lang="en-US" dirty="0"/>
-              <a:t>6 months spent with JavaScript and Knockout.js </a:t>
-            </a:r>
-          </a:p>
-          <a:p>
-            <a:r>
-              <a:rPr lang="en-US" dirty="0"/>
-              <a:t>Changed to Angular and </a:t>
+              <a:t>Working on Angular since 2011 </a:t>
+            </a:r>
+          </a:p>
+          <a:p>
+            <a:r>
+              <a:rPr lang="en-US" dirty="0"/>
+              <a:t>Example project:</a:t>
+            </a:r>
+          </a:p>
+          <a:p>
+            <a:pPr lvl="1"/>
+            <a:r>
+              <a:rPr lang="en-US" dirty="0"/>
+              <a:t>25 developers</a:t>
+            </a:r>
+          </a:p>
+          <a:p>
+            <a:pPr lvl="1"/>
+            <a:r>
+              <a:rPr lang="en-US" dirty="0"/>
+              <a:t>Global parallel development team</a:t>
+            </a:r>
+          </a:p>
+          <a:p>
+            <a:pPr lvl="1"/>
+            <a:r>
+              <a:rPr lang="en-US" dirty="0"/>
+              <a:t>Almost 100,000 lines of </a:t>
             </a:r>
             <a:r>
               <a:rPr lang="en-US" dirty="0" err="1"/>
@@ -7945,48 +9068,32 @@
             </a:r>
             <a:r>
               <a:rPr lang="en-US" dirty="0"/>
-              <a:t> based on spike </a:t>
-            </a:r>
-          </a:p>
-          <a:p>
-            <a:r>
-              <a:rPr lang="en-US" dirty="0"/>
-              <a:t>4x development</a:t>
+              <a:t> code </a:t>
             </a:r>
           </a:p>
           <a:p>
             <a:pPr lvl="1"/>
             <a:r>
               <a:rPr lang="en-US" dirty="0"/>
-              <a:t>Modular approach </a:t>
+              <a:t>Over 200 components </a:t>
             </a:r>
           </a:p>
           <a:p>
             <a:pPr lvl="1"/>
             <a:r>
               <a:rPr lang="en-US" dirty="0"/>
-              <a:t>Testability </a:t>
+              <a:t>3 years of development</a:t>
             </a:r>
           </a:p>
           <a:p>
             <a:pPr lvl="1"/>
             <a:r>
-              <a:rPr lang="en-US" dirty="0"/>
-              <a:t>Discoverability </a:t>
-            </a:r>
-          </a:p>
-          <a:p>
-            <a:pPr lvl="1"/>
-            <a:r>
-              <a:rPr lang="en-US" dirty="0"/>
-              <a:t>Type-safety </a:t>
-            </a:r>
-          </a:p>
-          <a:p>
-            <a:pPr lvl="1"/>
-            <a:r>
-              <a:rPr lang="en-US" dirty="0"/>
-              <a:t>Maintainability </a:t>
+              <a:rPr lang="en-US" dirty="0">
+                <a:solidFill>
+                  <a:srgbClr val="FF0000"/>
+                </a:solidFill>
+              </a:rPr>
+              <a:t>4x improvement</a:t>
             </a:r>
           </a:p>
         </p:txBody>
@@ -7994,7 +9101,7 @@
     </p:spTree>
     <p:extLst>
       <p:ext uri="{BB962C8B-B14F-4D97-AF65-F5344CB8AC3E}">
-        <p14:creationId xmlns:p14="http://schemas.microsoft.com/office/powerpoint/2010/main" val="249612562"/>
+        <p14:creationId xmlns:p14="http://schemas.microsoft.com/office/powerpoint/2010/main" val="602931345"/>
       </p:ext>
     </p:extLst>
   </p:cSld>
@@ -8038,6 +9145,135 @@
           <a:p>
             <a:r>
               <a:rPr lang="en-US" dirty="0"/>
+              <a:t>4x Improvement</a:t>
+            </a:r>
+          </a:p>
+        </p:txBody>
+      </p:sp>
+      <p:sp>
+        <p:nvSpPr>
+          <p:cNvPr id="3" name="Content Placeholder 2"/>
+          <p:cNvSpPr>
+            <a:spLocks noGrp="1"/>
+          </p:cNvSpPr>
+          <p:nvPr>
+            <p:ph idx="1"/>
+          </p:nvPr>
+        </p:nvSpPr>
+        <p:spPr/>
+        <p:txBody>
+          <a:bodyPr/>
+          <a:lstStyle/>
+          <a:p>
+            <a:r>
+              <a:rPr lang="en-US" dirty="0"/>
+              <a:t>6 months spent with JavaScript and Knockout.js </a:t>
+            </a:r>
+          </a:p>
+          <a:p>
+            <a:r>
+              <a:rPr lang="en-US" dirty="0"/>
+              <a:t>Changed to Angular and </a:t>
+            </a:r>
+            <a:r>
+              <a:rPr lang="en-US" dirty="0" err="1"/>
+              <a:t>TypeScript</a:t>
+            </a:r>
+            <a:r>
+              <a:rPr lang="en-US" dirty="0"/>
+              <a:t> based on spike </a:t>
+            </a:r>
+          </a:p>
+          <a:p>
+            <a:r>
+              <a:rPr lang="en-US" dirty="0"/>
+              <a:t>4x development</a:t>
+            </a:r>
+          </a:p>
+          <a:p>
+            <a:pPr lvl="1"/>
+            <a:r>
+              <a:rPr lang="en-US" dirty="0"/>
+              <a:t>Modular approach </a:t>
+            </a:r>
+          </a:p>
+          <a:p>
+            <a:pPr lvl="1"/>
+            <a:r>
+              <a:rPr lang="en-US" dirty="0"/>
+              <a:t>Testability </a:t>
+            </a:r>
+          </a:p>
+          <a:p>
+            <a:pPr lvl="1"/>
+            <a:r>
+              <a:rPr lang="en-US" dirty="0"/>
+              <a:t>Discoverability </a:t>
+            </a:r>
+          </a:p>
+          <a:p>
+            <a:pPr lvl="1"/>
+            <a:r>
+              <a:rPr lang="en-US" dirty="0"/>
+              <a:t>Type-safety </a:t>
+            </a:r>
+          </a:p>
+          <a:p>
+            <a:pPr lvl="1"/>
+            <a:r>
+              <a:rPr lang="en-US" dirty="0"/>
+              <a:t>Maintainability </a:t>
+            </a:r>
+          </a:p>
+        </p:txBody>
+      </p:sp>
+    </p:spTree>
+    <p:extLst>
+      <p:ext uri="{BB962C8B-B14F-4D97-AF65-F5344CB8AC3E}">
+        <p14:creationId xmlns:p14="http://schemas.microsoft.com/office/powerpoint/2010/main" val="249612562"/>
+      </p:ext>
+    </p:extLst>
+  </p:cSld>
+  <p:clrMapOvr>
+    <a:masterClrMapping/>
+  </p:clrMapOvr>
+</p:sld>
+</file>
+
+<file path=ppt/slides/slide7.xml><?xml version="1.0" encoding="utf-8"?>
+<p:sld xmlns:a="http://schemas.openxmlformats.org/drawingml/2006/main" xmlns:r="http://schemas.openxmlformats.org/officeDocument/2006/relationships" xmlns:p="http://schemas.openxmlformats.org/presentationml/2006/main">
+  <p:cSld>
+    <p:spTree>
+      <p:nvGrpSpPr>
+        <p:cNvPr id="1" name=""/>
+        <p:cNvGrpSpPr/>
+        <p:nvPr/>
+      </p:nvGrpSpPr>
+      <p:grpSpPr>
+        <a:xfrm>
+          <a:off x="0" y="0"/>
+          <a:ext cx="0" cy="0"/>
+          <a:chOff x="0" y="0"/>
+          <a:chExt cx="0" cy="0"/>
+        </a:xfrm>
+      </p:grpSpPr>
+      <p:sp>
+        <p:nvSpPr>
+          <p:cNvPr id="2" name="Title 1"/>
+          <p:cNvSpPr>
+            <a:spLocks noGrp="1"/>
+          </p:cNvSpPr>
+          <p:nvPr>
+            <p:ph type="title"/>
+          </p:nvPr>
+        </p:nvSpPr>
+        <p:spPr/>
+        <p:txBody>
+          <a:bodyPr/>
+          <a:lstStyle/>
+          <a:p>
+            <a:r>
+              <a:rPr lang="en-US" dirty="0"/>
               <a:t>What?</a:t>
             </a:r>
           </a:p>
@@ -8164,7 +9400,7 @@
 </p:sld>
 </file>
 
-<file path=ppt/slides/slide7.xml><?xml version="1.0" encoding="utf-8"?>
+<file path=ppt/slides/slide8.xml><?xml version="1.0" encoding="utf-8"?>
 <p:sld xmlns:a="http://schemas.openxmlformats.org/drawingml/2006/main" xmlns:r="http://schemas.openxmlformats.org/officeDocument/2006/relationships" xmlns:p="http://schemas.openxmlformats.org/presentationml/2006/main">
   <p:cSld>
     <p:spTree>
@@ -8403,7 +9639,7 @@
 </p:sld>
 </file>
 
-<file path=ppt/slides/slide8.xml><?xml version="1.0" encoding="utf-8"?>
+<file path=ppt/slides/slide9.xml><?xml version="1.0" encoding="utf-8"?>
 <p:sld xmlns:a="http://schemas.openxmlformats.org/drawingml/2006/main" xmlns:r="http://schemas.openxmlformats.org/officeDocument/2006/relationships" xmlns:p="http://schemas.openxmlformats.org/presentationml/2006/main">
   <p:cSld>
     <p:spTree>
@@ -8624,242 +9860,6 @@
     <p:extLst>
       <p:ext uri="{BB962C8B-B14F-4D97-AF65-F5344CB8AC3E}">
         <p14:creationId xmlns:p14="http://schemas.microsoft.com/office/powerpoint/2010/main" val="2755280173"/>
-      </p:ext>
-    </p:extLst>
-  </p:cSld>
-  <p:clrMapOvr>
-    <a:masterClrMapping/>
-  </p:clrMapOvr>
-</p:sld>
-</file>
-
-<file path=ppt/slides/slide9.xml><?xml version="1.0" encoding="utf-8"?>
-<p:sld xmlns:a="http://schemas.openxmlformats.org/drawingml/2006/main" xmlns:r="http://schemas.openxmlformats.org/officeDocument/2006/relationships" xmlns:p="http://schemas.openxmlformats.org/presentationml/2006/main">
-  <p:cSld>
-    <p:spTree>
-      <p:nvGrpSpPr>
-        <p:cNvPr id="1" name=""/>
-        <p:cNvGrpSpPr/>
-        <p:nvPr/>
-      </p:nvGrpSpPr>
-      <p:grpSpPr>
-        <a:xfrm>
-          <a:off x="0" y="0"/>
-          <a:ext cx="0" cy="0"/>
-          <a:chOff x="0" y="0"/>
-          <a:chExt cx="0" cy="0"/>
-        </a:xfrm>
-      </p:grpSpPr>
-      <p:sp>
-        <p:nvSpPr>
-          <p:cNvPr id="2" name="Title 1"/>
-          <p:cNvSpPr>
-            <a:spLocks noGrp="1"/>
-          </p:cNvSpPr>
-          <p:nvPr>
-            <p:ph type="title"/>
-          </p:nvPr>
-        </p:nvSpPr>
-        <p:spPr/>
-        <p:txBody>
-          <a:bodyPr/>
-          <a:lstStyle/>
-          <a:p>
-            <a:r>
-              <a:rPr lang="en-US" dirty="0"/>
-              <a:t>Dependency Injection</a:t>
-            </a:r>
-          </a:p>
-        </p:txBody>
-      </p:sp>
-      <p:sp>
-        <p:nvSpPr>
-          <p:cNvPr id="3" name="Content Placeholder 2"/>
-          <p:cNvSpPr>
-            <a:spLocks noGrp="1"/>
-          </p:cNvSpPr>
-          <p:nvPr>
-            <p:ph idx="1"/>
-          </p:nvPr>
-        </p:nvSpPr>
-        <p:spPr/>
-        <p:txBody>
-          <a:bodyPr/>
-          <a:lstStyle/>
-          <a:p>
-            <a:r>
-              <a:rPr lang="en-US" dirty="0"/>
-              <a:t>Provider model</a:t>
-            </a:r>
-          </a:p>
-          <a:p>
-            <a:r>
-              <a:rPr lang="en-US" dirty="0"/>
-              <a:t>Hierarchical </a:t>
-            </a:r>
-          </a:p>
-          <a:p>
-            <a:r>
-              <a:rPr lang="en-US" dirty="0"/>
-              <a:t>Mock services</a:t>
-            </a:r>
-          </a:p>
-          <a:p>
-            <a:r>
-              <a:rPr lang="en-US" dirty="0"/>
-              <a:t>Scope services</a:t>
-            </a:r>
-          </a:p>
-          <a:p>
-            <a:r>
-              <a:rPr lang="en-US" dirty="0"/>
-              <a:t>Control lifetime</a:t>
-            </a:r>
-          </a:p>
-        </p:txBody>
-      </p:sp>
-      <p:grpSp>
-        <p:nvGrpSpPr>
-          <p:cNvPr id="4" name="Group 3"/>
-          <p:cNvGrpSpPr/>
-          <p:nvPr/>
-        </p:nvGrpSpPr>
-        <p:grpSpPr>
-          <a:xfrm>
-            <a:off x="10023678" y="360566"/>
-            <a:ext cx="1330122" cy="1330122"/>
-            <a:chOff x="6407349" y="2797441"/>
-            <a:chExt cx="1330122" cy="1330122"/>
-          </a:xfrm>
-        </p:grpSpPr>
-        <p:sp>
-          <p:nvSpPr>
-            <p:cNvPr id="5" name="Oval 4"/>
-            <p:cNvSpPr/>
-            <p:nvPr/>
-          </p:nvSpPr>
-          <p:spPr>
-            <a:xfrm>
-              <a:off x="6407349" y="2797441"/>
-              <a:ext cx="1330122" cy="1330122"/>
-            </a:xfrm>
-            <a:prstGeom prst="ellipse">
-              <a:avLst/>
-            </a:prstGeom>
-          </p:spPr>
-          <p:style>
-            <a:lnRef idx="2">
-              <a:schemeClr val="lt1">
-                <a:hueOff val="0"/>
-                <a:satOff val="0"/>
-                <a:lumOff val="0"/>
-                <a:alphaOff val="0"/>
-              </a:schemeClr>
-            </a:lnRef>
-            <a:fillRef idx="1">
-              <a:schemeClr val="accent4">
-                <a:hueOff val="4158277"/>
-                <a:satOff val="-19187"/>
-                <a:lumOff val="706"/>
-                <a:alphaOff val="0"/>
-              </a:schemeClr>
-            </a:fillRef>
-            <a:effectRef idx="0">
-              <a:schemeClr val="accent4">
-                <a:hueOff val="4158277"/>
-                <a:satOff val="-19187"/>
-                <a:lumOff val="706"/>
-                <a:alphaOff val="0"/>
-              </a:schemeClr>
-            </a:effectRef>
-            <a:fontRef idx="minor">
-              <a:schemeClr val="lt1"/>
-            </a:fontRef>
-          </p:style>
-        </p:sp>
-        <p:sp>
-          <p:nvSpPr>
-            <p:cNvPr id="6" name="Oval 4"/>
-            <p:cNvSpPr txBox="1"/>
-            <p:nvPr/>
-          </p:nvSpPr>
-          <p:spPr>
-            <a:xfrm>
-              <a:off x="6602141" y="2992233"/>
-              <a:ext cx="940538" cy="940538"/>
-            </a:xfrm>
-            <a:prstGeom prst="rect">
-              <a:avLst/>
-            </a:prstGeom>
-          </p:spPr>
-          <p:style>
-            <a:lnRef idx="0">
-              <a:scrgbClr r="0" g="0" b="0"/>
-            </a:lnRef>
-            <a:fillRef idx="0">
-              <a:scrgbClr r="0" g="0" b="0"/>
-            </a:fillRef>
-            <a:effectRef idx="0">
-              <a:scrgbClr r="0" g="0" b="0"/>
-            </a:effectRef>
-            <a:fontRef idx="minor">
-              <a:schemeClr val="lt1"/>
-            </a:fontRef>
-          </p:style>
-          <p:txBody>
-            <a:bodyPr spcFirstLastPara="0" vert="horz" wrap="square" lIns="16510" tIns="16510" rIns="16510" bIns="16510" numCol="1" spcCol="1270" anchor="ctr" anchorCtr="0">
-              <a:noAutofit/>
-            </a:bodyPr>
-            <a:lstStyle/>
-            <a:p>
-              <a:pPr marL="0" lvl="0" indent="0" algn="ctr" defTabSz="577850">
-                <a:lnSpc>
-                  <a:spcPct val="90000"/>
-                </a:lnSpc>
-                <a:spcBef>
-                  <a:spcPct val="0"/>
-                </a:spcBef>
-                <a:spcAft>
-                  <a:spcPct val="35000"/>
-                </a:spcAft>
-                <a:buNone/>
-              </a:pPr>
-              <a:r>
-                <a:rPr lang="en-US" sz="1300" kern="1200" dirty="0"/>
-                <a:t>Dependency Injection</a:t>
-              </a:r>
-            </a:p>
-          </p:txBody>
-        </p:sp>
-      </p:grpSp>
-      <p:pic>
-        <p:nvPicPr>
-          <p:cNvPr id="7" name="Picture 6"/>
-          <p:cNvPicPr>
-            <a:picLocks noChangeAspect="1"/>
-          </p:cNvPicPr>
-          <p:nvPr/>
-        </p:nvPicPr>
-        <p:blipFill>
-          <a:blip r:embed="rId2"/>
-          <a:stretch>
-            <a:fillRect/>
-          </a:stretch>
-        </p:blipFill>
-        <p:spPr>
-          <a:xfrm>
-            <a:off x="4284757" y="1979296"/>
-            <a:ext cx="6874251" cy="4197667"/>
-          </a:xfrm>
-          <a:prstGeom prst="rect">
-            <a:avLst/>
-          </a:prstGeom>
-        </p:spPr>
-      </p:pic>
-    </p:spTree>
-    <p:extLst>
-      <p:ext uri="{BB962C8B-B14F-4D97-AF65-F5344CB8AC3E}">
-        <p14:creationId xmlns:p14="http://schemas.microsoft.com/office/powerpoint/2010/main" val="3879670532"/>
       </p:ext>
     </p:extLst>
   </p:cSld>

</xml_diff>

<commit_message>
Readme and pwrpnt updates
</commit_message>
<xml_diff>
--- a/00Intro/ng2.pptx
+++ b/00Intro/ng2.pptx
@@ -8,21 +8,22 @@
     <p:sldId id="256" r:id="rId2"/>
     <p:sldId id="270" r:id="rId3"/>
     <p:sldId id="257" r:id="rId4"/>
-    <p:sldId id="258" r:id="rId5"/>
-    <p:sldId id="259" r:id="rId6"/>
-    <p:sldId id="260" r:id="rId7"/>
-    <p:sldId id="261" r:id="rId8"/>
-    <p:sldId id="262" r:id="rId9"/>
-    <p:sldId id="263" r:id="rId10"/>
-    <p:sldId id="264" r:id="rId11"/>
-    <p:sldId id="265" r:id="rId12"/>
-    <p:sldId id="266" r:id="rId13"/>
-    <p:sldId id="268" r:id="rId14"/>
-    <p:sldId id="269" r:id="rId15"/>
-    <p:sldId id="271" r:id="rId16"/>
-    <p:sldId id="272" r:id="rId17"/>
-    <p:sldId id="273" r:id="rId18"/>
-    <p:sldId id="274" r:id="rId19"/>
+    <p:sldId id="275" r:id="rId5"/>
+    <p:sldId id="258" r:id="rId6"/>
+    <p:sldId id="259" r:id="rId7"/>
+    <p:sldId id="260" r:id="rId8"/>
+    <p:sldId id="261" r:id="rId9"/>
+    <p:sldId id="262" r:id="rId10"/>
+    <p:sldId id="263" r:id="rId11"/>
+    <p:sldId id="264" r:id="rId12"/>
+    <p:sldId id="265" r:id="rId13"/>
+    <p:sldId id="266" r:id="rId14"/>
+    <p:sldId id="268" r:id="rId15"/>
+    <p:sldId id="269" r:id="rId16"/>
+    <p:sldId id="271" r:id="rId17"/>
+    <p:sldId id="272" r:id="rId18"/>
+    <p:sldId id="273" r:id="rId19"/>
+    <p:sldId id="274" r:id="rId20"/>
   </p:sldIdLst>
   <p:sldSz cx="12192000" cy="6858000"/>
   <p:notesSz cx="6858000" cy="9144000"/>
@@ -3737,7 +3738,7 @@
           <a:p>
             <a:fld id="{D5279824-C717-4B52-9E7D-7B6B13CAFE89}" type="datetimeFigureOut">
               <a:rPr lang="en-US" smtClean="0"/>
-              <a:t>10/18/2016</a:t>
+              <a:t>10/19/2016</a:t>
             </a:fld>
             <a:endParaRPr lang="en-US"/>
           </a:p>
@@ -3905,7 +3906,7 @@
           <a:p>
             <a:fld id="{D5279824-C717-4B52-9E7D-7B6B13CAFE89}" type="datetimeFigureOut">
               <a:rPr lang="en-US" smtClean="0"/>
-              <a:t>10/18/2016</a:t>
+              <a:t>10/19/2016</a:t>
             </a:fld>
             <a:endParaRPr lang="en-US"/>
           </a:p>
@@ -4083,7 +4084,7 @@
           <a:p>
             <a:fld id="{D5279824-C717-4B52-9E7D-7B6B13CAFE89}" type="datetimeFigureOut">
               <a:rPr lang="en-US" smtClean="0"/>
-              <a:t>10/18/2016</a:t>
+              <a:t>10/19/2016</a:t>
             </a:fld>
             <a:endParaRPr lang="en-US"/>
           </a:p>
@@ -4251,7 +4252,7 @@
           <a:p>
             <a:fld id="{D5279824-C717-4B52-9E7D-7B6B13CAFE89}" type="datetimeFigureOut">
               <a:rPr lang="en-US" smtClean="0"/>
-              <a:t>10/18/2016</a:t>
+              <a:t>10/19/2016</a:t>
             </a:fld>
             <a:endParaRPr lang="en-US"/>
           </a:p>
@@ -4496,7 +4497,7 @@
           <a:p>
             <a:fld id="{D5279824-C717-4B52-9E7D-7B6B13CAFE89}" type="datetimeFigureOut">
               <a:rPr lang="en-US" smtClean="0"/>
-              <a:t>10/18/2016</a:t>
+              <a:t>10/19/2016</a:t>
             </a:fld>
             <a:endParaRPr lang="en-US"/>
           </a:p>
@@ -4725,7 +4726,7 @@
           <a:p>
             <a:fld id="{D5279824-C717-4B52-9E7D-7B6B13CAFE89}" type="datetimeFigureOut">
               <a:rPr lang="en-US" smtClean="0"/>
-              <a:t>10/18/2016</a:t>
+              <a:t>10/19/2016</a:t>
             </a:fld>
             <a:endParaRPr lang="en-US"/>
           </a:p>
@@ -5089,7 +5090,7 @@
           <a:p>
             <a:fld id="{D5279824-C717-4B52-9E7D-7B6B13CAFE89}" type="datetimeFigureOut">
               <a:rPr lang="en-US" smtClean="0"/>
-              <a:t>10/18/2016</a:t>
+              <a:t>10/19/2016</a:t>
             </a:fld>
             <a:endParaRPr lang="en-US"/>
           </a:p>
@@ -5206,7 +5207,7 @@
           <a:p>
             <a:fld id="{D5279824-C717-4B52-9E7D-7B6B13CAFE89}" type="datetimeFigureOut">
               <a:rPr lang="en-US" smtClean="0"/>
-              <a:t>10/18/2016</a:t>
+              <a:t>10/19/2016</a:t>
             </a:fld>
             <a:endParaRPr lang="en-US"/>
           </a:p>
@@ -5301,7 +5302,7 @@
           <a:p>
             <a:fld id="{D5279824-C717-4B52-9E7D-7B6B13CAFE89}" type="datetimeFigureOut">
               <a:rPr lang="en-US" smtClean="0"/>
-              <a:t>10/18/2016</a:t>
+              <a:t>10/19/2016</a:t>
             </a:fld>
             <a:endParaRPr lang="en-US"/>
           </a:p>
@@ -5576,7 +5577,7 @@
           <a:p>
             <a:fld id="{D5279824-C717-4B52-9E7D-7B6B13CAFE89}" type="datetimeFigureOut">
               <a:rPr lang="en-US" smtClean="0"/>
-              <a:t>10/18/2016</a:t>
+              <a:t>10/19/2016</a:t>
             </a:fld>
             <a:endParaRPr lang="en-US"/>
           </a:p>
@@ -5828,7 +5829,7 @@
           <a:p>
             <a:fld id="{D5279824-C717-4B52-9E7D-7B6B13CAFE89}" type="datetimeFigureOut">
               <a:rPr lang="en-US" smtClean="0"/>
-              <a:t>10/18/2016</a:t>
+              <a:t>10/19/2016</a:t>
             </a:fld>
             <a:endParaRPr lang="en-US"/>
           </a:p>
@@ -6039,7 +6040,7 @@
           <a:p>
             <a:fld id="{D5279824-C717-4B52-9E7D-7B6B13CAFE89}" type="datetimeFigureOut">
               <a:rPr lang="en-US" smtClean="0"/>
-              <a:t>10/18/2016</a:t>
+              <a:t>10/19/2016</a:t>
             </a:fld>
             <a:endParaRPr lang="en-US"/>
           </a:p>
@@ -6535,6 +6536,236 @@
           <a:p>
             <a:r>
               <a:rPr lang="en-US" dirty="0"/>
+              <a:t>Components</a:t>
+            </a:r>
+          </a:p>
+        </p:txBody>
+      </p:sp>
+      <p:sp>
+        <p:nvSpPr>
+          <p:cNvPr id="3" name="Content Placeholder 2"/>
+          <p:cNvSpPr>
+            <a:spLocks noGrp="1"/>
+          </p:cNvSpPr>
+          <p:nvPr>
+            <p:ph idx="1"/>
+          </p:nvPr>
+        </p:nvSpPr>
+        <p:spPr/>
+        <p:txBody>
+          <a:bodyPr/>
+          <a:lstStyle/>
+          <a:p>
+            <a:r>
+              <a:rPr lang="en-US" dirty="0"/>
+              <a:t>UI Building Block</a:t>
+            </a:r>
+          </a:p>
+          <a:p>
+            <a:r>
+              <a:rPr lang="en-US" dirty="0"/>
+              <a:t>Always have a template</a:t>
+            </a:r>
+          </a:p>
+          <a:p>
+            <a:r>
+              <a:rPr lang="en-US" dirty="0"/>
+              <a:t>Scoped CSS </a:t>
+            </a:r>
+          </a:p>
+          <a:p>
+            <a:r>
+              <a:rPr lang="en-US" dirty="0"/>
+              <a:t>Lifecycle hooks </a:t>
+            </a:r>
+          </a:p>
+        </p:txBody>
+      </p:sp>
+      <p:grpSp>
+        <p:nvGrpSpPr>
+          <p:cNvPr id="4" name="Group 3"/>
+          <p:cNvGrpSpPr/>
+          <p:nvPr/>
+        </p:nvGrpSpPr>
+        <p:grpSpPr>
+          <a:xfrm>
+            <a:off x="10023678" y="360566"/>
+            <a:ext cx="1330122" cy="1330122"/>
+            <a:chOff x="6407349" y="934549"/>
+            <a:chExt cx="1330122" cy="1330122"/>
+          </a:xfrm>
+        </p:grpSpPr>
+        <p:sp>
+          <p:nvSpPr>
+            <p:cNvPr id="5" name="Oval 4"/>
+            <p:cNvSpPr/>
+            <p:nvPr/>
+          </p:nvSpPr>
+          <p:spPr>
+            <a:xfrm>
+              <a:off x="6407349" y="934549"/>
+              <a:ext cx="1330122" cy="1330122"/>
+            </a:xfrm>
+            <a:prstGeom prst="ellipse">
+              <a:avLst/>
+            </a:prstGeom>
+          </p:spPr>
+          <p:style>
+            <a:lnRef idx="2">
+              <a:schemeClr val="lt1">
+                <a:hueOff val="0"/>
+                <a:satOff val="0"/>
+                <a:lumOff val="0"/>
+                <a:alphaOff val="0"/>
+              </a:schemeClr>
+            </a:lnRef>
+            <a:fillRef idx="1">
+              <a:schemeClr val="accent4">
+                <a:hueOff val="2079139"/>
+                <a:satOff val="-9594"/>
+                <a:lumOff val="353"/>
+                <a:alphaOff val="0"/>
+              </a:schemeClr>
+            </a:fillRef>
+            <a:effectRef idx="0">
+              <a:schemeClr val="accent4">
+                <a:hueOff val="2079139"/>
+                <a:satOff val="-9594"/>
+                <a:lumOff val="353"/>
+                <a:alphaOff val="0"/>
+              </a:schemeClr>
+            </a:effectRef>
+            <a:fontRef idx="minor">
+              <a:schemeClr val="lt1"/>
+            </a:fontRef>
+          </p:style>
+        </p:sp>
+        <p:sp>
+          <p:nvSpPr>
+            <p:cNvPr id="6" name="Oval 4"/>
+            <p:cNvSpPr txBox="1"/>
+            <p:nvPr/>
+          </p:nvSpPr>
+          <p:spPr>
+            <a:xfrm>
+              <a:off x="6602141" y="1129341"/>
+              <a:ext cx="940538" cy="940538"/>
+            </a:xfrm>
+            <a:prstGeom prst="rect">
+              <a:avLst/>
+            </a:prstGeom>
+          </p:spPr>
+          <p:style>
+            <a:lnRef idx="0">
+              <a:scrgbClr r="0" g="0" b="0"/>
+            </a:lnRef>
+            <a:fillRef idx="0">
+              <a:scrgbClr r="0" g="0" b="0"/>
+            </a:fillRef>
+            <a:effectRef idx="0">
+              <a:scrgbClr r="0" g="0" b="0"/>
+            </a:effectRef>
+            <a:fontRef idx="minor">
+              <a:schemeClr val="lt1"/>
+            </a:fontRef>
+          </p:style>
+          <p:txBody>
+            <a:bodyPr spcFirstLastPara="0" vert="horz" wrap="square" lIns="16510" tIns="16510" rIns="16510" bIns="16510" numCol="1" spcCol="1270" anchor="ctr" anchorCtr="0">
+              <a:noAutofit/>
+            </a:bodyPr>
+            <a:lstStyle/>
+            <a:p>
+              <a:pPr marL="0" lvl="0" indent="0" algn="ctr" defTabSz="577850">
+                <a:lnSpc>
+                  <a:spcPct val="90000"/>
+                </a:lnSpc>
+                <a:spcBef>
+                  <a:spcPct val="0"/>
+                </a:spcBef>
+                <a:spcAft>
+                  <a:spcPct val="35000"/>
+                </a:spcAft>
+                <a:buNone/>
+              </a:pPr>
+              <a:r>
+                <a:rPr lang="en-US" sz="1300" kern="1200" dirty="0"/>
+                <a:t>Components</a:t>
+              </a:r>
+            </a:p>
+          </p:txBody>
+        </p:sp>
+      </p:grpSp>
+      <p:pic>
+        <p:nvPicPr>
+          <p:cNvPr id="7" name="Picture 6"/>
+          <p:cNvPicPr>
+            <a:picLocks noChangeAspect="1"/>
+          </p:cNvPicPr>
+          <p:nvPr/>
+        </p:nvPicPr>
+        <p:blipFill>
+          <a:blip r:embed="rId2"/>
+          <a:stretch>
+            <a:fillRect/>
+          </a:stretch>
+        </p:blipFill>
+        <p:spPr>
+          <a:xfrm>
+            <a:off x="838200" y="4062413"/>
+            <a:ext cx="9220200" cy="2114550"/>
+          </a:xfrm>
+          <a:prstGeom prst="rect">
+            <a:avLst/>
+          </a:prstGeom>
+        </p:spPr>
+      </p:pic>
+    </p:spTree>
+    <p:extLst>
+      <p:ext uri="{BB962C8B-B14F-4D97-AF65-F5344CB8AC3E}">
+        <p14:creationId xmlns:p14="http://schemas.microsoft.com/office/powerpoint/2010/main" val="2755280173"/>
+      </p:ext>
+    </p:extLst>
+  </p:cSld>
+  <p:clrMapOvr>
+    <a:masterClrMapping/>
+  </p:clrMapOvr>
+</p:sld>
+</file>
+
+<file path=ppt/slides/slide11.xml><?xml version="1.0" encoding="utf-8"?>
+<p:sld xmlns:a="http://schemas.openxmlformats.org/drawingml/2006/main" xmlns:r="http://schemas.openxmlformats.org/officeDocument/2006/relationships" xmlns:p="http://schemas.openxmlformats.org/presentationml/2006/main">
+  <p:cSld>
+    <p:spTree>
+      <p:nvGrpSpPr>
+        <p:cNvPr id="1" name=""/>
+        <p:cNvGrpSpPr/>
+        <p:nvPr/>
+      </p:nvGrpSpPr>
+      <p:grpSpPr>
+        <a:xfrm>
+          <a:off x="0" y="0"/>
+          <a:ext cx="0" cy="0"/>
+          <a:chOff x="0" y="0"/>
+          <a:chExt cx="0" cy="0"/>
+        </a:xfrm>
+      </p:grpSpPr>
+      <p:sp>
+        <p:nvSpPr>
+          <p:cNvPr id="2" name="Title 1"/>
+          <p:cNvSpPr>
+            <a:spLocks noGrp="1"/>
+          </p:cNvSpPr>
+          <p:nvPr>
+            <p:ph type="title"/>
+          </p:nvPr>
+        </p:nvSpPr>
+        <p:spPr/>
+        <p:txBody>
+          <a:bodyPr/>
+          <a:lstStyle/>
+          <a:p>
+            <a:r>
+              <a:rPr lang="en-US" dirty="0"/>
               <a:t>Dependency Injection</a:t>
             </a:r>
           </a:p>
@@ -6737,7 +6968,7 @@
 </p:sld>
 </file>
 
-<file path=ppt/slides/slide11.xml><?xml version="1.0" encoding="utf-8"?>
+<file path=ppt/slides/slide12.xml><?xml version="1.0" encoding="utf-8"?>
 <p:sld xmlns:a="http://schemas.openxmlformats.org/drawingml/2006/main" xmlns:r="http://schemas.openxmlformats.org/officeDocument/2006/relationships" xmlns:p="http://schemas.openxmlformats.org/presentationml/2006/main">
   <p:cSld>
     <p:spTree>
@@ -6979,7 +7210,7 @@
 </p:sld>
 </file>
 
-<file path=ppt/slides/slide12.xml><?xml version="1.0" encoding="utf-8"?>
+<file path=ppt/slides/slide13.xml><?xml version="1.0" encoding="utf-8"?>
 <p:sld xmlns:a="http://schemas.openxmlformats.org/drawingml/2006/main" xmlns:r="http://schemas.openxmlformats.org/officeDocument/2006/relationships" xmlns:p="http://schemas.openxmlformats.org/presentationml/2006/main">
   <p:cSld>
     <p:spTree>
@@ -7206,7 +7437,7 @@
 </p:sld>
 </file>
 
-<file path=ppt/slides/slide13.xml><?xml version="1.0" encoding="utf-8"?>
+<file path=ppt/slides/slide14.xml><?xml version="1.0" encoding="utf-8"?>
 <p:sld xmlns:a="http://schemas.openxmlformats.org/drawingml/2006/main" xmlns:r="http://schemas.openxmlformats.org/officeDocument/2006/relationships" xmlns:p="http://schemas.openxmlformats.org/presentationml/2006/main">
   <p:cSld>
     <p:spTree>
@@ -7456,7 +7687,7 @@
 </p:sld>
 </file>
 
-<file path=ppt/slides/slide14.xml><?xml version="1.0" encoding="utf-8"?>
+<file path=ppt/slides/slide15.xml><?xml version="1.0" encoding="utf-8"?>
 <p:sld xmlns:a="http://schemas.openxmlformats.org/drawingml/2006/main" xmlns:r="http://schemas.openxmlformats.org/officeDocument/2006/relationships" xmlns:p="http://schemas.openxmlformats.org/presentationml/2006/main">
   <p:cSld>
     <p:spTree>
@@ -7615,7 +7846,7 @@
 </p:sld>
 </file>
 
-<file path=ppt/slides/slide15.xml><?xml version="1.0" encoding="utf-8"?>
+<file path=ppt/slides/slide16.xml><?xml version="1.0" encoding="utf-8"?>
 <p:sld xmlns:a="http://schemas.openxmlformats.org/drawingml/2006/main" xmlns:r="http://schemas.openxmlformats.org/officeDocument/2006/relationships" xmlns:p="http://schemas.openxmlformats.org/presentationml/2006/main">
   <p:cSld>
     <p:spTree>
@@ -7823,7 +8054,7 @@
 </p:sld>
 </file>
 
-<file path=ppt/slides/slide16.xml><?xml version="1.0" encoding="utf-8"?>
+<file path=ppt/slides/slide17.xml><?xml version="1.0" encoding="utf-8"?>
 <p:sld xmlns:a="http://schemas.openxmlformats.org/drawingml/2006/main" xmlns:r="http://schemas.openxmlformats.org/officeDocument/2006/relationships" xmlns:p="http://schemas.openxmlformats.org/presentationml/2006/main">
   <p:cSld>
     <p:spTree>
@@ -8005,7 +8236,7 @@
 </p:sld>
 </file>
 
-<file path=ppt/slides/slide17.xml><?xml version="1.0" encoding="utf-8"?>
+<file path=ppt/slides/slide18.xml><?xml version="1.0" encoding="utf-8"?>
 <p:sld xmlns:a="http://schemas.openxmlformats.org/drawingml/2006/main" xmlns:r="http://schemas.openxmlformats.org/officeDocument/2006/relationships" xmlns:p="http://schemas.openxmlformats.org/presentationml/2006/main">
   <p:cSld>
     <p:spTree>
@@ -8191,7 +8422,7 @@
 </p:sld>
 </file>
 
-<file path=ppt/slides/slide18.xml><?xml version="1.0" encoding="utf-8"?>
+<file path=ppt/slides/slide19.xml><?xml version="1.0" encoding="utf-8"?>
 <p:sld xmlns:a="http://schemas.openxmlformats.org/drawingml/2006/main" xmlns:r="http://schemas.openxmlformats.org/officeDocument/2006/relationships" xmlns:p="http://schemas.openxmlformats.org/presentationml/2006/main">
   <p:cSld>
     <p:spTree>
@@ -9102,6 +9333,1219 @@
       </p:grpSpPr>
       <p:sp>
         <p:nvSpPr>
+          <p:cNvPr id="5" name="Title 4"/>
+          <p:cNvSpPr>
+            <a:spLocks noGrp="1"/>
+          </p:cNvSpPr>
+          <p:nvPr>
+            <p:ph type="title"/>
+          </p:nvPr>
+        </p:nvSpPr>
+        <p:spPr/>
+        <p:txBody>
+          <a:bodyPr/>
+          <a:lstStyle/>
+          <a:p>
+            <a:r>
+              <a:rPr lang="en-US" dirty="0"/>
+              <a:t>About iVision</a:t>
+            </a:r>
+          </a:p>
+        </p:txBody>
+      </p:sp>
+      <p:sp>
+        <p:nvSpPr>
+          <p:cNvPr id="9" name="Rectangle 8"/>
+          <p:cNvSpPr/>
+          <p:nvPr/>
+        </p:nvSpPr>
+        <p:spPr>
+          <a:xfrm>
+            <a:off x="5047837" y="1897524"/>
+            <a:ext cx="5564258" cy="1015663"/>
+          </a:xfrm>
+          <a:prstGeom prst="rect">
+            <a:avLst/>
+          </a:prstGeom>
+        </p:spPr>
+        <p:txBody>
+          <a:bodyPr wrap="square">
+            <a:spAutoFit/>
+          </a:bodyPr>
+          <a:lstStyle/>
+          <a:p>
+            <a:r>
+              <a:rPr lang="en-US" sz="1200" dirty="0"/>
+              <a:t>A privately held, IT consulting firm headquartered in Midtown, Atlanta. </a:t>
+            </a:r>
+          </a:p>
+          <a:p>
+            <a:endParaRPr lang="en-US" sz="1200" dirty="0"/>
+          </a:p>
+          <a:p>
+            <a:r>
+              <a:rPr lang="en-US" sz="1200" dirty="0"/>
+              <a:t>At </a:t>
+            </a:r>
+            <a:r>
+              <a:rPr lang="en-US" sz="1200" dirty="0" err="1"/>
+              <a:t>iVision</a:t>
+            </a:r>
+            <a:r>
+              <a:rPr lang="en-US" sz="1200" dirty="0"/>
+              <a:t>, we seek to understand our clients’ business first. We work with clients to architect, transform and support their technology — enabling them to realize their vision of a better tomorrow.</a:t>
+            </a:r>
+          </a:p>
+        </p:txBody>
+      </p:sp>
+      <p:sp>
+        <p:nvSpPr>
+          <p:cNvPr id="10" name="Text Placeholder 2"/>
+          <p:cNvSpPr txBox="1">
+            <a:spLocks/>
+          </p:cNvSpPr>
+          <p:nvPr/>
+        </p:nvSpPr>
+        <p:spPr>
+          <a:xfrm>
+            <a:off x="2086814" y="1442883"/>
+            <a:ext cx="6386421" cy="277088"/>
+          </a:xfrm>
+          <a:prstGeom prst="rect">
+            <a:avLst/>
+          </a:prstGeom>
+        </p:spPr>
+        <p:txBody>
+          <a:bodyPr/>
+          <a:lstStyle>
+            <a:lvl1pPr marL="228600" indent="-228600" algn="l" defTabSz="914400" rtl="0" eaLnBrk="1" latinLnBrk="0" hangingPunct="1">
+              <a:lnSpc>
+                <a:spcPct val="90000"/>
+              </a:lnSpc>
+              <a:spcBef>
+                <a:spcPts val="1000"/>
+              </a:spcBef>
+              <a:buFont typeface="Arial" panose="020B0604020202020204" pitchFamily="34" charset="0"/>
+              <a:buChar char="•"/>
+              <a:defRPr sz="2800" kern="1200">
+                <a:solidFill>
+                  <a:schemeClr val="tx1"/>
+                </a:solidFill>
+                <a:latin typeface="+mn-lt"/>
+                <a:ea typeface="+mn-ea"/>
+                <a:cs typeface="+mn-cs"/>
+              </a:defRPr>
+            </a:lvl1pPr>
+            <a:lvl2pPr marL="685800" indent="-228600" algn="l" defTabSz="914400" rtl="0" eaLnBrk="1" latinLnBrk="0" hangingPunct="1">
+              <a:lnSpc>
+                <a:spcPct val="90000"/>
+              </a:lnSpc>
+              <a:spcBef>
+                <a:spcPts val="500"/>
+              </a:spcBef>
+              <a:buFont typeface="Arial" panose="020B0604020202020204" pitchFamily="34" charset="0"/>
+              <a:buChar char="•"/>
+              <a:defRPr sz="2400" kern="1200">
+                <a:solidFill>
+                  <a:schemeClr val="tx1"/>
+                </a:solidFill>
+                <a:latin typeface="+mn-lt"/>
+                <a:ea typeface="+mn-ea"/>
+                <a:cs typeface="+mn-cs"/>
+              </a:defRPr>
+            </a:lvl2pPr>
+            <a:lvl3pPr marL="1143000" indent="-228600" algn="l" defTabSz="914400" rtl="0" eaLnBrk="1" latinLnBrk="0" hangingPunct="1">
+              <a:lnSpc>
+                <a:spcPct val="90000"/>
+              </a:lnSpc>
+              <a:spcBef>
+                <a:spcPts val="500"/>
+              </a:spcBef>
+              <a:buFont typeface="Arial" panose="020B0604020202020204" pitchFamily="34" charset="0"/>
+              <a:buChar char="•"/>
+              <a:defRPr sz="2000" kern="1200">
+                <a:solidFill>
+                  <a:schemeClr val="tx1"/>
+                </a:solidFill>
+                <a:latin typeface="+mn-lt"/>
+                <a:ea typeface="+mn-ea"/>
+                <a:cs typeface="+mn-cs"/>
+              </a:defRPr>
+            </a:lvl3pPr>
+            <a:lvl4pPr marL="1600200" indent="-228600" algn="l" defTabSz="914400" rtl="0" eaLnBrk="1" latinLnBrk="0" hangingPunct="1">
+              <a:lnSpc>
+                <a:spcPct val="90000"/>
+              </a:lnSpc>
+              <a:spcBef>
+                <a:spcPts val="500"/>
+              </a:spcBef>
+              <a:buFont typeface="Arial" panose="020B0604020202020204" pitchFamily="34" charset="0"/>
+              <a:buChar char="•"/>
+              <a:defRPr sz="1800" kern="1200">
+                <a:solidFill>
+                  <a:schemeClr val="tx1"/>
+                </a:solidFill>
+                <a:latin typeface="+mn-lt"/>
+                <a:ea typeface="+mn-ea"/>
+                <a:cs typeface="+mn-cs"/>
+              </a:defRPr>
+            </a:lvl4pPr>
+            <a:lvl5pPr marL="2057400" indent="-228600" algn="l" defTabSz="914400" rtl="0" eaLnBrk="1" latinLnBrk="0" hangingPunct="1">
+              <a:lnSpc>
+                <a:spcPct val="90000"/>
+              </a:lnSpc>
+              <a:spcBef>
+                <a:spcPts val="500"/>
+              </a:spcBef>
+              <a:buFont typeface="Arial" panose="020B0604020202020204" pitchFamily="34" charset="0"/>
+              <a:buChar char="•"/>
+              <a:defRPr sz="1800" kern="1200">
+                <a:solidFill>
+                  <a:schemeClr val="tx1"/>
+                </a:solidFill>
+                <a:latin typeface="+mn-lt"/>
+                <a:ea typeface="+mn-ea"/>
+                <a:cs typeface="+mn-cs"/>
+              </a:defRPr>
+            </a:lvl5pPr>
+            <a:lvl6pPr marL="2514600" indent="-228600" algn="l" defTabSz="914400" rtl="0" eaLnBrk="1" latinLnBrk="0" hangingPunct="1">
+              <a:lnSpc>
+                <a:spcPct val="90000"/>
+              </a:lnSpc>
+              <a:spcBef>
+                <a:spcPts val="500"/>
+              </a:spcBef>
+              <a:buFont typeface="Arial" panose="020B0604020202020204" pitchFamily="34" charset="0"/>
+              <a:buChar char="•"/>
+              <a:defRPr sz="1800" kern="1200">
+                <a:solidFill>
+                  <a:schemeClr val="tx1"/>
+                </a:solidFill>
+                <a:latin typeface="+mn-lt"/>
+                <a:ea typeface="+mn-ea"/>
+                <a:cs typeface="+mn-cs"/>
+              </a:defRPr>
+            </a:lvl6pPr>
+            <a:lvl7pPr marL="2971800" indent="-228600" algn="l" defTabSz="914400" rtl="0" eaLnBrk="1" latinLnBrk="0" hangingPunct="1">
+              <a:lnSpc>
+                <a:spcPct val="90000"/>
+              </a:lnSpc>
+              <a:spcBef>
+                <a:spcPts val="500"/>
+              </a:spcBef>
+              <a:buFont typeface="Arial" panose="020B0604020202020204" pitchFamily="34" charset="0"/>
+              <a:buChar char="•"/>
+              <a:defRPr sz="1800" kern="1200">
+                <a:solidFill>
+                  <a:schemeClr val="tx1"/>
+                </a:solidFill>
+                <a:latin typeface="+mn-lt"/>
+                <a:ea typeface="+mn-ea"/>
+                <a:cs typeface="+mn-cs"/>
+              </a:defRPr>
+            </a:lvl7pPr>
+            <a:lvl8pPr marL="3429000" indent="-228600" algn="l" defTabSz="914400" rtl="0" eaLnBrk="1" latinLnBrk="0" hangingPunct="1">
+              <a:lnSpc>
+                <a:spcPct val="90000"/>
+              </a:lnSpc>
+              <a:spcBef>
+                <a:spcPts val="500"/>
+              </a:spcBef>
+              <a:buFont typeface="Arial" panose="020B0604020202020204" pitchFamily="34" charset="0"/>
+              <a:buChar char="•"/>
+              <a:defRPr sz="1800" kern="1200">
+                <a:solidFill>
+                  <a:schemeClr val="tx1"/>
+                </a:solidFill>
+                <a:latin typeface="+mn-lt"/>
+                <a:ea typeface="+mn-ea"/>
+                <a:cs typeface="+mn-cs"/>
+              </a:defRPr>
+            </a:lvl8pPr>
+            <a:lvl9pPr marL="3886200" indent="-228600" algn="l" defTabSz="914400" rtl="0" eaLnBrk="1" latinLnBrk="0" hangingPunct="1">
+              <a:lnSpc>
+                <a:spcPct val="90000"/>
+              </a:lnSpc>
+              <a:spcBef>
+                <a:spcPts val="500"/>
+              </a:spcBef>
+              <a:buFont typeface="Arial" panose="020B0604020202020204" pitchFamily="34" charset="0"/>
+              <a:buChar char="•"/>
+              <a:defRPr sz="1800" kern="1200">
+                <a:solidFill>
+                  <a:schemeClr val="tx1"/>
+                </a:solidFill>
+                <a:latin typeface="+mn-lt"/>
+                <a:ea typeface="+mn-ea"/>
+                <a:cs typeface="+mn-cs"/>
+              </a:defRPr>
+            </a:lvl9pPr>
+          </a:lstStyle>
+          <a:p>
+            <a:pPr marL="0" indent="0">
+              <a:buNone/>
+            </a:pPr>
+            <a:endParaRPr lang="en-US" dirty="0"/>
+          </a:p>
+        </p:txBody>
+      </p:sp>
+      <p:sp>
+        <p:nvSpPr>
+          <p:cNvPr id="11" name="TextBox 10"/>
+          <p:cNvSpPr txBox="1"/>
+          <p:nvPr/>
+        </p:nvSpPr>
+        <p:spPr>
+          <a:xfrm>
+            <a:off x="2336154" y="4109718"/>
+            <a:ext cx="2785621" cy="830997"/>
+          </a:xfrm>
+          <a:prstGeom prst="rect">
+            <a:avLst/>
+          </a:prstGeom>
+          <a:noFill/>
+        </p:spPr>
+        <p:txBody>
+          <a:bodyPr wrap="square" rtlCol="0">
+            <a:spAutoFit/>
+          </a:bodyPr>
+          <a:lstStyle/>
+          <a:p>
+            <a:r>
+              <a:rPr lang="en-US" sz="1200" dirty="0"/>
+              <a:t>Jeremy Likness| Director of App Dev</a:t>
+            </a:r>
+          </a:p>
+          <a:p>
+            <a:endParaRPr lang="en-US" sz="1200" dirty="0"/>
+          </a:p>
+          <a:p>
+            <a:r>
+              <a:rPr lang="en-US" sz="1200" dirty="0">
+                <a:hlinkClick r:id="rId2"/>
+              </a:rPr>
+              <a:t>https://bit.ly/ivisionappdev</a:t>
+            </a:r>
+            <a:r>
+              <a:rPr lang="en-US" sz="1200" dirty="0"/>
+              <a:t> </a:t>
+            </a:r>
+          </a:p>
+          <a:p>
+            <a:r>
+              <a:rPr lang="en-US" sz="1200" dirty="0"/>
+              <a:t> </a:t>
+            </a:r>
+          </a:p>
+        </p:txBody>
+      </p:sp>
+      <p:sp>
+        <p:nvSpPr>
+          <p:cNvPr id="13" name="Text Placeholder 1"/>
+          <p:cNvSpPr txBox="1">
+            <a:spLocks/>
+          </p:cNvSpPr>
+          <p:nvPr/>
+        </p:nvSpPr>
+        <p:spPr>
+          <a:xfrm>
+            <a:off x="2086813" y="2721845"/>
+            <a:ext cx="2032782" cy="736547"/>
+          </a:xfrm>
+          <a:prstGeom prst="rect">
+            <a:avLst/>
+          </a:prstGeom>
+        </p:spPr>
+        <p:txBody>
+          <a:bodyPr>
+            <a:normAutofit/>
+          </a:bodyPr>
+          <a:lstStyle>
+            <a:lvl1pPr marL="342900" indent="-342900" algn="l" defTabSz="457200" rtl="0" eaLnBrk="1" latinLnBrk="0" hangingPunct="1">
+              <a:spcBef>
+                <a:spcPct val="20000"/>
+              </a:spcBef>
+              <a:buFont typeface="Arial"/>
+              <a:buChar char="•"/>
+              <a:defRPr sz="2400" kern="1200">
+                <a:solidFill>
+                  <a:schemeClr val="tx1"/>
+                </a:solidFill>
+                <a:latin typeface="+mn-lt"/>
+                <a:ea typeface="+mn-ea"/>
+                <a:cs typeface="+mn-cs"/>
+              </a:defRPr>
+            </a:lvl1pPr>
+            <a:lvl2pPr marL="742950" indent="-285750" algn="l" defTabSz="457200" rtl="0" eaLnBrk="1" latinLnBrk="0" hangingPunct="1">
+              <a:spcBef>
+                <a:spcPct val="20000"/>
+              </a:spcBef>
+              <a:buFont typeface="Arial"/>
+              <a:buChar char="–"/>
+              <a:defRPr sz="2000" kern="1200">
+                <a:solidFill>
+                  <a:schemeClr val="tx1"/>
+                </a:solidFill>
+                <a:latin typeface="+mn-lt"/>
+                <a:ea typeface="+mn-ea"/>
+                <a:cs typeface="+mn-cs"/>
+              </a:defRPr>
+            </a:lvl2pPr>
+            <a:lvl3pPr marL="1143000" indent="-228600" algn="l" defTabSz="457200" rtl="0" eaLnBrk="1" latinLnBrk="0" hangingPunct="1">
+              <a:spcBef>
+                <a:spcPct val="20000"/>
+              </a:spcBef>
+              <a:buFont typeface="Arial"/>
+              <a:buChar char="•"/>
+              <a:defRPr sz="1600" kern="1200">
+                <a:solidFill>
+                  <a:schemeClr val="tx1"/>
+                </a:solidFill>
+                <a:latin typeface="+mn-lt"/>
+                <a:ea typeface="+mn-ea"/>
+                <a:cs typeface="+mn-cs"/>
+              </a:defRPr>
+            </a:lvl3pPr>
+            <a:lvl4pPr marL="1600200" indent="-228600" algn="l" defTabSz="457200" rtl="0" eaLnBrk="1" latinLnBrk="0" hangingPunct="1">
+              <a:spcBef>
+                <a:spcPct val="20000"/>
+              </a:spcBef>
+              <a:buFont typeface="Arial"/>
+              <a:buChar char="–"/>
+              <a:defRPr sz="1600" kern="1200">
+                <a:solidFill>
+                  <a:schemeClr val="tx1"/>
+                </a:solidFill>
+                <a:latin typeface="+mn-lt"/>
+                <a:ea typeface="+mn-ea"/>
+                <a:cs typeface="+mn-cs"/>
+              </a:defRPr>
+            </a:lvl4pPr>
+            <a:lvl5pPr marL="2057400" indent="-228600" algn="l" defTabSz="457200" rtl="0" eaLnBrk="1" latinLnBrk="0" hangingPunct="1">
+              <a:spcBef>
+                <a:spcPct val="20000"/>
+              </a:spcBef>
+              <a:buFont typeface="Arial"/>
+              <a:buChar char="»"/>
+              <a:defRPr sz="1600" kern="1200">
+                <a:solidFill>
+                  <a:schemeClr val="tx1"/>
+                </a:solidFill>
+                <a:latin typeface="+mn-lt"/>
+                <a:ea typeface="+mn-ea"/>
+                <a:cs typeface="+mn-cs"/>
+              </a:defRPr>
+            </a:lvl5pPr>
+            <a:lvl6pPr marL="2514600" indent="-228600" algn="l" defTabSz="457200" rtl="0" eaLnBrk="1" latinLnBrk="0" hangingPunct="1">
+              <a:spcBef>
+                <a:spcPct val="20000"/>
+              </a:spcBef>
+              <a:buFont typeface="Arial"/>
+              <a:buChar char="•"/>
+              <a:defRPr sz="2000" kern="1200">
+                <a:solidFill>
+                  <a:schemeClr val="tx1"/>
+                </a:solidFill>
+                <a:latin typeface="+mn-lt"/>
+                <a:ea typeface="+mn-ea"/>
+                <a:cs typeface="+mn-cs"/>
+              </a:defRPr>
+            </a:lvl6pPr>
+            <a:lvl7pPr marL="2971800" indent="-228600" algn="l" defTabSz="457200" rtl="0" eaLnBrk="1" latinLnBrk="0" hangingPunct="1">
+              <a:spcBef>
+                <a:spcPct val="20000"/>
+              </a:spcBef>
+              <a:buFont typeface="Arial"/>
+              <a:buChar char="•"/>
+              <a:defRPr sz="2000" kern="1200">
+                <a:solidFill>
+                  <a:schemeClr val="tx1"/>
+                </a:solidFill>
+                <a:latin typeface="+mn-lt"/>
+                <a:ea typeface="+mn-ea"/>
+                <a:cs typeface="+mn-cs"/>
+              </a:defRPr>
+            </a:lvl7pPr>
+            <a:lvl8pPr marL="3429000" indent="-228600" algn="l" defTabSz="457200" rtl="0" eaLnBrk="1" latinLnBrk="0" hangingPunct="1">
+              <a:spcBef>
+                <a:spcPct val="20000"/>
+              </a:spcBef>
+              <a:buFont typeface="Arial"/>
+              <a:buChar char="•"/>
+              <a:defRPr sz="2000" kern="1200">
+                <a:solidFill>
+                  <a:schemeClr val="tx1"/>
+                </a:solidFill>
+                <a:latin typeface="+mn-lt"/>
+                <a:ea typeface="+mn-ea"/>
+                <a:cs typeface="+mn-cs"/>
+              </a:defRPr>
+            </a:lvl8pPr>
+            <a:lvl9pPr marL="3886200" indent="-228600" algn="l" defTabSz="457200" rtl="0" eaLnBrk="1" latinLnBrk="0" hangingPunct="1">
+              <a:spcBef>
+                <a:spcPct val="20000"/>
+              </a:spcBef>
+              <a:buFont typeface="Arial"/>
+              <a:buChar char="•"/>
+              <a:defRPr sz="2000" kern="1200">
+                <a:solidFill>
+                  <a:schemeClr val="tx1"/>
+                </a:solidFill>
+                <a:latin typeface="+mn-lt"/>
+                <a:ea typeface="+mn-ea"/>
+                <a:cs typeface="+mn-cs"/>
+              </a:defRPr>
+            </a:lvl9pPr>
+          </a:lstStyle>
+          <a:p>
+            <a:pPr marL="0" indent="0">
+              <a:buNone/>
+            </a:pPr>
+            <a:endParaRPr lang="en-US" sz="1200" dirty="0"/>
+          </a:p>
+        </p:txBody>
+      </p:sp>
+      <p:sp>
+        <p:nvSpPr>
+          <p:cNvPr id="14" name="Text Placeholder 2"/>
+          <p:cNvSpPr txBox="1">
+            <a:spLocks/>
+          </p:cNvSpPr>
+          <p:nvPr/>
+        </p:nvSpPr>
+        <p:spPr>
+          <a:xfrm>
+            <a:off x="5047837" y="3132168"/>
+            <a:ext cx="1709505" cy="218589"/>
+          </a:xfrm>
+          <a:prstGeom prst="rect">
+            <a:avLst/>
+          </a:prstGeom>
+        </p:spPr>
+        <p:txBody>
+          <a:bodyPr vert="horz" lIns="91440" tIns="45720" rIns="91440" bIns="45720" rtlCol="0" anchor="ctr">
+            <a:noAutofit/>
+          </a:bodyPr>
+          <a:lstStyle>
+            <a:lvl1pPr marL="0" indent="0" algn="l" defTabSz="457200" rtl="0" eaLnBrk="1" latinLnBrk="0" hangingPunct="1">
+              <a:lnSpc>
+                <a:spcPct val="90000"/>
+              </a:lnSpc>
+              <a:spcBef>
+                <a:spcPct val="20000"/>
+              </a:spcBef>
+              <a:buFont typeface="Arial"/>
+              <a:buNone/>
+              <a:defRPr sz="2000" b="0" i="0" kern="1200">
+                <a:solidFill>
+                  <a:schemeClr val="bg1"/>
+                </a:solidFill>
+                <a:latin typeface="Calibri Light"/>
+                <a:ea typeface="+mn-ea"/>
+                <a:cs typeface="Calibri Light"/>
+              </a:defRPr>
+            </a:lvl1pPr>
+            <a:lvl2pPr marL="742950" indent="-285750" algn="l" defTabSz="457200" rtl="0" eaLnBrk="1" latinLnBrk="0" hangingPunct="1">
+              <a:spcBef>
+                <a:spcPct val="20000"/>
+              </a:spcBef>
+              <a:buFont typeface="Arial"/>
+              <a:buChar char="–"/>
+              <a:defRPr sz="2000" kern="1200">
+                <a:solidFill>
+                  <a:schemeClr val="tx1"/>
+                </a:solidFill>
+                <a:latin typeface="+mn-lt"/>
+                <a:ea typeface="+mn-ea"/>
+                <a:cs typeface="+mn-cs"/>
+              </a:defRPr>
+            </a:lvl2pPr>
+            <a:lvl3pPr marL="1143000" indent="-228600" algn="l" defTabSz="457200" rtl="0" eaLnBrk="1" latinLnBrk="0" hangingPunct="1">
+              <a:spcBef>
+                <a:spcPct val="20000"/>
+              </a:spcBef>
+              <a:buFont typeface="Arial"/>
+              <a:buChar char="•"/>
+              <a:defRPr sz="1600" kern="1200">
+                <a:solidFill>
+                  <a:schemeClr val="tx1"/>
+                </a:solidFill>
+                <a:latin typeface="+mn-lt"/>
+                <a:ea typeface="+mn-ea"/>
+                <a:cs typeface="+mn-cs"/>
+              </a:defRPr>
+            </a:lvl3pPr>
+            <a:lvl4pPr marL="1600200" indent="-228600" algn="l" defTabSz="457200" rtl="0" eaLnBrk="1" latinLnBrk="0" hangingPunct="1">
+              <a:spcBef>
+                <a:spcPct val="20000"/>
+              </a:spcBef>
+              <a:buFont typeface="Arial"/>
+              <a:buChar char="–"/>
+              <a:defRPr sz="1600" kern="1200">
+                <a:solidFill>
+                  <a:schemeClr val="tx1"/>
+                </a:solidFill>
+                <a:latin typeface="+mn-lt"/>
+                <a:ea typeface="+mn-ea"/>
+                <a:cs typeface="+mn-cs"/>
+              </a:defRPr>
+            </a:lvl4pPr>
+            <a:lvl5pPr marL="2057400" indent="-228600" algn="l" defTabSz="457200" rtl="0" eaLnBrk="1" latinLnBrk="0" hangingPunct="1">
+              <a:spcBef>
+                <a:spcPct val="20000"/>
+              </a:spcBef>
+              <a:buFont typeface="Arial"/>
+              <a:buChar char="»"/>
+              <a:defRPr sz="1600" kern="1200">
+                <a:solidFill>
+                  <a:schemeClr val="tx1"/>
+                </a:solidFill>
+                <a:latin typeface="+mn-lt"/>
+                <a:ea typeface="+mn-ea"/>
+                <a:cs typeface="+mn-cs"/>
+              </a:defRPr>
+            </a:lvl5pPr>
+            <a:lvl6pPr marL="2514600" indent="-228600" algn="l" defTabSz="457200" rtl="0" eaLnBrk="1" latinLnBrk="0" hangingPunct="1">
+              <a:spcBef>
+                <a:spcPct val="20000"/>
+              </a:spcBef>
+              <a:buFont typeface="Arial"/>
+              <a:buChar char="•"/>
+              <a:defRPr sz="2000" kern="1200">
+                <a:solidFill>
+                  <a:schemeClr val="tx1"/>
+                </a:solidFill>
+                <a:latin typeface="+mn-lt"/>
+                <a:ea typeface="+mn-ea"/>
+                <a:cs typeface="+mn-cs"/>
+              </a:defRPr>
+            </a:lvl6pPr>
+            <a:lvl7pPr marL="2971800" indent="-228600" algn="l" defTabSz="457200" rtl="0" eaLnBrk="1" latinLnBrk="0" hangingPunct="1">
+              <a:spcBef>
+                <a:spcPct val="20000"/>
+              </a:spcBef>
+              <a:buFont typeface="Arial"/>
+              <a:buChar char="•"/>
+              <a:defRPr sz="2000" kern="1200">
+                <a:solidFill>
+                  <a:schemeClr val="tx1"/>
+                </a:solidFill>
+                <a:latin typeface="+mn-lt"/>
+                <a:ea typeface="+mn-ea"/>
+                <a:cs typeface="+mn-cs"/>
+              </a:defRPr>
+            </a:lvl7pPr>
+            <a:lvl8pPr marL="3429000" indent="-228600" algn="l" defTabSz="457200" rtl="0" eaLnBrk="1" latinLnBrk="0" hangingPunct="1">
+              <a:spcBef>
+                <a:spcPct val="20000"/>
+              </a:spcBef>
+              <a:buFont typeface="Arial"/>
+              <a:buChar char="•"/>
+              <a:defRPr sz="2000" kern="1200">
+                <a:solidFill>
+                  <a:schemeClr val="tx1"/>
+                </a:solidFill>
+                <a:latin typeface="+mn-lt"/>
+                <a:ea typeface="+mn-ea"/>
+                <a:cs typeface="+mn-cs"/>
+              </a:defRPr>
+            </a:lvl8pPr>
+            <a:lvl9pPr marL="3886200" indent="-228600" algn="l" defTabSz="457200" rtl="0" eaLnBrk="1" latinLnBrk="0" hangingPunct="1">
+              <a:spcBef>
+                <a:spcPct val="20000"/>
+              </a:spcBef>
+              <a:buFont typeface="Arial"/>
+              <a:buChar char="•"/>
+              <a:defRPr sz="2000" kern="1200">
+                <a:solidFill>
+                  <a:schemeClr val="tx1"/>
+                </a:solidFill>
+                <a:latin typeface="+mn-lt"/>
+                <a:ea typeface="+mn-ea"/>
+                <a:cs typeface="+mn-cs"/>
+              </a:defRPr>
+            </a:lvl9pPr>
+          </a:lstStyle>
+          <a:p>
+            <a:r>
+              <a:rPr lang="en-US" sz="1200" b="1" dirty="0">
+                <a:solidFill>
+                  <a:schemeClr val="tx1"/>
+                </a:solidFill>
+                <a:latin typeface="+mn-lt"/>
+                <a:cs typeface="+mn-cs"/>
+              </a:rPr>
+              <a:t>The </a:t>
+            </a:r>
+            <a:r>
+              <a:rPr lang="en-US" sz="1200" b="1" dirty="0" err="1">
+                <a:solidFill>
+                  <a:schemeClr val="tx1"/>
+                </a:solidFill>
+                <a:latin typeface="+mn-lt"/>
+                <a:cs typeface="+mn-cs"/>
+              </a:rPr>
+              <a:t>iVision</a:t>
+            </a:r>
+            <a:r>
+              <a:rPr lang="en-US" sz="1200" b="1" dirty="0">
+                <a:solidFill>
+                  <a:schemeClr val="tx1"/>
+                </a:solidFill>
+                <a:latin typeface="+mn-lt"/>
+                <a:cs typeface="+mn-cs"/>
+              </a:rPr>
+              <a:t> Difference</a:t>
+            </a:r>
+            <a:endParaRPr lang="en-US" sz="1200" b="1" spc="-90" dirty="0">
+              <a:solidFill>
+                <a:schemeClr val="tx1"/>
+              </a:solidFill>
+              <a:latin typeface="+mn-lt"/>
+              <a:cs typeface="+mn-cs"/>
+            </a:endParaRPr>
+          </a:p>
+        </p:txBody>
+      </p:sp>
+      <p:pic>
+        <p:nvPicPr>
+          <p:cNvPr id="15" name="Picture 14"/>
+          <p:cNvPicPr>
+            <a:picLocks noChangeAspect="1"/>
+          </p:cNvPicPr>
+          <p:nvPr/>
+        </p:nvPicPr>
+        <p:blipFill rotWithShape="1">
+          <a:blip r:embed="rId3">
+            <a:extLst>
+              <a:ext uri="{28A0092B-C50C-407E-A947-70E740481C1C}">
+                <a14:useLocalDpi xmlns:a14="http://schemas.microsoft.com/office/drawing/2010/main" val="0"/>
+              </a:ext>
+            </a:extLst>
+          </a:blip>
+          <a:srcRect l="-1033" t="-77" r="-243" b="122"/>
+          <a:stretch/>
+        </p:blipFill>
+        <p:spPr>
+          <a:xfrm>
+            <a:off x="7416909" y="2807547"/>
+            <a:ext cx="2516176" cy="2453114"/>
+          </a:xfrm>
+          <a:prstGeom prst="rect">
+            <a:avLst/>
+          </a:prstGeom>
+        </p:spPr>
+      </p:pic>
+      <p:sp>
+        <p:nvSpPr>
+          <p:cNvPr id="16" name="Text Placeholder 1"/>
+          <p:cNvSpPr txBox="1">
+            <a:spLocks/>
+          </p:cNvSpPr>
+          <p:nvPr/>
+        </p:nvSpPr>
+        <p:spPr>
+          <a:xfrm>
+            <a:off x="5094166" y="3302586"/>
+            <a:ext cx="2410140" cy="1387364"/>
+          </a:xfrm>
+          <a:prstGeom prst="rect">
+            <a:avLst/>
+          </a:prstGeom>
+        </p:spPr>
+        <p:txBody>
+          <a:bodyPr>
+            <a:noAutofit/>
+          </a:bodyPr>
+          <a:lstStyle>
+            <a:lvl1pPr marL="342900" indent="-342900" algn="l" defTabSz="457200" rtl="0" eaLnBrk="1" latinLnBrk="0" hangingPunct="1">
+              <a:spcBef>
+                <a:spcPct val="20000"/>
+              </a:spcBef>
+              <a:buFont typeface="Arial"/>
+              <a:buChar char="•"/>
+              <a:defRPr sz="2400" kern="1200">
+                <a:solidFill>
+                  <a:schemeClr val="tx1"/>
+                </a:solidFill>
+                <a:latin typeface="+mn-lt"/>
+                <a:ea typeface="+mn-ea"/>
+                <a:cs typeface="+mn-cs"/>
+              </a:defRPr>
+            </a:lvl1pPr>
+            <a:lvl2pPr marL="742950" indent="-285750" algn="l" defTabSz="457200" rtl="0" eaLnBrk="1" latinLnBrk="0" hangingPunct="1">
+              <a:spcBef>
+                <a:spcPct val="20000"/>
+              </a:spcBef>
+              <a:buFont typeface="Arial"/>
+              <a:buChar char="–"/>
+              <a:defRPr sz="2000" kern="1200">
+                <a:solidFill>
+                  <a:schemeClr val="tx1"/>
+                </a:solidFill>
+                <a:latin typeface="+mn-lt"/>
+                <a:ea typeface="+mn-ea"/>
+                <a:cs typeface="+mn-cs"/>
+              </a:defRPr>
+            </a:lvl2pPr>
+            <a:lvl3pPr marL="1143000" indent="-228600" algn="l" defTabSz="457200" rtl="0" eaLnBrk="1" latinLnBrk="0" hangingPunct="1">
+              <a:spcBef>
+                <a:spcPct val="20000"/>
+              </a:spcBef>
+              <a:buFont typeface="Arial"/>
+              <a:buChar char="•"/>
+              <a:defRPr sz="1600" kern="1200">
+                <a:solidFill>
+                  <a:schemeClr val="tx1"/>
+                </a:solidFill>
+                <a:latin typeface="+mn-lt"/>
+                <a:ea typeface="+mn-ea"/>
+                <a:cs typeface="+mn-cs"/>
+              </a:defRPr>
+            </a:lvl3pPr>
+            <a:lvl4pPr marL="1600200" indent="-228600" algn="l" defTabSz="457200" rtl="0" eaLnBrk="1" latinLnBrk="0" hangingPunct="1">
+              <a:spcBef>
+                <a:spcPct val="20000"/>
+              </a:spcBef>
+              <a:buFont typeface="Arial"/>
+              <a:buChar char="–"/>
+              <a:defRPr sz="1600" kern="1200">
+                <a:solidFill>
+                  <a:schemeClr val="tx1"/>
+                </a:solidFill>
+                <a:latin typeface="+mn-lt"/>
+                <a:ea typeface="+mn-ea"/>
+                <a:cs typeface="+mn-cs"/>
+              </a:defRPr>
+            </a:lvl4pPr>
+            <a:lvl5pPr marL="2057400" indent="-228600" algn="l" defTabSz="457200" rtl="0" eaLnBrk="1" latinLnBrk="0" hangingPunct="1">
+              <a:spcBef>
+                <a:spcPct val="20000"/>
+              </a:spcBef>
+              <a:buFont typeface="Arial"/>
+              <a:buChar char="»"/>
+              <a:defRPr sz="1600" kern="1200">
+                <a:solidFill>
+                  <a:schemeClr val="tx1"/>
+                </a:solidFill>
+                <a:latin typeface="+mn-lt"/>
+                <a:ea typeface="+mn-ea"/>
+                <a:cs typeface="+mn-cs"/>
+              </a:defRPr>
+            </a:lvl5pPr>
+            <a:lvl6pPr marL="2514600" indent="-228600" algn="l" defTabSz="457200" rtl="0" eaLnBrk="1" latinLnBrk="0" hangingPunct="1">
+              <a:spcBef>
+                <a:spcPct val="20000"/>
+              </a:spcBef>
+              <a:buFont typeface="Arial"/>
+              <a:buChar char="•"/>
+              <a:defRPr sz="2000" kern="1200">
+                <a:solidFill>
+                  <a:schemeClr val="tx1"/>
+                </a:solidFill>
+                <a:latin typeface="+mn-lt"/>
+                <a:ea typeface="+mn-ea"/>
+                <a:cs typeface="+mn-cs"/>
+              </a:defRPr>
+            </a:lvl6pPr>
+            <a:lvl7pPr marL="2971800" indent="-228600" algn="l" defTabSz="457200" rtl="0" eaLnBrk="1" latinLnBrk="0" hangingPunct="1">
+              <a:spcBef>
+                <a:spcPct val="20000"/>
+              </a:spcBef>
+              <a:buFont typeface="Arial"/>
+              <a:buChar char="•"/>
+              <a:defRPr sz="2000" kern="1200">
+                <a:solidFill>
+                  <a:schemeClr val="tx1"/>
+                </a:solidFill>
+                <a:latin typeface="+mn-lt"/>
+                <a:ea typeface="+mn-ea"/>
+                <a:cs typeface="+mn-cs"/>
+              </a:defRPr>
+            </a:lvl7pPr>
+            <a:lvl8pPr marL="3429000" indent="-228600" algn="l" defTabSz="457200" rtl="0" eaLnBrk="1" latinLnBrk="0" hangingPunct="1">
+              <a:spcBef>
+                <a:spcPct val="20000"/>
+              </a:spcBef>
+              <a:buFont typeface="Arial"/>
+              <a:buChar char="•"/>
+              <a:defRPr sz="2000" kern="1200">
+                <a:solidFill>
+                  <a:schemeClr val="tx1"/>
+                </a:solidFill>
+                <a:latin typeface="+mn-lt"/>
+                <a:ea typeface="+mn-ea"/>
+                <a:cs typeface="+mn-cs"/>
+              </a:defRPr>
+            </a:lvl8pPr>
+            <a:lvl9pPr marL="3886200" indent="-228600" algn="l" defTabSz="457200" rtl="0" eaLnBrk="1" latinLnBrk="0" hangingPunct="1">
+              <a:spcBef>
+                <a:spcPct val="20000"/>
+              </a:spcBef>
+              <a:buFont typeface="Arial"/>
+              <a:buChar char="•"/>
+              <a:defRPr sz="2000" kern="1200">
+                <a:solidFill>
+                  <a:schemeClr val="tx1"/>
+                </a:solidFill>
+                <a:latin typeface="+mn-lt"/>
+                <a:ea typeface="+mn-ea"/>
+                <a:cs typeface="+mn-cs"/>
+              </a:defRPr>
+            </a:lvl9pPr>
+          </a:lstStyle>
+          <a:p>
+            <a:pPr>
+              <a:buClr>
+                <a:srgbClr val="C00000"/>
+              </a:buClr>
+              <a:buFont typeface="Wingdings" panose="05000000000000000000" pitchFamily="2" charset="2"/>
+              <a:buChar char="§"/>
+            </a:pPr>
+            <a:r>
+              <a:rPr lang="en-US" sz="1200" dirty="0"/>
+              <a:t>Engineering Expertise</a:t>
+            </a:r>
+          </a:p>
+          <a:p>
+            <a:pPr>
+              <a:buClr>
+                <a:srgbClr val="C00000"/>
+              </a:buClr>
+              <a:buFont typeface="Wingdings" panose="05000000000000000000" pitchFamily="2" charset="2"/>
+              <a:buChar char="§"/>
+            </a:pPr>
+            <a:r>
+              <a:rPr lang="en-US" sz="1200" dirty="0"/>
+              <a:t>White Glove Service</a:t>
+            </a:r>
+          </a:p>
+          <a:p>
+            <a:pPr>
+              <a:buClr>
+                <a:srgbClr val="C00000"/>
+              </a:buClr>
+              <a:buFont typeface="Wingdings" panose="05000000000000000000" pitchFamily="2" charset="2"/>
+              <a:buChar char="§"/>
+            </a:pPr>
+            <a:r>
+              <a:rPr lang="en-US" sz="1200" dirty="0"/>
+              <a:t>Delivery Assurance</a:t>
+            </a:r>
+          </a:p>
+          <a:p>
+            <a:pPr>
+              <a:buClr>
+                <a:srgbClr val="C00000"/>
+              </a:buClr>
+              <a:buFont typeface="Wingdings" panose="05000000000000000000" pitchFamily="2" charset="2"/>
+              <a:buChar char="§"/>
+            </a:pPr>
+            <a:r>
+              <a:rPr lang="en-US" sz="1200" dirty="0"/>
+              <a:t>Flexible Business Model</a:t>
+            </a:r>
+          </a:p>
+          <a:p>
+            <a:pPr>
+              <a:buClr>
+                <a:srgbClr val="C00000"/>
+              </a:buClr>
+              <a:buFont typeface="Wingdings" panose="05000000000000000000" pitchFamily="2" charset="2"/>
+              <a:buChar char="§"/>
+            </a:pPr>
+            <a:r>
+              <a:rPr lang="en-US" sz="1200" dirty="0"/>
+              <a:t>Proven Partner Ecosystem</a:t>
+            </a:r>
+          </a:p>
+          <a:p>
+            <a:pPr>
+              <a:buClr>
+                <a:srgbClr val="C00000"/>
+              </a:buClr>
+              <a:buFont typeface="Wingdings" panose="05000000000000000000" pitchFamily="2" charset="2"/>
+              <a:buChar char="§"/>
+            </a:pPr>
+            <a:r>
+              <a:rPr lang="en-US" sz="1200" dirty="0"/>
+              <a:t>Culture &amp; People</a:t>
+            </a:r>
+          </a:p>
+        </p:txBody>
+      </p:sp>
+      <p:pic>
+        <p:nvPicPr>
+          <p:cNvPr id="17" name="Picture 16"/>
+          <p:cNvPicPr>
+            <a:picLocks noChangeAspect="1"/>
+          </p:cNvPicPr>
+          <p:nvPr/>
+        </p:nvPicPr>
+        <p:blipFill>
+          <a:blip r:embed="rId4"/>
+          <a:stretch>
+            <a:fillRect/>
+          </a:stretch>
+        </p:blipFill>
+        <p:spPr>
+          <a:xfrm>
+            <a:off x="2417458" y="1721676"/>
+            <a:ext cx="2189423" cy="916502"/>
+          </a:xfrm>
+          <a:prstGeom prst="rect">
+            <a:avLst/>
+          </a:prstGeom>
+        </p:spPr>
+      </p:pic>
+      <p:sp>
+        <p:nvSpPr>
+          <p:cNvPr id="18" name="Text Placeholder 2"/>
+          <p:cNvSpPr txBox="1">
+            <a:spLocks/>
+          </p:cNvSpPr>
+          <p:nvPr/>
+        </p:nvSpPr>
+        <p:spPr>
+          <a:xfrm>
+            <a:off x="5047838" y="1719972"/>
+            <a:ext cx="1709505" cy="218589"/>
+          </a:xfrm>
+          <a:prstGeom prst="rect">
+            <a:avLst/>
+          </a:prstGeom>
+        </p:spPr>
+        <p:txBody>
+          <a:bodyPr vert="horz" lIns="91440" tIns="45720" rIns="91440" bIns="45720" rtlCol="0" anchor="ctr">
+            <a:noAutofit/>
+          </a:bodyPr>
+          <a:lstStyle>
+            <a:lvl1pPr marL="0" indent="0" algn="l" defTabSz="457200" rtl="0" eaLnBrk="1" latinLnBrk="0" hangingPunct="1">
+              <a:lnSpc>
+                <a:spcPct val="90000"/>
+              </a:lnSpc>
+              <a:spcBef>
+                <a:spcPct val="20000"/>
+              </a:spcBef>
+              <a:buFont typeface="Arial"/>
+              <a:buNone/>
+              <a:defRPr sz="2000" b="0" i="0" kern="1200">
+                <a:solidFill>
+                  <a:schemeClr val="bg1"/>
+                </a:solidFill>
+                <a:latin typeface="Calibri Light"/>
+                <a:ea typeface="+mn-ea"/>
+                <a:cs typeface="Calibri Light"/>
+              </a:defRPr>
+            </a:lvl1pPr>
+            <a:lvl2pPr marL="742950" indent="-285750" algn="l" defTabSz="457200" rtl="0" eaLnBrk="1" latinLnBrk="0" hangingPunct="1">
+              <a:spcBef>
+                <a:spcPct val="20000"/>
+              </a:spcBef>
+              <a:buFont typeface="Arial"/>
+              <a:buChar char="–"/>
+              <a:defRPr sz="2000" kern="1200">
+                <a:solidFill>
+                  <a:schemeClr val="tx1"/>
+                </a:solidFill>
+                <a:latin typeface="+mn-lt"/>
+                <a:ea typeface="+mn-ea"/>
+                <a:cs typeface="+mn-cs"/>
+              </a:defRPr>
+            </a:lvl2pPr>
+            <a:lvl3pPr marL="1143000" indent="-228600" algn="l" defTabSz="457200" rtl="0" eaLnBrk="1" latinLnBrk="0" hangingPunct="1">
+              <a:spcBef>
+                <a:spcPct val="20000"/>
+              </a:spcBef>
+              <a:buFont typeface="Arial"/>
+              <a:buChar char="•"/>
+              <a:defRPr sz="1600" kern="1200">
+                <a:solidFill>
+                  <a:schemeClr val="tx1"/>
+                </a:solidFill>
+                <a:latin typeface="+mn-lt"/>
+                <a:ea typeface="+mn-ea"/>
+                <a:cs typeface="+mn-cs"/>
+              </a:defRPr>
+            </a:lvl3pPr>
+            <a:lvl4pPr marL="1600200" indent="-228600" algn="l" defTabSz="457200" rtl="0" eaLnBrk="1" latinLnBrk="0" hangingPunct="1">
+              <a:spcBef>
+                <a:spcPct val="20000"/>
+              </a:spcBef>
+              <a:buFont typeface="Arial"/>
+              <a:buChar char="–"/>
+              <a:defRPr sz="1600" kern="1200">
+                <a:solidFill>
+                  <a:schemeClr val="tx1"/>
+                </a:solidFill>
+                <a:latin typeface="+mn-lt"/>
+                <a:ea typeface="+mn-ea"/>
+                <a:cs typeface="+mn-cs"/>
+              </a:defRPr>
+            </a:lvl4pPr>
+            <a:lvl5pPr marL="2057400" indent="-228600" algn="l" defTabSz="457200" rtl="0" eaLnBrk="1" latinLnBrk="0" hangingPunct="1">
+              <a:spcBef>
+                <a:spcPct val="20000"/>
+              </a:spcBef>
+              <a:buFont typeface="Arial"/>
+              <a:buChar char="»"/>
+              <a:defRPr sz="1600" kern="1200">
+                <a:solidFill>
+                  <a:schemeClr val="tx1"/>
+                </a:solidFill>
+                <a:latin typeface="+mn-lt"/>
+                <a:ea typeface="+mn-ea"/>
+                <a:cs typeface="+mn-cs"/>
+              </a:defRPr>
+            </a:lvl5pPr>
+            <a:lvl6pPr marL="2514600" indent="-228600" algn="l" defTabSz="457200" rtl="0" eaLnBrk="1" latinLnBrk="0" hangingPunct="1">
+              <a:spcBef>
+                <a:spcPct val="20000"/>
+              </a:spcBef>
+              <a:buFont typeface="Arial"/>
+              <a:buChar char="•"/>
+              <a:defRPr sz="2000" kern="1200">
+                <a:solidFill>
+                  <a:schemeClr val="tx1"/>
+                </a:solidFill>
+                <a:latin typeface="+mn-lt"/>
+                <a:ea typeface="+mn-ea"/>
+                <a:cs typeface="+mn-cs"/>
+              </a:defRPr>
+            </a:lvl6pPr>
+            <a:lvl7pPr marL="2971800" indent="-228600" algn="l" defTabSz="457200" rtl="0" eaLnBrk="1" latinLnBrk="0" hangingPunct="1">
+              <a:spcBef>
+                <a:spcPct val="20000"/>
+              </a:spcBef>
+              <a:buFont typeface="Arial"/>
+              <a:buChar char="•"/>
+              <a:defRPr sz="2000" kern="1200">
+                <a:solidFill>
+                  <a:schemeClr val="tx1"/>
+                </a:solidFill>
+                <a:latin typeface="+mn-lt"/>
+                <a:ea typeface="+mn-ea"/>
+                <a:cs typeface="+mn-cs"/>
+              </a:defRPr>
+            </a:lvl7pPr>
+            <a:lvl8pPr marL="3429000" indent="-228600" algn="l" defTabSz="457200" rtl="0" eaLnBrk="1" latinLnBrk="0" hangingPunct="1">
+              <a:spcBef>
+                <a:spcPct val="20000"/>
+              </a:spcBef>
+              <a:buFont typeface="Arial"/>
+              <a:buChar char="•"/>
+              <a:defRPr sz="2000" kern="1200">
+                <a:solidFill>
+                  <a:schemeClr val="tx1"/>
+                </a:solidFill>
+                <a:latin typeface="+mn-lt"/>
+                <a:ea typeface="+mn-ea"/>
+                <a:cs typeface="+mn-cs"/>
+              </a:defRPr>
+            </a:lvl8pPr>
+            <a:lvl9pPr marL="3886200" indent="-228600" algn="l" defTabSz="457200" rtl="0" eaLnBrk="1" latinLnBrk="0" hangingPunct="1">
+              <a:spcBef>
+                <a:spcPct val="20000"/>
+              </a:spcBef>
+              <a:buFont typeface="Arial"/>
+              <a:buChar char="•"/>
+              <a:defRPr sz="2000" kern="1200">
+                <a:solidFill>
+                  <a:schemeClr val="tx1"/>
+                </a:solidFill>
+                <a:latin typeface="+mn-lt"/>
+                <a:ea typeface="+mn-ea"/>
+                <a:cs typeface="+mn-cs"/>
+              </a:defRPr>
+            </a:lvl9pPr>
+          </a:lstStyle>
+          <a:p>
+            <a:r>
+              <a:rPr lang="en-US" sz="1200" b="1" dirty="0">
+                <a:solidFill>
+                  <a:schemeClr val="tx1"/>
+                </a:solidFill>
+                <a:latin typeface="+mn-lt"/>
+                <a:cs typeface="+mn-cs"/>
+              </a:rPr>
+              <a:t>About </a:t>
+            </a:r>
+            <a:r>
+              <a:rPr lang="en-US" sz="1200" b="1" dirty="0" err="1">
+                <a:solidFill>
+                  <a:schemeClr val="tx1"/>
+                </a:solidFill>
+                <a:latin typeface="+mn-lt"/>
+                <a:cs typeface="+mn-cs"/>
+              </a:rPr>
+              <a:t>iVision</a:t>
+            </a:r>
+            <a:endParaRPr lang="en-US" sz="1200" b="1" spc="-90" dirty="0">
+              <a:solidFill>
+                <a:schemeClr val="tx1"/>
+              </a:solidFill>
+              <a:latin typeface="+mn-lt"/>
+              <a:cs typeface="+mn-cs"/>
+            </a:endParaRPr>
+          </a:p>
+        </p:txBody>
+      </p:sp>
+      <p:pic>
+        <p:nvPicPr>
+          <p:cNvPr id="20" name="Picture 19"/>
+          <p:cNvPicPr>
+            <a:picLocks noChangeAspect="1"/>
+          </p:cNvPicPr>
+          <p:nvPr/>
+        </p:nvPicPr>
+        <p:blipFill>
+          <a:blip r:embed="rId5"/>
+          <a:stretch>
+            <a:fillRect/>
+          </a:stretch>
+        </p:blipFill>
+        <p:spPr>
+          <a:xfrm>
+            <a:off x="2336153" y="2692056"/>
+            <a:ext cx="1345646" cy="1363782"/>
+          </a:xfrm>
+          <a:prstGeom prst="rect">
+            <a:avLst/>
+          </a:prstGeom>
+        </p:spPr>
+      </p:pic>
+    </p:spTree>
+    <p:extLst>
+      <p:ext uri="{BB962C8B-B14F-4D97-AF65-F5344CB8AC3E}">
+        <p14:creationId xmlns:p14="http://schemas.microsoft.com/office/powerpoint/2010/main" val="524782386"/>
+      </p:ext>
+    </p:extLst>
+  </p:cSld>
+  <p:clrMapOvr>
+    <a:masterClrMapping/>
+  </p:clrMapOvr>
+</p:sld>
+</file>
+
+<file path=ppt/slides/slide5.xml><?xml version="1.0" encoding="utf-8"?>
+<p:sld xmlns:a="http://schemas.openxmlformats.org/drawingml/2006/main" xmlns:r="http://schemas.openxmlformats.org/officeDocument/2006/relationships" xmlns:p="http://schemas.openxmlformats.org/presentationml/2006/main">
+  <p:cSld>
+    <p:spTree>
+      <p:nvGrpSpPr>
+        <p:cNvPr id="1" name=""/>
+        <p:cNvGrpSpPr/>
+        <p:nvPr/>
+      </p:nvGrpSpPr>
+      <p:grpSpPr>
+        <a:xfrm>
+          <a:off x="0" y="0"/>
+          <a:ext cx="0" cy="0"/>
+          <a:chOff x="0" y="0"/>
+          <a:chExt cx="0" cy="0"/>
+        </a:xfrm>
+      </p:grpSpPr>
+      <p:sp>
+        <p:nvSpPr>
           <p:cNvPr id="2" name="Title 1"/>
           <p:cNvSpPr>
             <a:spLocks noGrp="1"/>
@@ -9187,140 +10631,6 @@
 </p:sld>
 </file>
 
-<file path=ppt/slides/slide5.xml><?xml version="1.0" encoding="utf-8"?>
-<p:sld xmlns:a="http://schemas.openxmlformats.org/drawingml/2006/main" xmlns:r="http://schemas.openxmlformats.org/officeDocument/2006/relationships" xmlns:p="http://schemas.openxmlformats.org/presentationml/2006/main">
-  <p:cSld>
-    <p:spTree>
-      <p:nvGrpSpPr>
-        <p:cNvPr id="1" name=""/>
-        <p:cNvGrpSpPr/>
-        <p:nvPr/>
-      </p:nvGrpSpPr>
-      <p:grpSpPr>
-        <a:xfrm>
-          <a:off x="0" y="0"/>
-          <a:ext cx="0" cy="0"/>
-          <a:chOff x="0" y="0"/>
-          <a:chExt cx="0" cy="0"/>
-        </a:xfrm>
-      </p:grpSpPr>
-      <p:sp>
-        <p:nvSpPr>
-          <p:cNvPr id="2" name="Title 1"/>
-          <p:cNvSpPr>
-            <a:spLocks noGrp="1"/>
-          </p:cNvSpPr>
-          <p:nvPr>
-            <p:ph type="title"/>
-          </p:nvPr>
-        </p:nvSpPr>
-        <p:spPr/>
-        <p:txBody>
-          <a:bodyPr/>
-          <a:lstStyle/>
-          <a:p>
-            <a:r>
-              <a:rPr lang="en-US" dirty="0"/>
-              <a:t>My (Experience-Based) Bias</a:t>
-            </a:r>
-          </a:p>
-        </p:txBody>
-      </p:sp>
-      <p:sp>
-        <p:nvSpPr>
-          <p:cNvPr id="3" name="Content Placeholder 2"/>
-          <p:cNvSpPr>
-            <a:spLocks noGrp="1"/>
-          </p:cNvSpPr>
-          <p:nvPr>
-            <p:ph idx="1"/>
-          </p:nvPr>
-        </p:nvSpPr>
-        <p:spPr/>
-        <p:txBody>
-          <a:bodyPr/>
-          <a:lstStyle/>
-          <a:p>
-            <a:r>
-              <a:rPr lang="en-US" dirty="0"/>
-              <a:t>Working on Angular since 2011 </a:t>
-            </a:r>
-          </a:p>
-          <a:p>
-            <a:r>
-              <a:rPr lang="en-US" dirty="0"/>
-              <a:t>Example project:</a:t>
-            </a:r>
-          </a:p>
-          <a:p>
-            <a:pPr lvl="1"/>
-            <a:r>
-              <a:rPr lang="en-US" dirty="0"/>
-              <a:t>25 developers</a:t>
-            </a:r>
-          </a:p>
-          <a:p>
-            <a:pPr lvl="1"/>
-            <a:r>
-              <a:rPr lang="en-US" dirty="0"/>
-              <a:t>Global parallel development team</a:t>
-            </a:r>
-          </a:p>
-          <a:p>
-            <a:pPr lvl="1"/>
-            <a:r>
-              <a:rPr lang="en-US" dirty="0"/>
-              <a:t>Almost 100,000 lines of </a:t>
-            </a:r>
-            <a:r>
-              <a:rPr lang="en-US" dirty="0" err="1"/>
-              <a:t>TypeScript</a:t>
-            </a:r>
-            <a:r>
-              <a:rPr lang="en-US" dirty="0"/>
-              <a:t> code </a:t>
-            </a:r>
-          </a:p>
-          <a:p>
-            <a:pPr lvl="1"/>
-            <a:r>
-              <a:rPr lang="en-US" dirty="0"/>
-              <a:t>Over 200 components </a:t>
-            </a:r>
-          </a:p>
-          <a:p>
-            <a:pPr lvl="1"/>
-            <a:r>
-              <a:rPr lang="en-US" dirty="0"/>
-              <a:t>3 years of development</a:t>
-            </a:r>
-          </a:p>
-          <a:p>
-            <a:pPr lvl="1"/>
-            <a:r>
-              <a:rPr lang="en-US" dirty="0">
-                <a:solidFill>
-                  <a:srgbClr val="FF0000"/>
-                </a:solidFill>
-              </a:rPr>
-              <a:t>4x improvement</a:t>
-            </a:r>
-          </a:p>
-        </p:txBody>
-      </p:sp>
-    </p:spTree>
-    <p:extLst>
-      <p:ext uri="{BB962C8B-B14F-4D97-AF65-F5344CB8AC3E}">
-        <p14:creationId xmlns:p14="http://schemas.microsoft.com/office/powerpoint/2010/main" val="602931345"/>
-      </p:ext>
-    </p:extLst>
-  </p:cSld>
-  <p:clrMapOvr>
-    <a:masterClrMapping/>
-  </p:clrMapOvr>
-</p:sld>
-</file>
-
 <file path=ppt/slides/slide6.xml><?xml version="1.0" encoding="utf-8"?>
 <p:sld xmlns:a="http://schemas.openxmlformats.org/drawingml/2006/main" xmlns:r="http://schemas.openxmlformats.org/officeDocument/2006/relationships" xmlns:p="http://schemas.openxmlformats.org/presentationml/2006/main">
   <p:cSld>
@@ -9355,7 +10665,7 @@
           <a:p>
             <a:r>
               <a:rPr lang="en-US" dirty="0"/>
-              <a:t>4x Improvement</a:t>
+              <a:t>My (Experience-Based) Bias</a:t>
             </a:r>
           </a:p>
         </p:txBody>
@@ -9377,13 +10687,34 @@
           <a:p>
             <a:r>
               <a:rPr lang="en-US" dirty="0"/>
-              <a:t>6 months spent with JavaScript and Knockout.js </a:t>
-            </a:r>
-          </a:p>
-          <a:p>
-            <a:r>
-              <a:rPr lang="en-US" dirty="0"/>
-              <a:t>Changed to Angular and </a:t>
+              <a:t>Working on Angular since 2011 </a:t>
+            </a:r>
+          </a:p>
+          <a:p>
+            <a:r>
+              <a:rPr lang="en-US" dirty="0"/>
+              <a:t>Example project:</a:t>
+            </a:r>
+          </a:p>
+          <a:p>
+            <a:pPr lvl="1"/>
+            <a:r>
+              <a:rPr lang="en-US" dirty="0"/>
+              <a:t>25 developers</a:t>
+            </a:r>
+          </a:p>
+          <a:p>
+            <a:pPr lvl="1"/>
+            <a:r>
+              <a:rPr lang="en-US" dirty="0"/>
+              <a:t>Global parallel development team</a:t>
+            </a:r>
+          </a:p>
+          <a:p>
+            <a:pPr lvl="1"/>
+            <a:r>
+              <a:rPr lang="en-US" dirty="0"/>
+              <a:t>Almost 100,000 lines of </a:t>
             </a:r>
             <a:r>
               <a:rPr lang="en-US" dirty="0" err="1"/>
@@ -9391,48 +10722,32 @@
             </a:r>
             <a:r>
               <a:rPr lang="en-US" dirty="0"/>
-              <a:t> based on spike </a:t>
-            </a:r>
-          </a:p>
-          <a:p>
-            <a:r>
-              <a:rPr lang="en-US" dirty="0"/>
-              <a:t>4x development</a:t>
+              <a:t> code </a:t>
             </a:r>
           </a:p>
           <a:p>
             <a:pPr lvl="1"/>
             <a:r>
               <a:rPr lang="en-US" dirty="0"/>
-              <a:t>Modular approach </a:t>
+              <a:t>Over 200 components </a:t>
             </a:r>
           </a:p>
           <a:p>
             <a:pPr lvl="1"/>
             <a:r>
               <a:rPr lang="en-US" dirty="0"/>
-              <a:t>Testability </a:t>
+              <a:t>3 years of development</a:t>
             </a:r>
           </a:p>
           <a:p>
             <a:pPr lvl="1"/>
             <a:r>
-              <a:rPr lang="en-US" dirty="0"/>
-              <a:t>Discoverability </a:t>
-            </a:r>
-          </a:p>
-          <a:p>
-            <a:pPr lvl="1"/>
-            <a:r>
-              <a:rPr lang="en-US" dirty="0"/>
-              <a:t>Type-safety </a:t>
-            </a:r>
-          </a:p>
-          <a:p>
-            <a:pPr lvl="1"/>
-            <a:r>
-              <a:rPr lang="en-US" dirty="0"/>
-              <a:t>Maintainability </a:t>
+              <a:rPr lang="en-US" dirty="0">
+                <a:solidFill>
+                  <a:srgbClr val="FF0000"/>
+                </a:solidFill>
+              </a:rPr>
+              <a:t>4x improvement</a:t>
             </a:r>
           </a:p>
         </p:txBody>
@@ -9440,7 +10755,7 @@
     </p:spTree>
     <p:extLst>
       <p:ext uri="{BB962C8B-B14F-4D97-AF65-F5344CB8AC3E}">
-        <p14:creationId xmlns:p14="http://schemas.microsoft.com/office/powerpoint/2010/main" val="249612562"/>
+        <p14:creationId xmlns:p14="http://schemas.microsoft.com/office/powerpoint/2010/main" val="602931345"/>
       </p:ext>
     </p:extLst>
   </p:cSld>
@@ -9484,6 +10799,135 @@
           <a:p>
             <a:r>
               <a:rPr lang="en-US" dirty="0"/>
+              <a:t>4x Improvement</a:t>
+            </a:r>
+          </a:p>
+        </p:txBody>
+      </p:sp>
+      <p:sp>
+        <p:nvSpPr>
+          <p:cNvPr id="3" name="Content Placeholder 2"/>
+          <p:cNvSpPr>
+            <a:spLocks noGrp="1"/>
+          </p:cNvSpPr>
+          <p:nvPr>
+            <p:ph idx="1"/>
+          </p:nvPr>
+        </p:nvSpPr>
+        <p:spPr/>
+        <p:txBody>
+          <a:bodyPr/>
+          <a:lstStyle/>
+          <a:p>
+            <a:r>
+              <a:rPr lang="en-US" dirty="0"/>
+              <a:t>6 months spent with JavaScript and Knockout.js </a:t>
+            </a:r>
+          </a:p>
+          <a:p>
+            <a:r>
+              <a:rPr lang="en-US" dirty="0"/>
+              <a:t>Changed to Angular and </a:t>
+            </a:r>
+            <a:r>
+              <a:rPr lang="en-US" dirty="0" err="1"/>
+              <a:t>TypeScript</a:t>
+            </a:r>
+            <a:r>
+              <a:rPr lang="en-US" dirty="0"/>
+              <a:t> based on spike </a:t>
+            </a:r>
+          </a:p>
+          <a:p>
+            <a:r>
+              <a:rPr lang="en-US" dirty="0"/>
+              <a:t>4x development</a:t>
+            </a:r>
+          </a:p>
+          <a:p>
+            <a:pPr lvl="1"/>
+            <a:r>
+              <a:rPr lang="en-US" dirty="0"/>
+              <a:t>Modular approach </a:t>
+            </a:r>
+          </a:p>
+          <a:p>
+            <a:pPr lvl="1"/>
+            <a:r>
+              <a:rPr lang="en-US" dirty="0"/>
+              <a:t>Testability </a:t>
+            </a:r>
+          </a:p>
+          <a:p>
+            <a:pPr lvl="1"/>
+            <a:r>
+              <a:rPr lang="en-US" dirty="0"/>
+              <a:t>Discoverability </a:t>
+            </a:r>
+          </a:p>
+          <a:p>
+            <a:pPr lvl="1"/>
+            <a:r>
+              <a:rPr lang="en-US" dirty="0"/>
+              <a:t>Type-safety </a:t>
+            </a:r>
+          </a:p>
+          <a:p>
+            <a:pPr lvl="1"/>
+            <a:r>
+              <a:rPr lang="en-US" dirty="0"/>
+              <a:t>Maintainability </a:t>
+            </a:r>
+          </a:p>
+        </p:txBody>
+      </p:sp>
+    </p:spTree>
+    <p:extLst>
+      <p:ext uri="{BB962C8B-B14F-4D97-AF65-F5344CB8AC3E}">
+        <p14:creationId xmlns:p14="http://schemas.microsoft.com/office/powerpoint/2010/main" val="249612562"/>
+      </p:ext>
+    </p:extLst>
+  </p:cSld>
+  <p:clrMapOvr>
+    <a:masterClrMapping/>
+  </p:clrMapOvr>
+</p:sld>
+</file>
+
+<file path=ppt/slides/slide8.xml><?xml version="1.0" encoding="utf-8"?>
+<p:sld xmlns:a="http://schemas.openxmlformats.org/drawingml/2006/main" xmlns:r="http://schemas.openxmlformats.org/officeDocument/2006/relationships" xmlns:p="http://schemas.openxmlformats.org/presentationml/2006/main">
+  <p:cSld>
+    <p:spTree>
+      <p:nvGrpSpPr>
+        <p:cNvPr id="1" name=""/>
+        <p:cNvGrpSpPr/>
+        <p:nvPr/>
+      </p:nvGrpSpPr>
+      <p:grpSpPr>
+        <a:xfrm>
+          <a:off x="0" y="0"/>
+          <a:ext cx="0" cy="0"/>
+          <a:chOff x="0" y="0"/>
+          <a:chExt cx="0" cy="0"/>
+        </a:xfrm>
+      </p:grpSpPr>
+      <p:sp>
+        <p:nvSpPr>
+          <p:cNvPr id="2" name="Title 1"/>
+          <p:cNvSpPr>
+            <a:spLocks noGrp="1"/>
+          </p:cNvSpPr>
+          <p:nvPr>
+            <p:ph type="title"/>
+          </p:nvPr>
+        </p:nvSpPr>
+        <p:spPr/>
+        <p:txBody>
+          <a:bodyPr/>
+          <a:lstStyle/>
+          <a:p>
+            <a:r>
+              <a:rPr lang="en-US" dirty="0"/>
               <a:t>What?</a:t>
             </a:r>
           </a:p>
@@ -9610,7 +11054,7 @@
 </p:sld>
 </file>
 
-<file path=ppt/slides/slide8.xml><?xml version="1.0" encoding="utf-8"?>
+<file path=ppt/slides/slide9.xml><?xml version="1.0" encoding="utf-8"?>
 <p:sld xmlns:a="http://schemas.openxmlformats.org/drawingml/2006/main" xmlns:r="http://schemas.openxmlformats.org/officeDocument/2006/relationships" xmlns:p="http://schemas.openxmlformats.org/presentationml/2006/main">
   <p:cSld>
     <p:spTree>
@@ -9840,236 +11284,6 @@
     <p:extLst>
       <p:ext uri="{BB962C8B-B14F-4D97-AF65-F5344CB8AC3E}">
         <p14:creationId xmlns:p14="http://schemas.microsoft.com/office/powerpoint/2010/main" val="3698023748"/>
-      </p:ext>
-    </p:extLst>
-  </p:cSld>
-  <p:clrMapOvr>
-    <a:masterClrMapping/>
-  </p:clrMapOvr>
-</p:sld>
-</file>
-
-<file path=ppt/slides/slide9.xml><?xml version="1.0" encoding="utf-8"?>
-<p:sld xmlns:a="http://schemas.openxmlformats.org/drawingml/2006/main" xmlns:r="http://schemas.openxmlformats.org/officeDocument/2006/relationships" xmlns:p="http://schemas.openxmlformats.org/presentationml/2006/main">
-  <p:cSld>
-    <p:spTree>
-      <p:nvGrpSpPr>
-        <p:cNvPr id="1" name=""/>
-        <p:cNvGrpSpPr/>
-        <p:nvPr/>
-      </p:nvGrpSpPr>
-      <p:grpSpPr>
-        <a:xfrm>
-          <a:off x="0" y="0"/>
-          <a:ext cx="0" cy="0"/>
-          <a:chOff x="0" y="0"/>
-          <a:chExt cx="0" cy="0"/>
-        </a:xfrm>
-      </p:grpSpPr>
-      <p:sp>
-        <p:nvSpPr>
-          <p:cNvPr id="2" name="Title 1"/>
-          <p:cNvSpPr>
-            <a:spLocks noGrp="1"/>
-          </p:cNvSpPr>
-          <p:nvPr>
-            <p:ph type="title"/>
-          </p:nvPr>
-        </p:nvSpPr>
-        <p:spPr/>
-        <p:txBody>
-          <a:bodyPr/>
-          <a:lstStyle/>
-          <a:p>
-            <a:r>
-              <a:rPr lang="en-US" dirty="0"/>
-              <a:t>Components</a:t>
-            </a:r>
-          </a:p>
-        </p:txBody>
-      </p:sp>
-      <p:sp>
-        <p:nvSpPr>
-          <p:cNvPr id="3" name="Content Placeholder 2"/>
-          <p:cNvSpPr>
-            <a:spLocks noGrp="1"/>
-          </p:cNvSpPr>
-          <p:nvPr>
-            <p:ph idx="1"/>
-          </p:nvPr>
-        </p:nvSpPr>
-        <p:spPr/>
-        <p:txBody>
-          <a:bodyPr/>
-          <a:lstStyle/>
-          <a:p>
-            <a:r>
-              <a:rPr lang="en-US" dirty="0"/>
-              <a:t>UI Building Block</a:t>
-            </a:r>
-          </a:p>
-          <a:p>
-            <a:r>
-              <a:rPr lang="en-US" dirty="0"/>
-              <a:t>Always have a template</a:t>
-            </a:r>
-          </a:p>
-          <a:p>
-            <a:r>
-              <a:rPr lang="en-US" dirty="0"/>
-              <a:t>Scoped CSS </a:t>
-            </a:r>
-          </a:p>
-          <a:p>
-            <a:r>
-              <a:rPr lang="en-US" dirty="0"/>
-              <a:t>Lifecycle hooks </a:t>
-            </a:r>
-          </a:p>
-        </p:txBody>
-      </p:sp>
-      <p:grpSp>
-        <p:nvGrpSpPr>
-          <p:cNvPr id="4" name="Group 3"/>
-          <p:cNvGrpSpPr/>
-          <p:nvPr/>
-        </p:nvGrpSpPr>
-        <p:grpSpPr>
-          <a:xfrm>
-            <a:off x="10023678" y="360566"/>
-            <a:ext cx="1330122" cy="1330122"/>
-            <a:chOff x="6407349" y="934549"/>
-            <a:chExt cx="1330122" cy="1330122"/>
-          </a:xfrm>
-        </p:grpSpPr>
-        <p:sp>
-          <p:nvSpPr>
-            <p:cNvPr id="5" name="Oval 4"/>
-            <p:cNvSpPr/>
-            <p:nvPr/>
-          </p:nvSpPr>
-          <p:spPr>
-            <a:xfrm>
-              <a:off x="6407349" y="934549"/>
-              <a:ext cx="1330122" cy="1330122"/>
-            </a:xfrm>
-            <a:prstGeom prst="ellipse">
-              <a:avLst/>
-            </a:prstGeom>
-          </p:spPr>
-          <p:style>
-            <a:lnRef idx="2">
-              <a:schemeClr val="lt1">
-                <a:hueOff val="0"/>
-                <a:satOff val="0"/>
-                <a:lumOff val="0"/>
-                <a:alphaOff val="0"/>
-              </a:schemeClr>
-            </a:lnRef>
-            <a:fillRef idx="1">
-              <a:schemeClr val="accent4">
-                <a:hueOff val="2079139"/>
-                <a:satOff val="-9594"/>
-                <a:lumOff val="353"/>
-                <a:alphaOff val="0"/>
-              </a:schemeClr>
-            </a:fillRef>
-            <a:effectRef idx="0">
-              <a:schemeClr val="accent4">
-                <a:hueOff val="2079139"/>
-                <a:satOff val="-9594"/>
-                <a:lumOff val="353"/>
-                <a:alphaOff val="0"/>
-              </a:schemeClr>
-            </a:effectRef>
-            <a:fontRef idx="minor">
-              <a:schemeClr val="lt1"/>
-            </a:fontRef>
-          </p:style>
-        </p:sp>
-        <p:sp>
-          <p:nvSpPr>
-            <p:cNvPr id="6" name="Oval 4"/>
-            <p:cNvSpPr txBox="1"/>
-            <p:nvPr/>
-          </p:nvSpPr>
-          <p:spPr>
-            <a:xfrm>
-              <a:off x="6602141" y="1129341"/>
-              <a:ext cx="940538" cy="940538"/>
-            </a:xfrm>
-            <a:prstGeom prst="rect">
-              <a:avLst/>
-            </a:prstGeom>
-          </p:spPr>
-          <p:style>
-            <a:lnRef idx="0">
-              <a:scrgbClr r="0" g="0" b="0"/>
-            </a:lnRef>
-            <a:fillRef idx="0">
-              <a:scrgbClr r="0" g="0" b="0"/>
-            </a:fillRef>
-            <a:effectRef idx="0">
-              <a:scrgbClr r="0" g="0" b="0"/>
-            </a:effectRef>
-            <a:fontRef idx="minor">
-              <a:schemeClr val="lt1"/>
-            </a:fontRef>
-          </p:style>
-          <p:txBody>
-            <a:bodyPr spcFirstLastPara="0" vert="horz" wrap="square" lIns="16510" tIns="16510" rIns="16510" bIns="16510" numCol="1" spcCol="1270" anchor="ctr" anchorCtr="0">
-              <a:noAutofit/>
-            </a:bodyPr>
-            <a:lstStyle/>
-            <a:p>
-              <a:pPr marL="0" lvl="0" indent="0" algn="ctr" defTabSz="577850">
-                <a:lnSpc>
-                  <a:spcPct val="90000"/>
-                </a:lnSpc>
-                <a:spcBef>
-                  <a:spcPct val="0"/>
-                </a:spcBef>
-                <a:spcAft>
-                  <a:spcPct val="35000"/>
-                </a:spcAft>
-                <a:buNone/>
-              </a:pPr>
-              <a:r>
-                <a:rPr lang="en-US" sz="1300" kern="1200" dirty="0"/>
-                <a:t>Components</a:t>
-              </a:r>
-            </a:p>
-          </p:txBody>
-        </p:sp>
-      </p:grpSp>
-      <p:pic>
-        <p:nvPicPr>
-          <p:cNvPr id="7" name="Picture 6"/>
-          <p:cNvPicPr>
-            <a:picLocks noChangeAspect="1"/>
-          </p:cNvPicPr>
-          <p:nvPr/>
-        </p:nvPicPr>
-        <p:blipFill>
-          <a:blip r:embed="rId2"/>
-          <a:stretch>
-            <a:fillRect/>
-          </a:stretch>
-        </p:blipFill>
-        <p:spPr>
-          <a:xfrm>
-            <a:off x="838200" y="4062413"/>
-            <a:ext cx="9220200" cy="2114550"/>
-          </a:xfrm>
-          <a:prstGeom prst="rect">
-            <a:avLst/>
-          </a:prstGeom>
-        </p:spPr>
-      </p:pic>
-    </p:spTree>
-    <p:extLst>
-      <p:ext uri="{BB962C8B-B14F-4D97-AF65-F5344CB8AC3E}">
-        <p14:creationId xmlns:p14="http://schemas.microsoft.com/office/powerpoint/2010/main" val="2755280173"/>
       </p:ext>
     </p:extLst>
   </p:cSld>

</xml_diff>

<commit_message>
Corrections based on feedback
</commit_message>
<xml_diff>
--- a/00Intro/ng2.pptx
+++ b/00Intro/ng2.pptx
@@ -3738,7 +3738,7 @@
           <a:p>
             <a:fld id="{D5279824-C717-4B52-9E7D-7B6B13CAFE89}" type="datetimeFigureOut">
               <a:rPr lang="en-US" smtClean="0"/>
-              <a:t>10/19/2016</a:t>
+              <a:t>10/20/2016</a:t>
             </a:fld>
             <a:endParaRPr lang="en-US"/>
           </a:p>
@@ -3906,7 +3906,7 @@
           <a:p>
             <a:fld id="{D5279824-C717-4B52-9E7D-7B6B13CAFE89}" type="datetimeFigureOut">
               <a:rPr lang="en-US" smtClean="0"/>
-              <a:t>10/19/2016</a:t>
+              <a:t>10/20/2016</a:t>
             </a:fld>
             <a:endParaRPr lang="en-US"/>
           </a:p>
@@ -4084,7 +4084,7 @@
           <a:p>
             <a:fld id="{D5279824-C717-4B52-9E7D-7B6B13CAFE89}" type="datetimeFigureOut">
               <a:rPr lang="en-US" smtClean="0"/>
-              <a:t>10/19/2016</a:t>
+              <a:t>10/20/2016</a:t>
             </a:fld>
             <a:endParaRPr lang="en-US"/>
           </a:p>
@@ -4252,7 +4252,7 @@
           <a:p>
             <a:fld id="{D5279824-C717-4B52-9E7D-7B6B13CAFE89}" type="datetimeFigureOut">
               <a:rPr lang="en-US" smtClean="0"/>
-              <a:t>10/19/2016</a:t>
+              <a:t>10/20/2016</a:t>
             </a:fld>
             <a:endParaRPr lang="en-US"/>
           </a:p>
@@ -4497,7 +4497,7 @@
           <a:p>
             <a:fld id="{D5279824-C717-4B52-9E7D-7B6B13CAFE89}" type="datetimeFigureOut">
               <a:rPr lang="en-US" smtClean="0"/>
-              <a:t>10/19/2016</a:t>
+              <a:t>10/20/2016</a:t>
             </a:fld>
             <a:endParaRPr lang="en-US"/>
           </a:p>
@@ -4726,7 +4726,7 @@
           <a:p>
             <a:fld id="{D5279824-C717-4B52-9E7D-7B6B13CAFE89}" type="datetimeFigureOut">
               <a:rPr lang="en-US" smtClean="0"/>
-              <a:t>10/19/2016</a:t>
+              <a:t>10/20/2016</a:t>
             </a:fld>
             <a:endParaRPr lang="en-US"/>
           </a:p>
@@ -5090,7 +5090,7 @@
           <a:p>
             <a:fld id="{D5279824-C717-4B52-9E7D-7B6B13CAFE89}" type="datetimeFigureOut">
               <a:rPr lang="en-US" smtClean="0"/>
-              <a:t>10/19/2016</a:t>
+              <a:t>10/20/2016</a:t>
             </a:fld>
             <a:endParaRPr lang="en-US"/>
           </a:p>
@@ -5207,7 +5207,7 @@
           <a:p>
             <a:fld id="{D5279824-C717-4B52-9E7D-7B6B13CAFE89}" type="datetimeFigureOut">
               <a:rPr lang="en-US" smtClean="0"/>
-              <a:t>10/19/2016</a:t>
+              <a:t>10/20/2016</a:t>
             </a:fld>
             <a:endParaRPr lang="en-US"/>
           </a:p>
@@ -5302,7 +5302,7 @@
           <a:p>
             <a:fld id="{D5279824-C717-4B52-9E7D-7B6B13CAFE89}" type="datetimeFigureOut">
               <a:rPr lang="en-US" smtClean="0"/>
-              <a:t>10/19/2016</a:t>
+              <a:t>10/20/2016</a:t>
             </a:fld>
             <a:endParaRPr lang="en-US"/>
           </a:p>
@@ -5577,7 +5577,7 @@
           <a:p>
             <a:fld id="{D5279824-C717-4B52-9E7D-7B6B13CAFE89}" type="datetimeFigureOut">
               <a:rPr lang="en-US" smtClean="0"/>
-              <a:t>10/19/2016</a:t>
+              <a:t>10/20/2016</a:t>
             </a:fld>
             <a:endParaRPr lang="en-US"/>
           </a:p>
@@ -5829,7 +5829,7 @@
           <a:p>
             <a:fld id="{D5279824-C717-4B52-9E7D-7B6B13CAFE89}" type="datetimeFigureOut">
               <a:rPr lang="en-US" smtClean="0"/>
-              <a:t>10/19/2016</a:t>
+              <a:t>10/20/2016</a:t>
             </a:fld>
             <a:endParaRPr lang="en-US"/>
           </a:p>
@@ -6040,7 +6040,7 @@
           <a:p>
             <a:fld id="{D5279824-C717-4B52-9E7D-7B6B13CAFE89}" type="datetimeFigureOut">
               <a:rPr lang="en-US" smtClean="0"/>
-              <a:t>10/19/2016</a:t>
+              <a:t>10/20/2016</a:t>
             </a:fld>
             <a:endParaRPr lang="en-US"/>
           </a:p>
@@ -8982,7 +8982,7 @@
         <p:spPr>
           <a:xfrm>
             <a:off x="4508035" y="2617623"/>
-            <a:ext cx="3730508" cy="369332"/>
+            <a:ext cx="4490332" cy="369332"/>
           </a:xfrm>
           <a:prstGeom prst="rect">
             <a:avLst/>
@@ -9005,13 +9005,19 @@
               <a:rPr lang="en-US" dirty="0">
                 <a:latin typeface="Consolas" panose="020B0609020204030204" pitchFamily="49" charset="0"/>
               </a:rPr>
-              <a:t> –i –g </a:t>
-            </a:r>
-            <a:r>
-              <a:rPr lang="en-US" dirty="0" err="1">
+              <a:t> i –</a:t>
+            </a:r>
+            <a:r>
+              <a:rPr lang="en-US">
                 <a:latin typeface="Consolas" panose="020B0609020204030204" pitchFamily="49" charset="0"/>
               </a:rPr>
-              <a:t>angular-cli@latest</a:t>
+              <a:t>g </a:t>
+            </a:r>
+            <a:r>
+              <a:rPr lang="en-US">
+                <a:latin typeface="Consolas" panose="020B0609020204030204" pitchFamily="49" charset="0"/>
+              </a:rPr>
+              <a:t>angular-cli@1.0.0-beta.16</a:t>
             </a:r>
             <a:endParaRPr lang="en-US" dirty="0">
               <a:latin typeface="Consolas" panose="020B0609020204030204" pitchFamily="49" charset="0"/>

</xml_diff>